<commit_message>
#72 Commit: Relatório + PPT
</commit_message>
<xml_diff>
--- a/Apresentação.pptx
+++ b/Apresentação.pptx
@@ -5,7 +5,7 @@
     <p:sldMasterId id="2147483648" r:id="rId1"/>
   </p:sldMasterIdLst>
   <p:notesMasterIdLst>
-    <p:notesMasterId r:id="rId30"/>
+    <p:notesMasterId r:id="rId33"/>
   </p:notesMasterIdLst>
   <p:sldIdLst>
     <p:sldId id="256" r:id="rId2"/>
@@ -27,15 +27,18 @@
     <p:sldId id="283" r:id="rId18"/>
     <p:sldId id="287" r:id="rId19"/>
     <p:sldId id="293" r:id="rId20"/>
-    <p:sldId id="294" r:id="rId21"/>
-    <p:sldId id="295" r:id="rId22"/>
-    <p:sldId id="285" r:id="rId23"/>
-    <p:sldId id="288" r:id="rId24"/>
-    <p:sldId id="296" r:id="rId25"/>
-    <p:sldId id="297" r:id="rId26"/>
-    <p:sldId id="299" r:id="rId27"/>
-    <p:sldId id="281" r:id="rId28"/>
-    <p:sldId id="282" r:id="rId29"/>
+    <p:sldId id="308" r:id="rId21"/>
+    <p:sldId id="307" r:id="rId22"/>
+    <p:sldId id="294" r:id="rId23"/>
+    <p:sldId id="295" r:id="rId24"/>
+    <p:sldId id="285" r:id="rId25"/>
+    <p:sldId id="288" r:id="rId26"/>
+    <p:sldId id="296" r:id="rId27"/>
+    <p:sldId id="297" r:id="rId28"/>
+    <p:sldId id="299" r:id="rId29"/>
+    <p:sldId id="306" r:id="rId30"/>
+    <p:sldId id="281" r:id="rId31"/>
+    <p:sldId id="282" r:id="rId32"/>
   </p:sldIdLst>
   <p:sldSz cx="9144000" cy="5143500" type="screen16x9"/>
   <p:notesSz cx="6858000" cy="9144000"/>
@@ -273,7 +276,7 @@
       <p15:sldGuideLst xmlns:p15="http://schemas.microsoft.com/office/powerpoint/2012/main"/>
     </p:ext>
     <p:ext uri="http://customooxmlschemas.google.com/">
-      <go:slidesCustomData xmlns:go="http://customooxmlschemas.google.com/" xmlns:p15="http://schemas.microsoft.com/office/powerpoint/2012/main" xmlns:p14="http://schemas.microsoft.com/office/powerpoint/2010/main" xmlns:com="http://schemas.openxmlformats.org/drawingml/2006/compatibility" xmlns:pvml="urn:schemas-microsoft-com:office:powerpoint" xmlns:v="urn:schemas-microsoft-com:vml" xmlns:o="urn:schemas-microsoft-com:office:office" xmlns:dgm="http://schemas.openxmlformats.org/drawingml/2006/diagram" xmlns:c="http://schemas.openxmlformats.org/drawingml/2006/chart" xmlns:mv="urn:schemas-microsoft-com:mac:vml" xmlns:mc="http://schemas.openxmlformats.org/markup-compatibility/2006" xmlns="" r:id="rId32" roundtripDataSignature="AMtx7mi2giJIhmxq+e/rTQEB/kbV3AzsFA=="/>
+      <go:slidesCustomData xmlns="" xmlns:mc="http://schemas.openxmlformats.org/markup-compatibility/2006" xmlns:mv="urn:schemas-microsoft-com:mac:vml" xmlns:c="http://schemas.openxmlformats.org/drawingml/2006/chart" xmlns:dgm="http://schemas.openxmlformats.org/drawingml/2006/diagram" xmlns:o="urn:schemas-microsoft-com:office:office" xmlns:v="urn:schemas-microsoft-com:vml" xmlns:pvml="urn:schemas-microsoft-com:office:powerpoint" xmlns:com="http://schemas.openxmlformats.org/drawingml/2006/compatibility" xmlns:p14="http://schemas.microsoft.com/office/powerpoint/2010/main" xmlns:p15="http://schemas.microsoft.com/office/powerpoint/2012/main" xmlns:go="http://customooxmlschemas.google.com/" r:id="rId34" roundtripDataSignature="AMtx7mi2giJIhmxq+e/rTQEB/kbV3AzsFA=="/>
     </p:ext>
   </p:extLst>
 </p:presentation>
@@ -2235,7 +2238,7 @@
     </p:spTree>
     <p:extLst>
       <p:ext uri="{BB962C8B-B14F-4D97-AF65-F5344CB8AC3E}">
-        <p14:creationId xmlns:p14="http://schemas.microsoft.com/office/powerpoint/2010/main" val="3266199320"/>
+        <p14:creationId xmlns:p14="http://schemas.microsoft.com/office/powerpoint/2010/main" val="1366709416"/>
       </p:ext>
     </p:extLst>
   </p:cSld>
@@ -2489,6 +2492,133 @@
     </p:spTree>
     <p:extLst>
       <p:ext uri="{BB962C8B-B14F-4D97-AF65-F5344CB8AC3E}">
+        <p14:creationId xmlns:p14="http://schemas.microsoft.com/office/powerpoint/2010/main" val="3266199320"/>
+      </p:ext>
+    </p:extLst>
+  </p:cSld>
+  <p:clrMapOvr>
+    <a:masterClrMapping/>
+  </p:clrMapOvr>
+</p:notes>
+</file>
+
+<file path=ppt/notesSlides/notesSlide21.xml><?xml version="1.0" encoding="utf-8"?>
+<p:notes xmlns:a="http://schemas.openxmlformats.org/drawingml/2006/main" xmlns:r="http://schemas.openxmlformats.org/officeDocument/2006/relationships" xmlns:p="http://schemas.openxmlformats.org/presentationml/2006/main" showMasterSp="0" showMasterPhAnim="0">
+  <p:cSld>
+    <p:spTree>
+      <p:nvGrpSpPr>
+        <p:cNvPr id="1" name="Shape 146"/>
+        <p:cNvGrpSpPr/>
+        <p:nvPr/>
+      </p:nvGrpSpPr>
+      <p:grpSpPr>
+        <a:xfrm>
+          <a:off x="0" y="0"/>
+          <a:ext cx="0" cy="0"/>
+          <a:chOff x="0" y="0"/>
+          <a:chExt cx="0" cy="0"/>
+        </a:xfrm>
+      </p:grpSpPr>
+      <p:sp>
+        <p:nvSpPr>
+          <p:cNvPr id="147" name="Google Shape;147;g5c66568b58_0_22:notes"/>
+          <p:cNvSpPr txBox="1">
+            <a:spLocks noGrp="1"/>
+          </p:cNvSpPr>
+          <p:nvPr>
+            <p:ph type="body" idx="1"/>
+          </p:nvPr>
+        </p:nvSpPr>
+        <p:spPr>
+          <a:xfrm>
+            <a:off x="685800" y="4343400"/>
+            <a:ext cx="5486400" cy="4114800"/>
+          </a:xfrm>
+          <a:prstGeom prst="rect">
+            <a:avLst/>
+          </a:prstGeom>
+          <a:noFill/>
+          <a:ln>
+            <a:noFill/>
+          </a:ln>
+        </p:spPr>
+        <p:txBody>
+          <a:bodyPr spcFirstLastPara="1" wrap="square" lIns="91425" tIns="91425" rIns="91425" bIns="91425" anchor="t" anchorCtr="0">
+            <a:noAutofit/>
+          </a:bodyPr>
+          <a:lstStyle/>
+          <a:p>
+            <a:pPr marL="0" lvl="0" indent="0" algn="l" rtl="0">
+              <a:lnSpc>
+                <a:spcPct val="100000"/>
+              </a:lnSpc>
+              <a:spcBef>
+                <a:spcPts val="0"/>
+              </a:spcBef>
+              <a:spcAft>
+                <a:spcPts val="0"/>
+              </a:spcAft>
+              <a:buSzPts val="1400"/>
+              <a:buNone/>
+            </a:pPr>
+            <a:endParaRPr dirty="0"/>
+          </a:p>
+        </p:txBody>
+      </p:sp>
+      <p:sp>
+        <p:nvSpPr>
+          <p:cNvPr id="148" name="Google Shape;148;g5c66568b58_0_22:notes"/>
+          <p:cNvSpPr>
+            <a:spLocks noGrp="1" noRot="1" noChangeAspect="1"/>
+          </p:cNvSpPr>
+          <p:nvPr>
+            <p:ph type="sldImg" idx="2"/>
+          </p:nvPr>
+        </p:nvSpPr>
+        <p:spPr>
+          <a:xfrm>
+            <a:off x="381000" y="685800"/>
+            <a:ext cx="6096000" cy="3429000"/>
+          </a:xfrm>
+          <a:custGeom>
+            <a:avLst/>
+            <a:gdLst/>
+            <a:ahLst/>
+            <a:cxnLst/>
+            <a:rect l="l" t="t" r="r" b="b"/>
+            <a:pathLst>
+              <a:path w="120000" h="120000" extrusionOk="0">
+                <a:moveTo>
+                  <a:pt x="0" y="0"/>
+                </a:moveTo>
+                <a:lnTo>
+                  <a:pt x="120000" y="0"/>
+                </a:lnTo>
+                <a:lnTo>
+                  <a:pt x="120000" y="120000"/>
+                </a:lnTo>
+                <a:lnTo>
+                  <a:pt x="0" y="120000"/>
+                </a:lnTo>
+                <a:close/>
+              </a:path>
+            </a:pathLst>
+          </a:custGeom>
+          <a:noFill/>
+          <a:ln w="9525" cap="flat" cmpd="sng">
+            <a:solidFill>
+              <a:srgbClr val="000000"/>
+            </a:solidFill>
+            <a:prstDash val="solid"/>
+            <a:round/>
+            <a:headEnd type="none" w="sm" len="sm"/>
+            <a:tailEnd type="none" w="sm" len="sm"/>
+          </a:ln>
+        </p:spPr>
+      </p:sp>
+    </p:spTree>
+    <p:extLst>
+      <p:ext uri="{BB962C8B-B14F-4D97-AF65-F5344CB8AC3E}">
         <p14:creationId xmlns:p14="http://schemas.microsoft.com/office/powerpoint/2010/main" val="2764593706"/>
       </p:ext>
     </p:extLst>
@@ -2499,7 +2629,7 @@
 </p:notes>
 </file>
 
-<file path=ppt/notesSlides/notesSlide21.xml><?xml version="1.0" encoding="utf-8"?>
+<file path=ppt/notesSlides/notesSlide22.xml><?xml version="1.0" encoding="utf-8"?>
 <p:notes xmlns:a="http://schemas.openxmlformats.org/drawingml/2006/main" xmlns:r="http://schemas.openxmlformats.org/officeDocument/2006/relationships" xmlns:p="http://schemas.openxmlformats.org/presentationml/2006/main" showMasterSp="0" showMasterPhAnim="0">
   <p:cSld>
     <p:spTree>
@@ -2626,7 +2756,7 @@
 </p:notes>
 </file>
 
-<file path=ppt/notesSlides/notesSlide22.xml><?xml version="1.0" encoding="utf-8"?>
+<file path=ppt/notesSlides/notesSlide23.xml><?xml version="1.0" encoding="utf-8"?>
 <p:notes xmlns:a="http://schemas.openxmlformats.org/drawingml/2006/main" xmlns:r="http://schemas.openxmlformats.org/officeDocument/2006/relationships" xmlns:p="http://schemas.openxmlformats.org/presentationml/2006/main" showMasterSp="0" showMasterPhAnim="0">
   <p:cSld>
     <p:spTree>
@@ -2753,7 +2883,7 @@
 </p:notes>
 </file>
 
-<file path=ppt/notesSlides/notesSlide23.xml><?xml version="1.0" encoding="utf-8"?>
+<file path=ppt/notesSlides/notesSlide24.xml><?xml version="1.0" encoding="utf-8"?>
 <p:notes xmlns:a="http://schemas.openxmlformats.org/drawingml/2006/main" xmlns:r="http://schemas.openxmlformats.org/officeDocument/2006/relationships" xmlns:p="http://schemas.openxmlformats.org/presentationml/2006/main" showMasterSp="0" showMasterPhAnim="0">
   <p:cSld>
     <p:spTree>
@@ -2880,7 +3010,134 @@
 </p:notes>
 </file>
 
-<file path=ppt/notesSlides/notesSlide24.xml><?xml version="1.0" encoding="utf-8"?>
+<file path=ppt/notesSlides/notesSlide25.xml><?xml version="1.0" encoding="utf-8"?>
+<p:notes xmlns:a="http://schemas.openxmlformats.org/drawingml/2006/main" xmlns:r="http://schemas.openxmlformats.org/officeDocument/2006/relationships" xmlns:p="http://schemas.openxmlformats.org/presentationml/2006/main" showMasterSp="0" showMasterPhAnim="0">
+  <p:cSld>
+    <p:spTree>
+      <p:nvGrpSpPr>
+        <p:cNvPr id="1" name="Shape 146"/>
+        <p:cNvGrpSpPr/>
+        <p:nvPr/>
+      </p:nvGrpSpPr>
+      <p:grpSpPr>
+        <a:xfrm>
+          <a:off x="0" y="0"/>
+          <a:ext cx="0" cy="0"/>
+          <a:chOff x="0" y="0"/>
+          <a:chExt cx="0" cy="0"/>
+        </a:xfrm>
+      </p:grpSpPr>
+      <p:sp>
+        <p:nvSpPr>
+          <p:cNvPr id="147" name="Google Shape;147;g5c66568b58_0_22:notes"/>
+          <p:cNvSpPr txBox="1">
+            <a:spLocks noGrp="1"/>
+          </p:cNvSpPr>
+          <p:nvPr>
+            <p:ph type="body" idx="1"/>
+          </p:nvPr>
+        </p:nvSpPr>
+        <p:spPr>
+          <a:xfrm>
+            <a:off x="685800" y="4343400"/>
+            <a:ext cx="5486400" cy="4114800"/>
+          </a:xfrm>
+          <a:prstGeom prst="rect">
+            <a:avLst/>
+          </a:prstGeom>
+          <a:noFill/>
+          <a:ln>
+            <a:noFill/>
+          </a:ln>
+        </p:spPr>
+        <p:txBody>
+          <a:bodyPr spcFirstLastPara="1" wrap="square" lIns="91425" tIns="91425" rIns="91425" bIns="91425" anchor="t" anchorCtr="0">
+            <a:noAutofit/>
+          </a:bodyPr>
+          <a:lstStyle/>
+          <a:p>
+            <a:pPr marL="0" lvl="0" indent="0" algn="l" rtl="0">
+              <a:lnSpc>
+                <a:spcPct val="100000"/>
+              </a:lnSpc>
+              <a:spcBef>
+                <a:spcPts val="0"/>
+              </a:spcBef>
+              <a:spcAft>
+                <a:spcPts val="0"/>
+              </a:spcAft>
+              <a:buSzPts val="1400"/>
+              <a:buNone/>
+            </a:pPr>
+            <a:endParaRPr dirty="0"/>
+          </a:p>
+        </p:txBody>
+      </p:sp>
+      <p:sp>
+        <p:nvSpPr>
+          <p:cNvPr id="148" name="Google Shape;148;g5c66568b58_0_22:notes"/>
+          <p:cNvSpPr>
+            <a:spLocks noGrp="1" noRot="1" noChangeAspect="1"/>
+          </p:cNvSpPr>
+          <p:nvPr>
+            <p:ph type="sldImg" idx="2"/>
+          </p:nvPr>
+        </p:nvSpPr>
+        <p:spPr>
+          <a:xfrm>
+            <a:off x="381000" y="685800"/>
+            <a:ext cx="6096000" cy="3429000"/>
+          </a:xfrm>
+          <a:custGeom>
+            <a:avLst/>
+            <a:gdLst/>
+            <a:ahLst/>
+            <a:cxnLst/>
+            <a:rect l="l" t="t" r="r" b="b"/>
+            <a:pathLst>
+              <a:path w="120000" h="120000" extrusionOk="0">
+                <a:moveTo>
+                  <a:pt x="0" y="0"/>
+                </a:moveTo>
+                <a:lnTo>
+                  <a:pt x="120000" y="0"/>
+                </a:lnTo>
+                <a:lnTo>
+                  <a:pt x="120000" y="120000"/>
+                </a:lnTo>
+                <a:lnTo>
+                  <a:pt x="0" y="120000"/>
+                </a:lnTo>
+                <a:close/>
+              </a:path>
+            </a:pathLst>
+          </a:custGeom>
+          <a:noFill/>
+          <a:ln w="9525" cap="flat" cmpd="sng">
+            <a:solidFill>
+              <a:srgbClr val="000000"/>
+            </a:solidFill>
+            <a:prstDash val="solid"/>
+            <a:round/>
+            <a:headEnd type="none" w="sm" len="sm"/>
+            <a:tailEnd type="none" w="sm" len="sm"/>
+          </a:ln>
+        </p:spPr>
+      </p:sp>
+    </p:spTree>
+    <p:extLst>
+      <p:ext uri="{BB962C8B-B14F-4D97-AF65-F5344CB8AC3E}">
+        <p14:creationId xmlns:p14="http://schemas.microsoft.com/office/powerpoint/2010/main" val="1903572536"/>
+      </p:ext>
+    </p:extLst>
+  </p:cSld>
+  <p:clrMapOvr>
+    <a:masterClrMapping/>
+  </p:clrMapOvr>
+</p:notes>
+</file>
+
+<file path=ppt/notesSlides/notesSlide26.xml><?xml version="1.0" encoding="utf-8"?>
 <p:notes xmlns:a="http://schemas.openxmlformats.org/drawingml/2006/main" xmlns:r="http://schemas.openxmlformats.org/officeDocument/2006/relationships" xmlns:p="http://schemas.openxmlformats.org/presentationml/2006/main" showMasterSp="0" showMasterPhAnim="0">
   <p:cSld>
     <p:spTree>
@@ -3002,7 +3259,7 @@
 </p:notes>
 </file>
 
-<file path=ppt/notesSlides/notesSlide25.xml><?xml version="1.0" encoding="utf-8"?>
+<file path=ppt/notesSlides/notesSlide27.xml><?xml version="1.0" encoding="utf-8"?>
 <p:notes xmlns:a="http://schemas.openxmlformats.org/drawingml/2006/main" xmlns:r="http://schemas.openxmlformats.org/officeDocument/2006/relationships" xmlns:p="http://schemas.openxmlformats.org/presentationml/2006/main" showMasterSp="0" showMasterPhAnim="0">
   <p:cSld>
     <p:spTree>
@@ -12604,7 +12861,7 @@
         <p:spPr>
           <a:xfrm>
             <a:off x="658352" y="2678631"/>
-            <a:ext cx="3293888" cy="1619100"/>
+            <a:ext cx="3416692" cy="1619100"/>
           </a:xfrm>
           <a:prstGeom prst="rect">
             <a:avLst/>
@@ -12620,7 +12877,7 @@
           </a:bodyPr>
           <a:lstStyle/>
           <a:p>
-            <a:pPr marL="0" lvl="0" indent="0" algn="l" rtl="0">
+            <a:pPr marL="0" lvl="0" indent="0" rtl="0">
               <a:lnSpc>
                 <a:spcPct val="100000"/>
               </a:lnSpc>
@@ -12677,8 +12934,8 @@
         </p:blipFill>
         <p:spPr>
           <a:xfrm>
-            <a:off x="6402848" y="1046480"/>
-            <a:ext cx="2082800" cy="2082800"/>
+            <a:off x="6202017" y="1429934"/>
+            <a:ext cx="2283631" cy="2283631"/>
           </a:xfrm>
           <a:prstGeom prst="rect">
             <a:avLst/>
@@ -13059,6 +13316,42 @@
           </a:p>
         </p:txBody>
       </p:sp>
+      <p:pic>
+        <p:nvPicPr>
+          <p:cNvPr id="3" name="Gráfico 2">
+            <a:extLst>
+              <a:ext uri="{FF2B5EF4-FFF2-40B4-BE49-F238E27FC236}">
+                <a16:creationId xmlns:a16="http://schemas.microsoft.com/office/drawing/2014/main" id="{029E2FC7-DB0A-154C-BC47-C810839EF64E}"/>
+              </a:ext>
+            </a:extLst>
+          </p:cNvPr>
+          <p:cNvPicPr>
+            <a:picLocks noChangeAspect="1"/>
+          </p:cNvPicPr>
+          <p:nvPr/>
+        </p:nvPicPr>
+        <p:blipFill>
+          <a:blip r:embed="rId3">
+            <a:extLst>
+              <a:ext uri="{96DAC541-7B7A-43D3-8B79-37D633B846F1}">
+                <asvg:svgBlip xmlns:asvg="http://schemas.microsoft.com/office/drawing/2016/SVG/main" r:embed="rId4"/>
+              </a:ext>
+            </a:extLst>
+          </a:blip>
+          <a:stretch>
+            <a:fillRect/>
+          </a:stretch>
+        </p:blipFill>
+        <p:spPr>
+          <a:xfrm>
+            <a:off x="6150782" y="1411356"/>
+            <a:ext cx="2076449" cy="2076449"/>
+          </a:xfrm>
+          <a:prstGeom prst="rect">
+            <a:avLst/>
+          </a:prstGeom>
+        </p:spPr>
+      </p:pic>
     </p:spTree>
   </p:cSld>
   <p:clrMapOvr>
@@ -13179,22 +13472,144 @@
           </a:bodyPr>
           <a:lstStyle/>
           <a:p>
-            <a:pPr marL="0" lvl="0" indent="0" algn="just" rtl="0">
-              <a:lnSpc>
-                <a:spcPct val="100000"/>
-              </a:lnSpc>
-              <a:spcBef>
-                <a:spcPts val="600"/>
-              </a:spcBef>
-              <a:spcAft>
-                <a:spcPts val="0"/>
-              </a:spcAft>
-              <a:buClr>
-                <a:srgbClr val="92D050"/>
-              </a:buClr>
-              <a:buSzPts val="2000"/>
-              <a:buFont typeface="Noto Sans Symbols"/>
-              <a:buNone/>
+            <a:pPr marL="285750" indent="-285750" algn="just">
+              <a:buClr>
+                <a:srgbClr val="00B0F0"/>
+              </a:buClr>
+            </a:pPr>
+            <a:r>
+              <a:rPr lang="pt-PT" sz="1400" dirty="0"/>
+              <a:t>Nesta tarefa são utilizadas ferramentas como o autorefactor, </a:t>
+            </a:r>
+            <a:r>
+              <a:rPr lang="pt-PT" sz="1400" i="1" dirty="0"/>
+              <a:t>IDEs</a:t>
+            </a:r>
+            <a:r>
+              <a:rPr lang="pt-PT" sz="1400" dirty="0"/>
+              <a:t> do </a:t>
+            </a:r>
+            <a:r>
+              <a:rPr lang="pt-PT" sz="1400" i="1" dirty="0"/>
+              <a:t>Java</a:t>
+            </a:r>
+            <a:r>
+              <a:rPr lang="pt-PT" sz="1400" dirty="0"/>
+              <a:t> que suportam </a:t>
+            </a:r>
+            <a:r>
+              <a:rPr lang="pt-PT" sz="1400" i="1" dirty="0"/>
+              <a:t>refactoring</a:t>
+            </a:r>
+            <a:r>
+              <a:rPr lang="pt-PT" sz="1400" dirty="0"/>
+              <a:t>, ou o </a:t>
+            </a:r>
+            <a:r>
+              <a:rPr lang="pt-PT" sz="1400" i="1" dirty="0"/>
+              <a:t>jStanley</a:t>
+            </a:r>
+            <a:r>
+              <a:rPr lang="pt-PT" sz="1400" dirty="0"/>
+              <a:t> para identificar e eliminar os </a:t>
+            </a:r>
+            <a:r>
+              <a:rPr lang="pt-PT" sz="1400" i="1" dirty="0"/>
+              <a:t>bad</a:t>
+            </a:r>
+            <a:r>
+              <a:rPr lang="pt-PT" sz="1400" dirty="0"/>
+              <a:t> </a:t>
+            </a:r>
+            <a:r>
+              <a:rPr lang="pt-PT" sz="1400" i="1" dirty="0"/>
+              <a:t>smells</a:t>
+            </a:r>
+            <a:r>
+              <a:rPr lang="pt-PT" sz="1400" dirty="0"/>
+              <a:t> e </a:t>
+            </a:r>
+            <a:r>
+              <a:rPr lang="pt-PT" sz="1400" i="1" dirty="0"/>
+              <a:t>red</a:t>
+            </a:r>
+            <a:r>
+              <a:rPr lang="pt-PT" sz="1400" dirty="0"/>
+              <a:t> </a:t>
+            </a:r>
+            <a:r>
+              <a:rPr lang="pt-PT" sz="1400" i="1" dirty="0"/>
+              <a:t>smells</a:t>
+            </a:r>
+            <a:r>
+              <a:rPr lang="pt-PT" sz="1400" dirty="0"/>
+              <a:t> existentes no </a:t>
+            </a:r>
+            <a:r>
+              <a:rPr lang="pt-PT" sz="1400" i="1" dirty="0"/>
+              <a:t>software</a:t>
+            </a:r>
+            <a:r>
+              <a:rPr lang="pt-PT" sz="1400" dirty="0"/>
+              <a:t> fornecido.</a:t>
+            </a:r>
+          </a:p>
+          <a:p>
+            <a:pPr marL="285750" indent="-285750" algn="just">
+              <a:buClr>
+                <a:srgbClr val="00B0F0"/>
+              </a:buClr>
+            </a:pPr>
+            <a:endParaRPr lang="pt-PT" sz="1400" dirty="0"/>
+          </a:p>
+          <a:p>
+            <a:pPr marL="285750" indent="-285750" algn="just">
+              <a:buClr>
+                <a:srgbClr val="00B0F0"/>
+              </a:buClr>
+            </a:pPr>
+            <a:r>
+              <a:rPr lang="pt-PT" sz="1400" dirty="0"/>
+              <a:t>É também apresentado um estudo detalhado sobre os </a:t>
+            </a:r>
+            <a:r>
+              <a:rPr lang="pt-PT" sz="1400" i="1" dirty="0"/>
+              <a:t>smells</a:t>
+            </a:r>
+            <a:r>
+              <a:rPr lang="pt-PT" sz="1400" dirty="0"/>
+              <a:t> encontrados nas aplicações fornecidas, os </a:t>
+            </a:r>
+            <a:r>
+              <a:rPr lang="pt-PT" sz="1400" i="1" dirty="0"/>
+              <a:t>refactorings</a:t>
+            </a:r>
+            <a:r>
+              <a:rPr lang="pt-PT" sz="1400" dirty="0"/>
+              <a:t> aplicados e o </a:t>
+            </a:r>
+            <a:r>
+              <a:rPr lang="pt-PT" sz="1400" i="1" dirty="0"/>
+              <a:t>technical</a:t>
+            </a:r>
+            <a:r>
+              <a:rPr lang="pt-PT" sz="1400" dirty="0"/>
+              <a:t> </a:t>
+            </a:r>
+            <a:r>
+              <a:rPr lang="pt-PT" sz="1400" i="1" dirty="0"/>
+              <a:t>debt</a:t>
+            </a:r>
+            <a:r>
+              <a:rPr lang="pt-PT" sz="1400" dirty="0"/>
+              <a:t>. </a:t>
+            </a:r>
+          </a:p>
+          <a:p>
+            <a:pPr marL="285750" indent="-285750" algn="just">
+              <a:buClr>
+                <a:srgbClr val="00B0F0"/>
+              </a:buClr>
             </a:pPr>
             <a:endParaRPr lang="pt-PT" sz="1600" dirty="0"/>
           </a:p>
@@ -13270,6 +13685,42 @@
           </a:p>
         </p:txBody>
       </p:sp>
+      <p:pic>
+        <p:nvPicPr>
+          <p:cNvPr id="3" name="Gráfico 2">
+            <a:extLst>
+              <a:ext uri="{FF2B5EF4-FFF2-40B4-BE49-F238E27FC236}">
+                <a16:creationId xmlns:a16="http://schemas.microsoft.com/office/drawing/2014/main" id="{2D6D31A8-BC0E-1141-8861-157359209B93}"/>
+              </a:ext>
+            </a:extLst>
+          </p:cNvPr>
+          <p:cNvPicPr>
+            <a:picLocks noChangeAspect="1"/>
+          </p:cNvPicPr>
+          <p:nvPr/>
+        </p:nvPicPr>
+        <p:blipFill>
+          <a:blip r:embed="rId3">
+            <a:extLst>
+              <a:ext uri="{96DAC541-7B7A-43D3-8B79-37D633B846F1}">
+                <asvg:svgBlip xmlns:asvg="http://schemas.microsoft.com/office/drawing/2016/SVG/main" r:embed="rId4"/>
+              </a:ext>
+            </a:extLst>
+          </a:blip>
+          <a:stretch>
+            <a:fillRect/>
+          </a:stretch>
+        </p:blipFill>
+        <p:spPr>
+          <a:xfrm>
+            <a:off x="7691694" y="632708"/>
+            <a:ext cx="851533" cy="851533"/>
+          </a:xfrm>
+          <a:prstGeom prst="rect">
+            <a:avLst/>
+          </a:prstGeom>
+        </p:spPr>
+      </p:pic>
     </p:spTree>
     <p:extLst>
       <p:ext uri="{BB962C8B-B14F-4D97-AF65-F5344CB8AC3E}">
@@ -13820,6 +14271,42 @@
           </a:p>
         </p:txBody>
       </p:sp>
+      <p:pic>
+        <p:nvPicPr>
+          <p:cNvPr id="3" name="Gráfico 2">
+            <a:extLst>
+              <a:ext uri="{FF2B5EF4-FFF2-40B4-BE49-F238E27FC236}">
+                <a16:creationId xmlns:a16="http://schemas.microsoft.com/office/drawing/2014/main" id="{36817FB1-5854-1E46-843C-28E7D4F53E61}"/>
+              </a:ext>
+            </a:extLst>
+          </p:cNvPr>
+          <p:cNvPicPr>
+            <a:picLocks noChangeAspect="1"/>
+          </p:cNvPicPr>
+          <p:nvPr/>
+        </p:nvPicPr>
+        <p:blipFill>
+          <a:blip r:embed="rId2">
+            <a:extLst>
+              <a:ext uri="{96DAC541-7B7A-43D3-8B79-37D633B846F1}">
+                <asvg:svgBlip xmlns:asvg="http://schemas.microsoft.com/office/drawing/2016/SVG/main" r:embed="rId3"/>
+              </a:ext>
+            </a:extLst>
+          </a:blip>
+          <a:stretch>
+            <a:fillRect/>
+          </a:stretch>
+        </p:blipFill>
+        <p:spPr>
+          <a:xfrm rot="296767">
+            <a:off x="6413432" y="1535642"/>
+            <a:ext cx="2072216" cy="2072216"/>
+          </a:xfrm>
+          <a:prstGeom prst="rect">
+            <a:avLst/>
+          </a:prstGeom>
+        </p:spPr>
+      </p:pic>
     </p:spTree>
     <p:extLst>
       <p:ext uri="{BB962C8B-B14F-4D97-AF65-F5344CB8AC3E}">
@@ -13945,6 +14432,70 @@
           </a:bodyPr>
           <a:lstStyle/>
           <a:p>
+            <a:r>
+              <a:rPr lang="pt-PT" sz="1400" dirty="0"/>
+              <a:t>Nesta tarefa serão utilizadas técnicas de teste de </a:t>
+            </a:r>
+            <a:r>
+              <a:rPr lang="pt-PT" sz="1400" i="1" dirty="0"/>
+              <a:t>software</a:t>
+            </a:r>
+            <a:r>
+              <a:rPr lang="pt-PT" sz="1400" dirty="0"/>
+              <a:t> para efetuar testes unitários em </a:t>
+            </a:r>
+            <a:r>
+              <a:rPr lang="pt-PT" sz="1400" i="1" dirty="0"/>
+              <a:t>JUnit</a:t>
+            </a:r>
+            <a:r>
+              <a:rPr lang="pt-PT" sz="1400" dirty="0"/>
+              <a:t> e, ainda, o teste de regressão da aplicação </a:t>
+            </a:r>
+            <a:r>
+              <a:rPr lang="pt-PT" sz="1400" i="1" dirty="0"/>
+              <a:t>UmCarroJá</a:t>
+            </a:r>
+            <a:r>
+              <a:rPr lang="pt-PT" sz="1400" dirty="0"/>
+              <a:t>. </a:t>
+            </a:r>
+          </a:p>
+          <a:p>
+            <a:endParaRPr lang="pt-PT" sz="1400" dirty="0"/>
+          </a:p>
+          <a:p>
+            <a:r>
+              <a:rPr lang="pt-PT" sz="1400" dirty="0"/>
+              <a:t>Para além disso, serão utilizadas sistemas para a geração automática de casos de teste para gerar testes unitários e ainda inputs para simular a execução real da aplicação. </a:t>
+            </a:r>
+          </a:p>
+          <a:p>
+            <a:endParaRPr lang="pt-PT" sz="1400" dirty="0"/>
+          </a:p>
+          <a:p>
+            <a:r>
+              <a:rPr lang="pt-PT" sz="1400" dirty="0"/>
+              <a:t>De notar que nesta etapa também se procede à analise de testes unitários através da ferramenta </a:t>
+            </a:r>
+            <a:r>
+              <a:rPr lang="pt-PT" sz="1400" i="1" dirty="0"/>
+              <a:t>JaCoCo</a:t>
+            </a:r>
+            <a:r>
+              <a:rPr lang="pt-PT" sz="1400" dirty="0"/>
+              <a:t>. </a:t>
+            </a:r>
+          </a:p>
+          <a:p>
+            <a:pPr marL="285750" lvl="0" indent="-285750" algn="just"/>
+            <a:endParaRPr lang="pt-PT" sz="1400" dirty="0"/>
+          </a:p>
+          <a:p>
+            <a:pPr marL="285750" lvl="0" indent="-285750" algn="just"/>
+            <a:endParaRPr lang="pt-PT" sz="1400" dirty="0"/>
+          </a:p>
+          <a:p>
             <a:pPr marL="0" lvl="0" indent="0" algn="just" rtl="0">
               <a:lnSpc>
                 <a:spcPct val="100000"/>
@@ -13955,11 +14506,7 @@
               <a:spcAft>
                 <a:spcPts val="0"/>
               </a:spcAft>
-              <a:buClr>
-                <a:srgbClr val="92D050"/>
-              </a:buClr>
               <a:buSzPts val="2000"/>
-              <a:buFont typeface="Noto Sans Symbols"/>
               <a:buNone/>
             </a:pPr>
             <a:endParaRPr lang="pt-PT" sz="1600" dirty="0"/>
@@ -14036,6 +14583,42 @@
           </a:p>
         </p:txBody>
       </p:sp>
+      <p:pic>
+        <p:nvPicPr>
+          <p:cNvPr id="3" name="Gráfico 2">
+            <a:extLst>
+              <a:ext uri="{FF2B5EF4-FFF2-40B4-BE49-F238E27FC236}">
+                <a16:creationId xmlns:a16="http://schemas.microsoft.com/office/drawing/2014/main" id="{FF5AFD96-15DD-A14D-B846-9B14411C8EEC}"/>
+              </a:ext>
+            </a:extLst>
+          </p:cNvPr>
+          <p:cNvPicPr>
+            <a:picLocks noChangeAspect="1"/>
+          </p:cNvPicPr>
+          <p:nvPr/>
+        </p:nvPicPr>
+        <p:blipFill>
+          <a:blip r:embed="rId3">
+            <a:extLst>
+              <a:ext uri="{96DAC541-7B7A-43D3-8B79-37D633B846F1}">
+                <asvg:svgBlip xmlns:asvg="http://schemas.microsoft.com/office/drawing/2016/SVG/main" r:embed="rId4"/>
+              </a:ext>
+            </a:extLst>
+          </a:blip>
+          <a:stretch>
+            <a:fillRect/>
+          </a:stretch>
+        </p:blipFill>
+        <p:spPr>
+          <a:xfrm>
+            <a:off x="7500608" y="470641"/>
+            <a:ext cx="1175667" cy="1175667"/>
+          </a:xfrm>
+          <a:prstGeom prst="rect">
+            <a:avLst/>
+          </a:prstGeom>
+        </p:spPr>
+      </p:pic>
     </p:spTree>
     <p:extLst>
       <p:ext uri="{BB962C8B-B14F-4D97-AF65-F5344CB8AC3E}">
@@ -14142,76 +14725,6 @@
       </p:sp>
       <p:sp>
         <p:nvSpPr>
-          <p:cNvPr id="151" name="Google Shape;151;g5c66568b58_0_22"/>
-          <p:cNvSpPr txBox="1">
-            <a:spLocks noGrp="1"/>
-          </p:cNvSpPr>
-          <p:nvPr>
-            <p:ph type="body" idx="1"/>
-          </p:nvPr>
-        </p:nvSpPr>
-        <p:spPr>
-          <a:xfrm>
-            <a:off x="363018" y="1058479"/>
-            <a:ext cx="6380700" cy="3825300"/>
-          </a:xfrm>
-          <a:prstGeom prst="rect">
-            <a:avLst/>
-          </a:prstGeom>
-          <a:noFill/>
-          <a:ln>
-            <a:noFill/>
-          </a:ln>
-        </p:spPr>
-        <p:txBody>
-          <a:bodyPr spcFirstLastPara="1" wrap="square" lIns="91425" tIns="91425" rIns="91425" bIns="91425" anchor="t" anchorCtr="0">
-            <a:noAutofit/>
-          </a:bodyPr>
-          <a:lstStyle/>
-          <a:p>
-            <a:pPr marL="0" lvl="0" indent="0" algn="just" rtl="0">
-              <a:lnSpc>
-                <a:spcPct val="100000"/>
-              </a:lnSpc>
-              <a:spcBef>
-                <a:spcPts val="600"/>
-              </a:spcBef>
-              <a:spcAft>
-                <a:spcPts val="0"/>
-              </a:spcAft>
-              <a:buClr>
-                <a:srgbClr val="92D050"/>
-              </a:buClr>
-              <a:buSzPts val="2000"/>
-              <a:buFont typeface="Noto Sans Symbols"/>
-              <a:buNone/>
-            </a:pPr>
-            <a:endParaRPr lang="pt-PT" sz="1600" dirty="0"/>
-          </a:p>
-          <a:p>
-            <a:pPr marL="457200" lvl="0" indent="-355600" algn="just" rtl="0">
-              <a:lnSpc>
-                <a:spcPct val="100000"/>
-              </a:lnSpc>
-              <a:spcBef>
-                <a:spcPts val="600"/>
-              </a:spcBef>
-              <a:spcAft>
-                <a:spcPts val="0"/>
-              </a:spcAft>
-              <a:buClr>
-                <a:srgbClr val="FFC107"/>
-              </a:buClr>
-              <a:buSzPts val="2000"/>
-              <a:buFont typeface="Noto Sans Symbols"/>
-              <a:buChar char="▪"/>
-            </a:pPr>
-            <a:endParaRPr lang="pt-PT" sz="1200" dirty="0"/>
-          </a:p>
-        </p:txBody>
-      </p:sp>
-      <p:sp>
-        <p:nvSpPr>
           <p:cNvPr id="152" name="Google Shape;152;g5c66568b58_0_22"/>
           <p:cNvSpPr txBox="1">
             <a:spLocks noGrp="1"/>
@@ -14260,6 +14773,223 @@
           </a:p>
         </p:txBody>
       </p:sp>
+      <p:sp>
+        <p:nvSpPr>
+          <p:cNvPr id="8" name="Google Shape;151;g5c66568b58_0_22">
+            <a:extLst>
+              <a:ext uri="{FF2B5EF4-FFF2-40B4-BE49-F238E27FC236}">
+                <a16:creationId xmlns:a16="http://schemas.microsoft.com/office/drawing/2014/main" id="{5ED6815A-1522-634C-B29F-E4AFF318E894}"/>
+              </a:ext>
+            </a:extLst>
+          </p:cNvPr>
+          <p:cNvSpPr txBox="1">
+            <a:spLocks noGrp="1"/>
+          </p:cNvSpPr>
+          <p:nvPr>
+            <p:ph type="body" idx="1"/>
+          </p:nvPr>
+        </p:nvSpPr>
+        <p:spPr>
+          <a:xfrm>
+            <a:off x="363018" y="1058479"/>
+            <a:ext cx="6380700" cy="3825300"/>
+          </a:xfrm>
+          <a:prstGeom prst="rect">
+            <a:avLst/>
+          </a:prstGeom>
+          <a:noFill/>
+          <a:ln>
+            <a:noFill/>
+          </a:ln>
+        </p:spPr>
+        <p:txBody>
+          <a:bodyPr spcFirstLastPara="1" wrap="square" lIns="91425" tIns="91425" rIns="91425" bIns="91425" anchor="t" anchorCtr="0">
+            <a:noAutofit/>
+          </a:bodyPr>
+          <a:lstStyle/>
+          <a:p>
+            <a:pPr marL="285750" indent="-285750"/>
+            <a:r>
+              <a:rPr lang="pt-PT" sz="1400" dirty="0"/>
+              <a:t>Nesta sub-tarefa foi-nos proposto gerar automaticamente ficheiros de </a:t>
+            </a:r>
+            <a:r>
+              <a:rPr lang="pt-PT" sz="1400" i="1" dirty="0"/>
+              <a:t>logs</a:t>
+            </a:r>
+            <a:r>
+              <a:rPr lang="pt-PT" sz="1400" dirty="0"/>
+              <a:t> para testar a aplicação </a:t>
+            </a:r>
+            <a:r>
+              <a:rPr lang="pt-PT" sz="1400" i="1" dirty="0"/>
+              <a:t>UmCarroJá</a:t>
+            </a:r>
+            <a:r>
+              <a:rPr lang="pt-PT" sz="1400" dirty="0"/>
+              <a:t>. </a:t>
+            </a:r>
+          </a:p>
+          <a:p>
+            <a:pPr marL="285750" indent="-285750"/>
+            <a:endParaRPr lang="pt-PT" sz="1400" dirty="0"/>
+          </a:p>
+          <a:p>
+            <a:pPr marL="285750" indent="-285750"/>
+            <a:r>
+              <a:rPr lang="pt-PT" sz="1400" dirty="0"/>
+              <a:t>A implementação do gerador pretendido segue, naturalmente, a estrutura apresentada pelo exemplo disponibilizado pelos docentes na página da disciplina. Como tal, foi necessário criar essencialmente 5 tipos de geradores, cada um com o seu tipo de dados:</a:t>
+            </a:r>
+          </a:p>
+          <a:p>
+            <a:pPr marL="742950" lvl="1" indent="-285750"/>
+            <a:r>
+              <a:rPr lang="pt-PT" sz="1400" b="1" i="1" dirty="0"/>
+              <a:t>NovoProp</a:t>
+            </a:r>
+            <a:r>
+              <a:rPr lang="pt-PT" sz="1400" dirty="0"/>
+              <a:t>: registo de um novo proprietário;</a:t>
+            </a:r>
+          </a:p>
+          <a:p>
+            <a:pPr marL="742950" lvl="1" indent="-285750"/>
+            <a:r>
+              <a:rPr lang="pt-PT" sz="1400" b="1" i="1" dirty="0"/>
+              <a:t>NovoCliente</a:t>
+            </a:r>
+            <a:r>
+              <a:rPr lang="pt-PT" sz="1400" dirty="0"/>
+              <a:t>: registo de um novo cliente;</a:t>
+            </a:r>
+          </a:p>
+          <a:p>
+            <a:pPr marL="742950" lvl="1" indent="-285750"/>
+            <a:r>
+              <a:rPr lang="pt-PT" sz="1400" b="1" i="1" dirty="0"/>
+              <a:t>NovoCarro</a:t>
+            </a:r>
+            <a:r>
+              <a:rPr lang="pt-PT" sz="1400" dirty="0"/>
+              <a:t>: registo de um novo carro;</a:t>
+            </a:r>
+          </a:p>
+          <a:p>
+            <a:pPr marL="742950" lvl="1" indent="-285750"/>
+            <a:r>
+              <a:rPr lang="pt-PT" sz="1400" b="1" i="1" dirty="0"/>
+              <a:t>Aluguer</a:t>
+            </a:r>
+            <a:r>
+              <a:rPr lang="pt-PT" sz="1400" dirty="0"/>
+              <a:t>: registo de um aluguer efetuado por um cliente;</a:t>
+            </a:r>
+          </a:p>
+          <a:p>
+            <a:pPr marL="742950" lvl="1" indent="-285750"/>
+            <a:r>
+              <a:rPr lang="pt-PT" sz="1400" b="1" i="1" dirty="0"/>
+              <a:t>Classificar</a:t>
+            </a:r>
+            <a:r>
+              <a:rPr lang="pt-PT" sz="1400" dirty="0"/>
+              <a:t>: classificação atribuída a um carro ou a um cliente/proprietário.</a:t>
+            </a:r>
+            <a:br>
+              <a:rPr lang="pt-PT" sz="1400" dirty="0"/>
+            </a:br>
+            <a:endParaRPr lang="pt-PT" sz="1400" dirty="0"/>
+          </a:p>
+          <a:p>
+            <a:pPr marL="742950" lvl="1" indent="-285750"/>
+            <a:endParaRPr lang="pt-PT" sz="1400" dirty="0"/>
+          </a:p>
+          <a:p>
+            <a:pPr marL="285750" indent="-285750"/>
+            <a:endParaRPr lang="pt-PT" sz="1400" dirty="0"/>
+          </a:p>
+          <a:p>
+            <a:pPr marL="285750" lvl="0" indent="-285750"/>
+            <a:endParaRPr lang="pt-PT" sz="1400" dirty="0"/>
+          </a:p>
+          <a:p>
+            <a:pPr marL="285750" lvl="0" indent="-285750" algn="just"/>
+            <a:endParaRPr lang="pt-PT" sz="1400" dirty="0"/>
+          </a:p>
+          <a:p>
+            <a:pPr marL="0" lvl="0" indent="0" algn="just" rtl="0">
+              <a:lnSpc>
+                <a:spcPct val="100000"/>
+              </a:lnSpc>
+              <a:spcBef>
+                <a:spcPts val="600"/>
+              </a:spcBef>
+              <a:spcAft>
+                <a:spcPts val="0"/>
+              </a:spcAft>
+              <a:buSzPts val="2000"/>
+              <a:buNone/>
+            </a:pPr>
+            <a:endParaRPr lang="pt-PT" sz="1600" dirty="0"/>
+          </a:p>
+          <a:p>
+            <a:pPr marL="457200" lvl="0" indent="-355600" algn="just" rtl="0">
+              <a:lnSpc>
+                <a:spcPct val="100000"/>
+              </a:lnSpc>
+              <a:spcBef>
+                <a:spcPts val="600"/>
+              </a:spcBef>
+              <a:spcAft>
+                <a:spcPts val="0"/>
+              </a:spcAft>
+              <a:buClr>
+                <a:srgbClr val="FFC107"/>
+              </a:buClr>
+              <a:buSzPts val="2000"/>
+              <a:buFont typeface="Noto Sans Symbols"/>
+              <a:buChar char="▪"/>
+            </a:pPr>
+            <a:endParaRPr lang="pt-PT" sz="1200" dirty="0"/>
+          </a:p>
+        </p:txBody>
+      </p:sp>
+      <p:pic>
+        <p:nvPicPr>
+          <p:cNvPr id="10" name="Gráfico 9">
+            <a:extLst>
+              <a:ext uri="{FF2B5EF4-FFF2-40B4-BE49-F238E27FC236}">
+                <a16:creationId xmlns:a16="http://schemas.microsoft.com/office/drawing/2014/main" id="{4E432A94-A668-3940-94AF-3AD756AB5812}"/>
+              </a:ext>
+            </a:extLst>
+          </p:cNvPr>
+          <p:cNvPicPr>
+            <a:picLocks noChangeAspect="1"/>
+          </p:cNvPicPr>
+          <p:nvPr/>
+        </p:nvPicPr>
+        <p:blipFill>
+          <a:blip r:embed="rId3">
+            <a:extLst>
+              <a:ext uri="{96DAC541-7B7A-43D3-8B79-37D633B846F1}">
+                <asvg:svgBlip xmlns:asvg="http://schemas.microsoft.com/office/drawing/2016/SVG/main" r:embed="rId4"/>
+              </a:ext>
+            </a:extLst>
+          </a:blip>
+          <a:stretch>
+            <a:fillRect/>
+          </a:stretch>
+        </p:blipFill>
+        <p:spPr>
+          <a:xfrm>
+            <a:off x="7566016" y="246242"/>
+            <a:ext cx="1214966" cy="1214966"/>
+          </a:xfrm>
+          <a:prstGeom prst="rect">
+            <a:avLst/>
+          </a:prstGeom>
+        </p:spPr>
+      </p:pic>
     </p:spTree>
     <p:extLst>
       <p:ext uri="{BB962C8B-B14F-4D97-AF65-F5344CB8AC3E}">
@@ -14478,83 +15208,13 @@
                   <a:schemeClr val="bg2"/>
                 </a:solidFill>
               </a:rPr>
-              <a:t>demo1</a:t>
+              <a:t>QuickCheck</a:t>
             </a:r>
             <a:endParaRPr i="1" dirty="0">
               <a:solidFill>
                 <a:schemeClr val="bg2"/>
               </a:solidFill>
             </a:endParaRPr>
-          </a:p>
-        </p:txBody>
-      </p:sp>
-      <p:sp>
-        <p:nvSpPr>
-          <p:cNvPr id="151" name="Google Shape;151;g5c66568b58_0_22"/>
-          <p:cNvSpPr txBox="1">
-            <a:spLocks noGrp="1"/>
-          </p:cNvSpPr>
-          <p:nvPr>
-            <p:ph type="body" idx="1"/>
-          </p:nvPr>
-        </p:nvSpPr>
-        <p:spPr>
-          <a:xfrm>
-            <a:off x="363018" y="1058479"/>
-            <a:ext cx="6380700" cy="3825300"/>
-          </a:xfrm>
-          <a:prstGeom prst="rect">
-            <a:avLst/>
-          </a:prstGeom>
-          <a:noFill/>
-          <a:ln>
-            <a:noFill/>
-          </a:ln>
-        </p:spPr>
-        <p:txBody>
-          <a:bodyPr spcFirstLastPara="1" wrap="square" lIns="91425" tIns="91425" rIns="91425" bIns="91425" anchor="t" anchorCtr="0">
-            <a:noAutofit/>
-          </a:bodyPr>
-          <a:lstStyle/>
-          <a:p>
-            <a:pPr marL="0" lvl="0" indent="0" algn="just" rtl="0">
-              <a:lnSpc>
-                <a:spcPct val="100000"/>
-              </a:lnSpc>
-              <a:spcBef>
-                <a:spcPts val="600"/>
-              </a:spcBef>
-              <a:spcAft>
-                <a:spcPts val="0"/>
-              </a:spcAft>
-              <a:buClr>
-                <a:srgbClr val="92D050"/>
-              </a:buClr>
-              <a:buSzPts val="2000"/>
-              <a:buFont typeface="Noto Sans Symbols"/>
-              <a:buNone/>
-            </a:pPr>
-            <a:endParaRPr lang="pt-PT" sz="1600" dirty="0"/>
-          </a:p>
-          <a:p>
-            <a:pPr marL="457200" lvl="0" indent="-355600" algn="just" rtl="0">
-              <a:lnSpc>
-                <a:spcPct val="100000"/>
-              </a:lnSpc>
-              <a:spcBef>
-                <a:spcPts val="600"/>
-              </a:spcBef>
-              <a:spcAft>
-                <a:spcPts val="0"/>
-              </a:spcAft>
-              <a:buClr>
-                <a:srgbClr val="FFC107"/>
-              </a:buClr>
-              <a:buSzPts val="2000"/>
-              <a:buFont typeface="Noto Sans Symbols"/>
-              <a:buChar char="▪"/>
-            </a:pPr>
-            <a:endParaRPr lang="pt-PT" sz="1200" dirty="0"/>
           </a:p>
         </p:txBody>
       </p:sp>
@@ -14608,10 +15268,183 @@
           </a:p>
         </p:txBody>
       </p:sp>
+      <p:sp>
+        <p:nvSpPr>
+          <p:cNvPr id="8" name="Google Shape;151;g5c66568b58_0_22">
+            <a:extLst>
+              <a:ext uri="{FF2B5EF4-FFF2-40B4-BE49-F238E27FC236}">
+                <a16:creationId xmlns:a16="http://schemas.microsoft.com/office/drawing/2014/main" id="{5ED6815A-1522-634C-B29F-E4AFF318E894}"/>
+              </a:ext>
+            </a:extLst>
+          </p:cNvPr>
+          <p:cNvSpPr txBox="1">
+            <a:spLocks noGrp="1"/>
+          </p:cNvSpPr>
+          <p:nvPr>
+            <p:ph type="body" idx="1"/>
+          </p:nvPr>
+        </p:nvSpPr>
+        <p:spPr>
+          <a:xfrm>
+            <a:off x="363018" y="1058479"/>
+            <a:ext cx="6380700" cy="3825300"/>
+          </a:xfrm>
+          <a:prstGeom prst="rect">
+            <a:avLst/>
+          </a:prstGeom>
+          <a:noFill/>
+          <a:ln>
+            <a:noFill/>
+          </a:ln>
+        </p:spPr>
+        <p:txBody>
+          <a:bodyPr spcFirstLastPara="1" wrap="square" lIns="91425" tIns="91425" rIns="91425" bIns="91425" anchor="t" anchorCtr="0">
+            <a:noAutofit/>
+          </a:bodyPr>
+          <a:lstStyle/>
+          <a:p>
+            <a:pPr marL="285750" indent="-285750"/>
+            <a:r>
+              <a:rPr lang="pt-PT" sz="1400" dirty="0"/>
+              <a:t>Por forma a garantir uma grande variedade de atributos, a maior parte dos geradores implementados utiliza o combinador </a:t>
+            </a:r>
+            <a:r>
+              <a:rPr lang="pt-PT" sz="1400" i="1" dirty="0"/>
+              <a:t>frequency</a:t>
+            </a:r>
+            <a:r>
+              <a:rPr lang="pt-PT" sz="1400" dirty="0"/>
+              <a:t>. </a:t>
+            </a:r>
+          </a:p>
+          <a:p>
+            <a:pPr marL="285750" indent="-285750"/>
+            <a:endParaRPr lang="pt-PT" sz="1400" dirty="0"/>
+          </a:p>
+          <a:p>
+            <a:pPr marL="285750" indent="-285750"/>
+            <a:r>
+              <a:rPr lang="pt-PT" sz="1400" dirty="0"/>
+              <a:t>Cada um dos cinco geradores mencionados anteriormente estão devidamente parametrizados, tal como é sugerido no enunciado deste projeto.</a:t>
+            </a:r>
+          </a:p>
+          <a:p>
+            <a:pPr marL="285750" indent="-285750"/>
+            <a:endParaRPr lang="pt-PT" sz="1400" dirty="0"/>
+          </a:p>
+          <a:p>
+            <a:pPr marL="285750" indent="-285750"/>
+            <a:r>
+              <a:rPr lang="pt-PT" sz="1400" dirty="0"/>
+              <a:t>De notar também que os elementos deste grupo tiveram em consideração a geração de NIF’s e de matrículas </a:t>
+            </a:r>
+            <a:r>
+              <a:rPr lang="pt-PT" sz="1400" u="sng" dirty="0"/>
+              <a:t>sem repetições</a:t>
+            </a:r>
+            <a:r>
+              <a:rPr lang="pt-PT" sz="1400" dirty="0"/>
+              <a:t>, permitindo assim uma simulação fidedigna e correta da aplicação.</a:t>
+            </a:r>
+            <a:br>
+              <a:rPr lang="pt-PT" sz="1400" dirty="0"/>
+            </a:br>
+            <a:endParaRPr lang="pt-PT" sz="1400" dirty="0"/>
+          </a:p>
+          <a:p>
+            <a:pPr marL="742950" lvl="1" indent="-285750"/>
+            <a:endParaRPr lang="pt-PT" sz="1400" dirty="0"/>
+          </a:p>
+          <a:p>
+            <a:pPr marL="285750" indent="-285750"/>
+            <a:endParaRPr lang="pt-PT" sz="1400" dirty="0"/>
+          </a:p>
+          <a:p>
+            <a:pPr marL="285750" lvl="0" indent="-285750"/>
+            <a:endParaRPr lang="pt-PT" sz="1400" dirty="0"/>
+          </a:p>
+          <a:p>
+            <a:pPr marL="285750" lvl="0" indent="-285750" algn="just"/>
+            <a:endParaRPr lang="pt-PT" sz="1400" dirty="0"/>
+          </a:p>
+          <a:p>
+            <a:pPr marL="0" lvl="0" indent="0" algn="just" rtl="0">
+              <a:lnSpc>
+                <a:spcPct val="100000"/>
+              </a:lnSpc>
+              <a:spcBef>
+                <a:spcPts val="600"/>
+              </a:spcBef>
+              <a:spcAft>
+                <a:spcPts val="0"/>
+              </a:spcAft>
+              <a:buSzPts val="2000"/>
+              <a:buNone/>
+            </a:pPr>
+            <a:endParaRPr lang="pt-PT" sz="1600" dirty="0"/>
+          </a:p>
+          <a:p>
+            <a:pPr marL="457200" lvl="0" indent="-355600" algn="just" rtl="0">
+              <a:lnSpc>
+                <a:spcPct val="100000"/>
+              </a:lnSpc>
+              <a:spcBef>
+                <a:spcPts val="600"/>
+              </a:spcBef>
+              <a:spcAft>
+                <a:spcPts val="0"/>
+              </a:spcAft>
+              <a:buClr>
+                <a:srgbClr val="FFC107"/>
+              </a:buClr>
+              <a:buSzPts val="2000"/>
+              <a:buFont typeface="Noto Sans Symbols"/>
+              <a:buChar char="▪"/>
+            </a:pPr>
+            <a:endParaRPr lang="pt-PT" sz="1200" dirty="0"/>
+          </a:p>
+        </p:txBody>
+      </p:sp>
+      <p:pic>
+        <p:nvPicPr>
+          <p:cNvPr id="3" name="Gráfico 2">
+            <a:extLst>
+              <a:ext uri="{FF2B5EF4-FFF2-40B4-BE49-F238E27FC236}">
+                <a16:creationId xmlns:a16="http://schemas.microsoft.com/office/drawing/2014/main" id="{52D7D8F1-5633-5B4E-AF0C-5EBEAED163F0}"/>
+              </a:ext>
+            </a:extLst>
+          </p:cNvPr>
+          <p:cNvPicPr>
+            <a:picLocks noChangeAspect="1"/>
+          </p:cNvPicPr>
+          <p:nvPr/>
+        </p:nvPicPr>
+        <p:blipFill>
+          <a:blip r:embed="rId3">
+            <a:extLst>
+              <a:ext uri="{96DAC541-7B7A-43D3-8B79-37D633B846F1}">
+                <asvg:svgBlip xmlns:asvg="http://schemas.microsoft.com/office/drawing/2016/SVG/main" r:embed="rId4"/>
+              </a:ext>
+            </a:extLst>
+          </a:blip>
+          <a:stretch>
+            <a:fillRect/>
+          </a:stretch>
+        </p:blipFill>
+        <p:spPr>
+          <a:xfrm>
+            <a:off x="7566016" y="246242"/>
+            <a:ext cx="1214966" cy="1214966"/>
+          </a:xfrm>
+          <a:prstGeom prst="rect">
+            <a:avLst/>
+          </a:prstGeom>
+        </p:spPr>
+      </p:pic>
     </p:spTree>
     <p:extLst>
       <p:ext uri="{BB962C8B-B14F-4D97-AF65-F5344CB8AC3E}">
-        <p14:creationId xmlns:p14="http://schemas.microsoft.com/office/powerpoint/2010/main" val="2533278709"/>
+        <p14:creationId xmlns:p14="http://schemas.microsoft.com/office/powerpoint/2010/main" val="3830535970"/>
       </p:ext>
     </p:extLst>
   </p:cSld>
@@ -14622,6 +15455,155 @@
 </file>
 
 <file path=ppt/slides/slide21.xml><?xml version="1.0" encoding="utf-8"?>
+<p:sld xmlns:a="http://schemas.openxmlformats.org/drawingml/2006/main" xmlns:r="http://schemas.openxmlformats.org/officeDocument/2006/relationships" xmlns:p="http://schemas.openxmlformats.org/presentationml/2006/main">
+  <p:cSld>
+    <p:bg>
+      <p:bgPr>
+        <a:solidFill>
+          <a:schemeClr val="bg2"/>
+        </a:solidFill>
+        <a:effectLst/>
+      </p:bgPr>
+    </p:bg>
+    <p:spTree>
+      <p:nvGrpSpPr>
+        <p:cNvPr id="1" name=""/>
+        <p:cNvGrpSpPr/>
+        <p:nvPr/>
+      </p:nvGrpSpPr>
+      <p:grpSpPr>
+        <a:xfrm>
+          <a:off x="0" y="0"/>
+          <a:ext cx="0" cy="0"/>
+          <a:chOff x="0" y="0"/>
+          <a:chExt cx="0" cy="0"/>
+        </a:xfrm>
+      </p:grpSpPr>
+      <p:sp>
+        <p:nvSpPr>
+          <p:cNvPr id="4" name="Google Shape;125;g5c6a9ecd04_0_47">
+            <a:extLst>
+              <a:ext uri="{FF2B5EF4-FFF2-40B4-BE49-F238E27FC236}">
+                <a16:creationId xmlns:a16="http://schemas.microsoft.com/office/drawing/2014/main" id="{FDCEF2F6-B419-4443-9D0A-7219AF2A2F17}"/>
+              </a:ext>
+            </a:extLst>
+          </p:cNvPr>
+          <p:cNvSpPr txBox="1">
+            <a:spLocks noGrp="1"/>
+          </p:cNvSpPr>
+          <p:nvPr>
+            <p:ph type="ctrTitle"/>
+          </p:nvPr>
+        </p:nvSpPr>
+        <p:spPr>
+          <a:xfrm>
+            <a:off x="658352" y="2678631"/>
+            <a:ext cx="2770648" cy="1619100"/>
+          </a:xfrm>
+          <a:prstGeom prst="rect">
+            <a:avLst/>
+          </a:prstGeom>
+          <a:noFill/>
+          <a:ln>
+            <a:noFill/>
+          </a:ln>
+        </p:spPr>
+        <p:txBody>
+          <a:bodyPr spcFirstLastPara="1" wrap="square" lIns="91425" tIns="91425" rIns="91425" bIns="91425" anchor="b" anchorCtr="0">
+            <a:noAutofit/>
+          </a:bodyPr>
+          <a:lstStyle/>
+          <a:p>
+            <a:pPr marL="0" lvl="0" indent="0" algn="l" rtl="0">
+              <a:lnSpc>
+                <a:spcPct val="100000"/>
+              </a:lnSpc>
+              <a:spcBef>
+                <a:spcPts val="0"/>
+              </a:spcBef>
+              <a:spcAft>
+                <a:spcPts val="0"/>
+              </a:spcAft>
+              <a:buSzPts val="3000"/>
+              <a:buNone/>
+            </a:pPr>
+            <a:r>
+              <a:rPr lang="en" sz="5000" dirty="0">
+                <a:solidFill>
+                  <a:schemeClr val="bg2"/>
+                </a:solidFill>
+              </a:rPr>
+              <a:t>Demo</a:t>
+            </a:r>
+            <a:endParaRPr sz="5000" dirty="0">
+              <a:solidFill>
+                <a:schemeClr val="bg2"/>
+              </a:solidFill>
+            </a:endParaRPr>
+          </a:p>
+        </p:txBody>
+      </p:sp>
+      <p:pic>
+        <p:nvPicPr>
+          <p:cNvPr id="1026" name="Picture 2">
+            <a:extLst>
+              <a:ext uri="{FF2B5EF4-FFF2-40B4-BE49-F238E27FC236}">
+                <a16:creationId xmlns:a16="http://schemas.microsoft.com/office/drawing/2014/main" id="{D1255B4B-3ECC-3D48-A159-7D2656067612}"/>
+              </a:ext>
+            </a:extLst>
+          </p:cNvPr>
+          <p:cNvPicPr>
+            <a:picLocks noChangeAspect="1" noChangeArrowheads="1"/>
+          </p:cNvPicPr>
+          <p:nvPr/>
+        </p:nvPicPr>
+        <p:blipFill>
+          <a:blip r:embed="rId2">
+            <a:extLst>
+              <a:ext uri="{28A0092B-C50C-407E-A947-70E740481C1C}">
+                <a14:useLocalDpi xmlns:a14="http://schemas.microsoft.com/office/drawing/2010/main" val="0"/>
+              </a:ext>
+            </a:extLst>
+          </a:blip>
+          <a:srcRect/>
+          <a:stretch>
+            <a:fillRect/>
+          </a:stretch>
+        </p:blipFill>
+        <p:spPr bwMode="auto">
+          <a:xfrm>
+            <a:off x="5429249" y="910166"/>
+            <a:ext cx="3323167" cy="3323167"/>
+          </a:xfrm>
+          <a:prstGeom prst="rect">
+            <a:avLst/>
+          </a:prstGeom>
+          <a:noFill/>
+          <a:extLst>
+            <a:ext uri="{909E8E84-426E-40DD-AFC4-6F175D3DCCD1}">
+              <a14:hiddenFill xmlns:a14="http://schemas.microsoft.com/office/drawing/2010/main">
+                <a:solidFill>
+                  <a:srgbClr val="FFFFFF"/>
+                </a:solidFill>
+              </a14:hiddenFill>
+            </a:ext>
+          </a:extLst>
+        </p:spPr>
+      </p:pic>
+    </p:spTree>
+    <p:extLst>
+      <p:ext uri="{BB962C8B-B14F-4D97-AF65-F5344CB8AC3E}">
+        <p14:creationId xmlns:p14="http://schemas.microsoft.com/office/powerpoint/2010/main" val="2335468340"/>
+      </p:ext>
+    </p:extLst>
+  </p:cSld>
+  <p:clrMapOvr>
+    <a:masterClrMapping/>
+  </p:clrMapOvr>
+</p:sld>
+</file>
+
+<file path=ppt/slides/slide22.xml><?xml version="1.0" encoding="utf-8"?>
 <p:sld xmlns:a="http://schemas.openxmlformats.org/drawingml/2006/main" xmlns:r="http://schemas.openxmlformats.org/officeDocument/2006/relationships" xmlns:p="http://schemas.openxmlformats.org/presentationml/2006/main">
   <p:cSld>
     <p:bg>
@@ -14702,7 +15684,7 @@
                   <a:schemeClr val="bg2"/>
                 </a:solidFill>
               </a:rPr>
-              <a:t>demo2</a:t>
+              <a:t>demo1</a:t>
             </a:r>
             <a:endParaRPr i="1" dirty="0">
               <a:solidFill>
@@ -14826,7 +15808,231 @@
             </a:pPr>
             <a:fld id="{00000000-1234-1234-1234-123412341234}" type="slidenum">
               <a:rPr lang="en"/>
-              <a:t>21</a:t>
+              <a:t>22</a:t>
+            </a:fld>
+            <a:endParaRPr dirty="0"/>
+          </a:p>
+        </p:txBody>
+      </p:sp>
+    </p:spTree>
+    <p:extLst>
+      <p:ext uri="{BB962C8B-B14F-4D97-AF65-F5344CB8AC3E}">
+        <p14:creationId xmlns:p14="http://schemas.microsoft.com/office/powerpoint/2010/main" val="2533278709"/>
+      </p:ext>
+    </p:extLst>
+  </p:cSld>
+  <p:clrMapOvr>
+    <a:masterClrMapping/>
+  </p:clrMapOvr>
+</p:sld>
+</file>
+
+<file path=ppt/slides/slide23.xml><?xml version="1.0" encoding="utf-8"?>
+<p:sld xmlns:a="http://schemas.openxmlformats.org/drawingml/2006/main" xmlns:r="http://schemas.openxmlformats.org/officeDocument/2006/relationships" xmlns:p="http://schemas.openxmlformats.org/presentationml/2006/main">
+  <p:cSld>
+    <p:bg>
+      <p:bgPr>
+        <a:solidFill>
+          <a:schemeClr val="bg2"/>
+        </a:solidFill>
+        <a:effectLst/>
+      </p:bgPr>
+    </p:bg>
+    <p:spTree>
+      <p:nvGrpSpPr>
+        <p:cNvPr id="1" name="Shape 149"/>
+        <p:cNvGrpSpPr/>
+        <p:nvPr/>
+      </p:nvGrpSpPr>
+      <p:grpSpPr>
+        <a:xfrm>
+          <a:off x="0" y="0"/>
+          <a:ext cx="0" cy="0"/>
+          <a:chOff x="0" y="0"/>
+          <a:chExt cx="0" cy="0"/>
+        </a:xfrm>
+      </p:grpSpPr>
+      <p:sp>
+        <p:nvSpPr>
+          <p:cNvPr id="150" name="Google Shape;150;g5c66568b58_0_22"/>
+          <p:cNvSpPr txBox="1">
+            <a:spLocks noGrp="1"/>
+          </p:cNvSpPr>
+          <p:nvPr>
+            <p:ph type="title"/>
+          </p:nvPr>
+        </p:nvSpPr>
+        <p:spPr>
+          <a:xfrm>
+            <a:off x="467725" y="648975"/>
+            <a:ext cx="4963800" cy="409500"/>
+          </a:xfrm>
+          <a:prstGeom prst="rect">
+            <a:avLst/>
+          </a:prstGeom>
+          <a:noFill/>
+          <a:ln>
+            <a:noFill/>
+          </a:ln>
+        </p:spPr>
+        <p:txBody>
+          <a:bodyPr spcFirstLastPara="1" wrap="square" lIns="91425" tIns="91425" rIns="91425" bIns="91425" anchor="b" anchorCtr="0">
+            <a:noAutofit/>
+          </a:bodyPr>
+          <a:lstStyle/>
+          <a:p>
+            <a:pPr marL="0" lvl="0" indent="0" algn="l" rtl="0">
+              <a:lnSpc>
+                <a:spcPct val="100000"/>
+              </a:lnSpc>
+              <a:spcBef>
+                <a:spcPts val="0"/>
+              </a:spcBef>
+              <a:spcAft>
+                <a:spcPts val="0"/>
+              </a:spcAft>
+              <a:buSzPts val="2400"/>
+              <a:buNone/>
+            </a:pPr>
+            <a:r>
+              <a:rPr lang="en" dirty="0">
+                <a:solidFill>
+                  <a:schemeClr val="bg2"/>
+                </a:solidFill>
+              </a:rPr>
+              <a:t>Tarefa 3 – </a:t>
+            </a:r>
+            <a:r>
+              <a:rPr lang="en" i="1" dirty="0">
+                <a:solidFill>
+                  <a:schemeClr val="bg2"/>
+                </a:solidFill>
+              </a:rPr>
+              <a:t>demo2</a:t>
+            </a:r>
+            <a:endParaRPr i="1" dirty="0">
+              <a:solidFill>
+                <a:schemeClr val="bg2"/>
+              </a:solidFill>
+            </a:endParaRPr>
+          </a:p>
+        </p:txBody>
+      </p:sp>
+      <p:sp>
+        <p:nvSpPr>
+          <p:cNvPr id="151" name="Google Shape;151;g5c66568b58_0_22"/>
+          <p:cNvSpPr txBox="1">
+            <a:spLocks noGrp="1"/>
+          </p:cNvSpPr>
+          <p:nvPr>
+            <p:ph type="body" idx="1"/>
+          </p:nvPr>
+        </p:nvSpPr>
+        <p:spPr>
+          <a:xfrm>
+            <a:off x="363018" y="1058479"/>
+            <a:ext cx="6380700" cy="3825300"/>
+          </a:xfrm>
+          <a:prstGeom prst="rect">
+            <a:avLst/>
+          </a:prstGeom>
+          <a:noFill/>
+          <a:ln>
+            <a:noFill/>
+          </a:ln>
+        </p:spPr>
+        <p:txBody>
+          <a:bodyPr spcFirstLastPara="1" wrap="square" lIns="91425" tIns="91425" rIns="91425" bIns="91425" anchor="t" anchorCtr="0">
+            <a:noAutofit/>
+          </a:bodyPr>
+          <a:lstStyle/>
+          <a:p>
+            <a:pPr marL="0" lvl="0" indent="0" algn="just" rtl="0">
+              <a:lnSpc>
+                <a:spcPct val="100000"/>
+              </a:lnSpc>
+              <a:spcBef>
+                <a:spcPts val="600"/>
+              </a:spcBef>
+              <a:spcAft>
+                <a:spcPts val="0"/>
+              </a:spcAft>
+              <a:buClr>
+                <a:srgbClr val="92D050"/>
+              </a:buClr>
+              <a:buSzPts val="2000"/>
+              <a:buFont typeface="Noto Sans Symbols"/>
+              <a:buNone/>
+            </a:pPr>
+            <a:endParaRPr lang="pt-PT" sz="1600" dirty="0"/>
+          </a:p>
+          <a:p>
+            <a:pPr marL="457200" lvl="0" indent="-355600" algn="just" rtl="0">
+              <a:lnSpc>
+                <a:spcPct val="100000"/>
+              </a:lnSpc>
+              <a:spcBef>
+                <a:spcPts val="600"/>
+              </a:spcBef>
+              <a:spcAft>
+                <a:spcPts val="0"/>
+              </a:spcAft>
+              <a:buClr>
+                <a:srgbClr val="FFC107"/>
+              </a:buClr>
+              <a:buSzPts val="2000"/>
+              <a:buFont typeface="Noto Sans Symbols"/>
+              <a:buChar char="▪"/>
+            </a:pPr>
+            <a:endParaRPr lang="pt-PT" sz="1200" dirty="0"/>
+          </a:p>
+        </p:txBody>
+      </p:sp>
+      <p:sp>
+        <p:nvSpPr>
+          <p:cNvPr id="152" name="Google Shape;152;g5c66568b58_0_22"/>
+          <p:cNvSpPr txBox="1">
+            <a:spLocks noGrp="1"/>
+          </p:cNvSpPr>
+          <p:nvPr>
+            <p:ph type="sldNum" idx="12"/>
+          </p:nvPr>
+        </p:nvSpPr>
+        <p:spPr>
+          <a:xfrm>
+            <a:off x="8543227" y="4749851"/>
+            <a:ext cx="548700" cy="393600"/>
+          </a:xfrm>
+          <a:prstGeom prst="rect">
+            <a:avLst/>
+          </a:prstGeom>
+          <a:noFill/>
+          <a:ln>
+            <a:noFill/>
+          </a:ln>
+        </p:spPr>
+        <p:txBody>
+          <a:bodyPr spcFirstLastPara="1" wrap="square" lIns="91425" tIns="91425" rIns="91425" bIns="91425" anchor="t" anchorCtr="0">
+            <a:noAutofit/>
+          </a:bodyPr>
+          <a:lstStyle/>
+          <a:p>
+            <a:pPr marL="0" lvl="0" indent="0" algn="r" rtl="0">
+              <a:lnSpc>
+                <a:spcPct val="100000"/>
+              </a:lnSpc>
+              <a:spcBef>
+                <a:spcPts val="0"/>
+              </a:spcBef>
+              <a:spcAft>
+                <a:spcPts val="0"/>
+              </a:spcAft>
+              <a:buSzPts val="1300"/>
+              <a:buNone/>
+            </a:pPr>
+            <a:fld id="{00000000-1234-1234-1234-123412341234}" type="slidenum">
+              <a:rPr lang="en"/>
+              <a:t>23</a:t>
             </a:fld>
             <a:endParaRPr dirty="0"/>
           </a:p>
@@ -14845,7 +16051,7 @@
 </p:sld>
 </file>
 
-<file path=ppt/slides/slide22.xml><?xml version="1.0" encoding="utf-8"?>
+<file path=ppt/slides/slide24.xml><?xml version="1.0" encoding="utf-8"?>
 <p:sld xmlns:a="http://schemas.openxmlformats.org/drawingml/2006/main" xmlns:r="http://schemas.openxmlformats.org/officeDocument/2006/relationships" xmlns:p="http://schemas.openxmlformats.org/presentationml/2006/main">
   <p:cSld>
     <p:bg>
@@ -14947,467 +16153,6 @@
     <p:extLst>
       <p:ext uri="{BB962C8B-B14F-4D97-AF65-F5344CB8AC3E}">
         <p14:creationId xmlns:p14="http://schemas.microsoft.com/office/powerpoint/2010/main" val="1093529290"/>
-      </p:ext>
-    </p:extLst>
-  </p:cSld>
-  <p:clrMapOvr>
-    <a:masterClrMapping/>
-  </p:clrMapOvr>
-</p:sld>
-</file>
-
-<file path=ppt/slides/slide23.xml><?xml version="1.0" encoding="utf-8"?>
-<p:sld xmlns:a="http://schemas.openxmlformats.org/drawingml/2006/main" xmlns:r="http://schemas.openxmlformats.org/officeDocument/2006/relationships" xmlns:p="http://schemas.openxmlformats.org/presentationml/2006/main">
-  <p:cSld>
-    <p:bg>
-      <p:bgPr>
-        <a:solidFill>
-          <a:schemeClr val="accent3">
-            <a:lumMod val="60000"/>
-            <a:lumOff val="40000"/>
-          </a:schemeClr>
-        </a:solidFill>
-        <a:effectLst/>
-      </p:bgPr>
-    </p:bg>
-    <p:spTree>
-      <p:nvGrpSpPr>
-        <p:cNvPr id="1" name="Shape 149"/>
-        <p:cNvGrpSpPr/>
-        <p:nvPr/>
-      </p:nvGrpSpPr>
-      <p:grpSpPr>
-        <a:xfrm>
-          <a:off x="0" y="0"/>
-          <a:ext cx="0" cy="0"/>
-          <a:chOff x="0" y="0"/>
-          <a:chExt cx="0" cy="0"/>
-        </a:xfrm>
-      </p:grpSpPr>
-      <p:sp>
-        <p:nvSpPr>
-          <p:cNvPr id="150" name="Google Shape;150;g5c66568b58_0_22"/>
-          <p:cNvSpPr txBox="1">
-            <a:spLocks noGrp="1"/>
-          </p:cNvSpPr>
-          <p:nvPr>
-            <p:ph type="title"/>
-          </p:nvPr>
-        </p:nvSpPr>
-        <p:spPr>
-          <a:xfrm>
-            <a:off x="467725" y="648975"/>
-            <a:ext cx="4963800" cy="409500"/>
-          </a:xfrm>
-          <a:prstGeom prst="rect">
-            <a:avLst/>
-          </a:prstGeom>
-          <a:noFill/>
-          <a:ln>
-            <a:noFill/>
-          </a:ln>
-        </p:spPr>
-        <p:txBody>
-          <a:bodyPr spcFirstLastPara="1" wrap="square" lIns="91425" tIns="91425" rIns="91425" bIns="91425" anchor="b" anchorCtr="0">
-            <a:noAutofit/>
-          </a:bodyPr>
-          <a:lstStyle/>
-          <a:p>
-            <a:pPr marL="0" lvl="0" indent="0" algn="l" rtl="0">
-              <a:lnSpc>
-                <a:spcPct val="100000"/>
-              </a:lnSpc>
-              <a:spcBef>
-                <a:spcPts val="0"/>
-              </a:spcBef>
-              <a:spcAft>
-                <a:spcPts val="0"/>
-              </a:spcAft>
-              <a:buSzPts val="2400"/>
-              <a:buNone/>
-            </a:pPr>
-            <a:r>
-              <a:rPr lang="en" dirty="0">
-                <a:solidFill>
-                  <a:schemeClr val="accent3">
-                    <a:lumMod val="60000"/>
-                    <a:lumOff val="40000"/>
-                  </a:schemeClr>
-                </a:solidFill>
-              </a:rPr>
-              <a:t>Tarefa 4</a:t>
-            </a:r>
-            <a:endParaRPr dirty="0">
-              <a:solidFill>
-                <a:schemeClr val="accent3">
-                  <a:lumMod val="60000"/>
-                  <a:lumOff val="40000"/>
-                </a:schemeClr>
-              </a:solidFill>
-            </a:endParaRPr>
-          </a:p>
-        </p:txBody>
-      </p:sp>
-      <p:sp>
-        <p:nvSpPr>
-          <p:cNvPr id="151" name="Google Shape;151;g5c66568b58_0_22"/>
-          <p:cNvSpPr txBox="1">
-            <a:spLocks noGrp="1"/>
-          </p:cNvSpPr>
-          <p:nvPr>
-            <p:ph type="body" idx="1"/>
-          </p:nvPr>
-        </p:nvSpPr>
-        <p:spPr>
-          <a:xfrm>
-            <a:off x="363018" y="1058479"/>
-            <a:ext cx="6380700" cy="3825300"/>
-          </a:xfrm>
-          <a:prstGeom prst="rect">
-            <a:avLst/>
-          </a:prstGeom>
-          <a:noFill/>
-          <a:ln>
-            <a:noFill/>
-          </a:ln>
-        </p:spPr>
-        <p:txBody>
-          <a:bodyPr spcFirstLastPara="1" wrap="square" lIns="91425" tIns="91425" rIns="91425" bIns="91425" anchor="t" anchorCtr="0">
-            <a:noAutofit/>
-          </a:bodyPr>
-          <a:lstStyle/>
-          <a:p>
-            <a:pPr marL="0" lvl="0" indent="0" algn="just" rtl="0">
-              <a:lnSpc>
-                <a:spcPct val="100000"/>
-              </a:lnSpc>
-              <a:spcBef>
-                <a:spcPts val="600"/>
-              </a:spcBef>
-              <a:spcAft>
-                <a:spcPts val="0"/>
-              </a:spcAft>
-              <a:buClr>
-                <a:srgbClr val="92D050"/>
-              </a:buClr>
-              <a:buSzPts val="2000"/>
-              <a:buFont typeface="Noto Sans Symbols"/>
-              <a:buNone/>
-            </a:pPr>
-            <a:endParaRPr lang="pt-PT" sz="1600" dirty="0"/>
-          </a:p>
-          <a:p>
-            <a:pPr marL="457200" lvl="0" indent="-355600" algn="just" rtl="0">
-              <a:lnSpc>
-                <a:spcPct val="100000"/>
-              </a:lnSpc>
-              <a:spcBef>
-                <a:spcPts val="600"/>
-              </a:spcBef>
-              <a:spcAft>
-                <a:spcPts val="0"/>
-              </a:spcAft>
-              <a:buClr>
-                <a:srgbClr val="FFC107"/>
-              </a:buClr>
-              <a:buSzPts val="2000"/>
-              <a:buFont typeface="Noto Sans Symbols"/>
-              <a:buChar char="▪"/>
-            </a:pPr>
-            <a:endParaRPr lang="pt-PT" sz="1200" dirty="0"/>
-          </a:p>
-        </p:txBody>
-      </p:sp>
-      <p:sp>
-        <p:nvSpPr>
-          <p:cNvPr id="152" name="Google Shape;152;g5c66568b58_0_22"/>
-          <p:cNvSpPr txBox="1">
-            <a:spLocks noGrp="1"/>
-          </p:cNvSpPr>
-          <p:nvPr>
-            <p:ph type="sldNum" idx="12"/>
-          </p:nvPr>
-        </p:nvSpPr>
-        <p:spPr>
-          <a:xfrm>
-            <a:off x="8543227" y="4749851"/>
-            <a:ext cx="548700" cy="393600"/>
-          </a:xfrm>
-          <a:prstGeom prst="rect">
-            <a:avLst/>
-          </a:prstGeom>
-          <a:noFill/>
-          <a:ln>
-            <a:noFill/>
-          </a:ln>
-        </p:spPr>
-        <p:txBody>
-          <a:bodyPr spcFirstLastPara="1" wrap="square" lIns="91425" tIns="91425" rIns="91425" bIns="91425" anchor="t" anchorCtr="0">
-            <a:noAutofit/>
-          </a:bodyPr>
-          <a:lstStyle/>
-          <a:p>
-            <a:pPr marL="0" lvl="0" indent="0" algn="r" rtl="0">
-              <a:lnSpc>
-                <a:spcPct val="100000"/>
-              </a:lnSpc>
-              <a:spcBef>
-                <a:spcPts val="0"/>
-              </a:spcBef>
-              <a:spcAft>
-                <a:spcPts val="0"/>
-              </a:spcAft>
-              <a:buSzPts val="1300"/>
-              <a:buNone/>
-            </a:pPr>
-            <a:fld id="{00000000-1234-1234-1234-123412341234}" type="slidenum">
-              <a:rPr lang="en"/>
-              <a:t>23</a:t>
-            </a:fld>
-            <a:endParaRPr dirty="0"/>
-          </a:p>
-        </p:txBody>
-      </p:sp>
-    </p:spTree>
-    <p:extLst>
-      <p:ext uri="{BB962C8B-B14F-4D97-AF65-F5344CB8AC3E}">
-        <p14:creationId xmlns:p14="http://schemas.microsoft.com/office/powerpoint/2010/main" val="2164786495"/>
-      </p:ext>
-    </p:extLst>
-  </p:cSld>
-  <p:clrMapOvr>
-    <a:masterClrMapping/>
-  </p:clrMapOvr>
-</p:sld>
-</file>
-
-<file path=ppt/slides/slide24.xml><?xml version="1.0" encoding="utf-8"?>
-<p:sld xmlns:a="http://schemas.openxmlformats.org/drawingml/2006/main" xmlns:r="http://schemas.openxmlformats.org/officeDocument/2006/relationships" xmlns:p="http://schemas.openxmlformats.org/presentationml/2006/main">
-  <p:cSld>
-    <p:bg>
-      <p:bgPr>
-        <a:solidFill>
-          <a:schemeClr val="accent3">
-            <a:lumMod val="60000"/>
-            <a:lumOff val="40000"/>
-          </a:schemeClr>
-        </a:solidFill>
-        <a:effectLst/>
-      </p:bgPr>
-    </p:bg>
-    <p:spTree>
-      <p:nvGrpSpPr>
-        <p:cNvPr id="1" name="Shape 149"/>
-        <p:cNvGrpSpPr/>
-        <p:nvPr/>
-      </p:nvGrpSpPr>
-      <p:grpSpPr>
-        <a:xfrm>
-          <a:off x="0" y="0"/>
-          <a:ext cx="0" cy="0"/>
-          <a:chOff x="0" y="0"/>
-          <a:chExt cx="0" cy="0"/>
-        </a:xfrm>
-      </p:grpSpPr>
-      <p:sp>
-        <p:nvSpPr>
-          <p:cNvPr id="150" name="Google Shape;150;g5c66568b58_0_22"/>
-          <p:cNvSpPr txBox="1">
-            <a:spLocks noGrp="1"/>
-          </p:cNvSpPr>
-          <p:nvPr>
-            <p:ph type="title"/>
-          </p:nvPr>
-        </p:nvSpPr>
-        <p:spPr>
-          <a:xfrm>
-            <a:off x="467725" y="648975"/>
-            <a:ext cx="4963800" cy="409500"/>
-          </a:xfrm>
-          <a:prstGeom prst="rect">
-            <a:avLst/>
-          </a:prstGeom>
-          <a:noFill/>
-          <a:ln>
-            <a:noFill/>
-          </a:ln>
-        </p:spPr>
-        <p:txBody>
-          <a:bodyPr spcFirstLastPara="1" wrap="square" lIns="91425" tIns="91425" rIns="91425" bIns="91425" anchor="b" anchorCtr="0">
-            <a:noAutofit/>
-          </a:bodyPr>
-          <a:lstStyle/>
-          <a:p>
-            <a:pPr marL="0" lvl="0" indent="0" algn="l" rtl="0">
-              <a:lnSpc>
-                <a:spcPct val="100000"/>
-              </a:lnSpc>
-              <a:spcBef>
-                <a:spcPts val="0"/>
-              </a:spcBef>
-              <a:spcAft>
-                <a:spcPts val="0"/>
-              </a:spcAft>
-              <a:buSzPts val="2400"/>
-              <a:buNone/>
-            </a:pPr>
-            <a:r>
-              <a:rPr lang="en" dirty="0">
-                <a:solidFill>
-                  <a:schemeClr val="accent3">
-                    <a:lumMod val="60000"/>
-                    <a:lumOff val="40000"/>
-                  </a:schemeClr>
-                </a:solidFill>
-              </a:rPr>
-              <a:t>Tarefa 4 – </a:t>
-            </a:r>
-            <a:r>
-              <a:rPr lang="en" i="1" dirty="0">
-                <a:solidFill>
-                  <a:schemeClr val="accent3">
-                    <a:lumMod val="60000"/>
-                    <a:lumOff val="40000"/>
-                  </a:schemeClr>
-                </a:solidFill>
-              </a:rPr>
-              <a:t>demo1</a:t>
-            </a:r>
-            <a:endParaRPr dirty="0">
-              <a:solidFill>
-                <a:schemeClr val="accent3">
-                  <a:lumMod val="60000"/>
-                  <a:lumOff val="40000"/>
-                </a:schemeClr>
-              </a:solidFill>
-            </a:endParaRPr>
-          </a:p>
-        </p:txBody>
-      </p:sp>
-      <p:sp>
-        <p:nvSpPr>
-          <p:cNvPr id="151" name="Google Shape;151;g5c66568b58_0_22"/>
-          <p:cNvSpPr txBox="1">
-            <a:spLocks noGrp="1"/>
-          </p:cNvSpPr>
-          <p:nvPr>
-            <p:ph type="body" idx="1"/>
-          </p:nvPr>
-        </p:nvSpPr>
-        <p:spPr>
-          <a:xfrm>
-            <a:off x="363018" y="1058479"/>
-            <a:ext cx="6380700" cy="3825300"/>
-          </a:xfrm>
-          <a:prstGeom prst="rect">
-            <a:avLst/>
-          </a:prstGeom>
-          <a:noFill/>
-          <a:ln>
-            <a:noFill/>
-          </a:ln>
-        </p:spPr>
-        <p:txBody>
-          <a:bodyPr spcFirstLastPara="1" wrap="square" lIns="91425" tIns="91425" rIns="91425" bIns="91425" anchor="t" anchorCtr="0">
-            <a:noAutofit/>
-          </a:bodyPr>
-          <a:lstStyle/>
-          <a:p>
-            <a:pPr marL="0" lvl="0" indent="0" algn="just" rtl="0">
-              <a:lnSpc>
-                <a:spcPct val="100000"/>
-              </a:lnSpc>
-              <a:spcBef>
-                <a:spcPts val="600"/>
-              </a:spcBef>
-              <a:spcAft>
-                <a:spcPts val="0"/>
-              </a:spcAft>
-              <a:buClr>
-                <a:srgbClr val="92D050"/>
-              </a:buClr>
-              <a:buSzPts val="2000"/>
-              <a:buFont typeface="Noto Sans Symbols"/>
-              <a:buNone/>
-            </a:pPr>
-            <a:endParaRPr lang="pt-PT" sz="1600" dirty="0"/>
-          </a:p>
-          <a:p>
-            <a:pPr marL="457200" lvl="0" indent="-355600" algn="just" rtl="0">
-              <a:lnSpc>
-                <a:spcPct val="100000"/>
-              </a:lnSpc>
-              <a:spcBef>
-                <a:spcPts val="600"/>
-              </a:spcBef>
-              <a:spcAft>
-                <a:spcPts val="0"/>
-              </a:spcAft>
-              <a:buClr>
-                <a:srgbClr val="FFC107"/>
-              </a:buClr>
-              <a:buSzPts val="2000"/>
-              <a:buFont typeface="Noto Sans Symbols"/>
-              <a:buChar char="▪"/>
-            </a:pPr>
-            <a:endParaRPr lang="pt-PT" sz="1200" dirty="0"/>
-          </a:p>
-        </p:txBody>
-      </p:sp>
-      <p:sp>
-        <p:nvSpPr>
-          <p:cNvPr id="152" name="Google Shape;152;g5c66568b58_0_22"/>
-          <p:cNvSpPr txBox="1">
-            <a:spLocks noGrp="1"/>
-          </p:cNvSpPr>
-          <p:nvPr>
-            <p:ph type="sldNum" idx="12"/>
-          </p:nvPr>
-        </p:nvSpPr>
-        <p:spPr>
-          <a:xfrm>
-            <a:off x="8543227" y="4749851"/>
-            <a:ext cx="548700" cy="393600"/>
-          </a:xfrm>
-          <a:prstGeom prst="rect">
-            <a:avLst/>
-          </a:prstGeom>
-          <a:noFill/>
-          <a:ln>
-            <a:noFill/>
-          </a:ln>
-        </p:spPr>
-        <p:txBody>
-          <a:bodyPr spcFirstLastPara="1" wrap="square" lIns="91425" tIns="91425" rIns="91425" bIns="91425" anchor="t" anchorCtr="0">
-            <a:noAutofit/>
-          </a:bodyPr>
-          <a:lstStyle/>
-          <a:p>
-            <a:pPr marL="0" lvl="0" indent="0" algn="r" rtl="0">
-              <a:lnSpc>
-                <a:spcPct val="100000"/>
-              </a:lnSpc>
-              <a:spcBef>
-                <a:spcPts val="0"/>
-              </a:spcBef>
-              <a:spcAft>
-                <a:spcPts val="0"/>
-              </a:spcAft>
-              <a:buSzPts val="1300"/>
-              <a:buNone/>
-            </a:pPr>
-            <a:fld id="{00000000-1234-1234-1234-123412341234}" type="slidenum">
-              <a:rPr lang="en"/>
-              <a:t>24</a:t>
-            </a:fld>
-            <a:endParaRPr dirty="0"/>
-          </a:p>
-        </p:txBody>
-      </p:sp>
-    </p:spTree>
-    <p:extLst>
-      <p:ext uri="{BB962C8B-B14F-4D97-AF65-F5344CB8AC3E}">
-        <p14:creationId xmlns:p14="http://schemas.microsoft.com/office/powerpoint/2010/main" val="2398864426"/>
       </p:ext>
     </p:extLst>
   </p:cSld>
@@ -15496,18 +16241,7 @@
                   </a:schemeClr>
                 </a:solidFill>
               </a:rPr>
-              <a:t>Tarefa 4 – </a:t>
-            </a:r>
-            <a:r>
-              <a:rPr lang="en" i="1" dirty="0">
-                <a:solidFill>
-                  <a:schemeClr val="accent3">
-                    <a:lumMod val="60000"/>
-                    <a:lumOff val="40000"/>
-                  </a:schemeClr>
-                </a:solidFill>
-              </a:rPr>
-              <a:t>demo2</a:t>
+              <a:t>Tarefa 4</a:t>
             </a:r>
             <a:endParaRPr dirty="0">
               <a:solidFill>
@@ -15643,6 +16377,478 @@
     </p:spTree>
     <p:extLst>
       <p:ext uri="{BB962C8B-B14F-4D97-AF65-F5344CB8AC3E}">
+        <p14:creationId xmlns:p14="http://schemas.microsoft.com/office/powerpoint/2010/main" val="2164786495"/>
+      </p:ext>
+    </p:extLst>
+  </p:cSld>
+  <p:clrMapOvr>
+    <a:masterClrMapping/>
+  </p:clrMapOvr>
+</p:sld>
+</file>
+
+<file path=ppt/slides/slide26.xml><?xml version="1.0" encoding="utf-8"?>
+<p:sld xmlns:a="http://schemas.openxmlformats.org/drawingml/2006/main" xmlns:r="http://schemas.openxmlformats.org/officeDocument/2006/relationships" xmlns:p="http://schemas.openxmlformats.org/presentationml/2006/main">
+  <p:cSld>
+    <p:bg>
+      <p:bgPr>
+        <a:solidFill>
+          <a:schemeClr val="accent3">
+            <a:lumMod val="60000"/>
+            <a:lumOff val="40000"/>
+          </a:schemeClr>
+        </a:solidFill>
+        <a:effectLst/>
+      </p:bgPr>
+    </p:bg>
+    <p:spTree>
+      <p:nvGrpSpPr>
+        <p:cNvPr id="1" name="Shape 149"/>
+        <p:cNvGrpSpPr/>
+        <p:nvPr/>
+      </p:nvGrpSpPr>
+      <p:grpSpPr>
+        <a:xfrm>
+          <a:off x="0" y="0"/>
+          <a:ext cx="0" cy="0"/>
+          <a:chOff x="0" y="0"/>
+          <a:chExt cx="0" cy="0"/>
+        </a:xfrm>
+      </p:grpSpPr>
+      <p:sp>
+        <p:nvSpPr>
+          <p:cNvPr id="150" name="Google Shape;150;g5c66568b58_0_22"/>
+          <p:cNvSpPr txBox="1">
+            <a:spLocks noGrp="1"/>
+          </p:cNvSpPr>
+          <p:nvPr>
+            <p:ph type="title"/>
+          </p:nvPr>
+        </p:nvSpPr>
+        <p:spPr>
+          <a:xfrm>
+            <a:off x="467725" y="648975"/>
+            <a:ext cx="4963800" cy="409500"/>
+          </a:xfrm>
+          <a:prstGeom prst="rect">
+            <a:avLst/>
+          </a:prstGeom>
+          <a:noFill/>
+          <a:ln>
+            <a:noFill/>
+          </a:ln>
+        </p:spPr>
+        <p:txBody>
+          <a:bodyPr spcFirstLastPara="1" wrap="square" lIns="91425" tIns="91425" rIns="91425" bIns="91425" anchor="b" anchorCtr="0">
+            <a:noAutofit/>
+          </a:bodyPr>
+          <a:lstStyle/>
+          <a:p>
+            <a:pPr marL="0" lvl="0" indent="0" algn="l" rtl="0">
+              <a:lnSpc>
+                <a:spcPct val="100000"/>
+              </a:lnSpc>
+              <a:spcBef>
+                <a:spcPts val="0"/>
+              </a:spcBef>
+              <a:spcAft>
+                <a:spcPts val="0"/>
+              </a:spcAft>
+              <a:buSzPts val="2400"/>
+              <a:buNone/>
+            </a:pPr>
+            <a:r>
+              <a:rPr lang="en" dirty="0">
+                <a:solidFill>
+                  <a:schemeClr val="accent3">
+                    <a:lumMod val="60000"/>
+                    <a:lumOff val="40000"/>
+                  </a:schemeClr>
+                </a:solidFill>
+              </a:rPr>
+              <a:t>Tarefa 4 – </a:t>
+            </a:r>
+            <a:r>
+              <a:rPr lang="en" i="1" dirty="0">
+                <a:solidFill>
+                  <a:schemeClr val="accent3">
+                    <a:lumMod val="60000"/>
+                    <a:lumOff val="40000"/>
+                  </a:schemeClr>
+                </a:solidFill>
+              </a:rPr>
+              <a:t>demo1</a:t>
+            </a:r>
+            <a:endParaRPr dirty="0">
+              <a:solidFill>
+                <a:schemeClr val="accent3">
+                  <a:lumMod val="60000"/>
+                  <a:lumOff val="40000"/>
+                </a:schemeClr>
+              </a:solidFill>
+            </a:endParaRPr>
+          </a:p>
+        </p:txBody>
+      </p:sp>
+      <p:sp>
+        <p:nvSpPr>
+          <p:cNvPr id="151" name="Google Shape;151;g5c66568b58_0_22"/>
+          <p:cNvSpPr txBox="1">
+            <a:spLocks noGrp="1"/>
+          </p:cNvSpPr>
+          <p:nvPr>
+            <p:ph type="body" idx="1"/>
+          </p:nvPr>
+        </p:nvSpPr>
+        <p:spPr>
+          <a:xfrm>
+            <a:off x="363018" y="1058479"/>
+            <a:ext cx="6380700" cy="3825300"/>
+          </a:xfrm>
+          <a:prstGeom prst="rect">
+            <a:avLst/>
+          </a:prstGeom>
+          <a:noFill/>
+          <a:ln>
+            <a:noFill/>
+          </a:ln>
+        </p:spPr>
+        <p:txBody>
+          <a:bodyPr spcFirstLastPara="1" wrap="square" lIns="91425" tIns="91425" rIns="91425" bIns="91425" anchor="t" anchorCtr="0">
+            <a:noAutofit/>
+          </a:bodyPr>
+          <a:lstStyle/>
+          <a:p>
+            <a:pPr marL="0" lvl="0" indent="0" algn="just" rtl="0">
+              <a:lnSpc>
+                <a:spcPct val="100000"/>
+              </a:lnSpc>
+              <a:spcBef>
+                <a:spcPts val="600"/>
+              </a:spcBef>
+              <a:spcAft>
+                <a:spcPts val="0"/>
+              </a:spcAft>
+              <a:buClr>
+                <a:srgbClr val="92D050"/>
+              </a:buClr>
+              <a:buSzPts val="2000"/>
+              <a:buFont typeface="Noto Sans Symbols"/>
+              <a:buNone/>
+            </a:pPr>
+            <a:endParaRPr lang="pt-PT" sz="1600" dirty="0"/>
+          </a:p>
+          <a:p>
+            <a:pPr marL="457200" lvl="0" indent="-355600" algn="just" rtl="0">
+              <a:lnSpc>
+                <a:spcPct val="100000"/>
+              </a:lnSpc>
+              <a:spcBef>
+                <a:spcPts val="600"/>
+              </a:spcBef>
+              <a:spcAft>
+                <a:spcPts val="0"/>
+              </a:spcAft>
+              <a:buClr>
+                <a:srgbClr val="FFC107"/>
+              </a:buClr>
+              <a:buSzPts val="2000"/>
+              <a:buFont typeface="Noto Sans Symbols"/>
+              <a:buChar char="▪"/>
+            </a:pPr>
+            <a:endParaRPr lang="pt-PT" sz="1200" dirty="0"/>
+          </a:p>
+        </p:txBody>
+      </p:sp>
+      <p:sp>
+        <p:nvSpPr>
+          <p:cNvPr id="152" name="Google Shape;152;g5c66568b58_0_22"/>
+          <p:cNvSpPr txBox="1">
+            <a:spLocks noGrp="1"/>
+          </p:cNvSpPr>
+          <p:nvPr>
+            <p:ph type="sldNum" idx="12"/>
+          </p:nvPr>
+        </p:nvSpPr>
+        <p:spPr>
+          <a:xfrm>
+            <a:off x="8543227" y="4749851"/>
+            <a:ext cx="548700" cy="393600"/>
+          </a:xfrm>
+          <a:prstGeom prst="rect">
+            <a:avLst/>
+          </a:prstGeom>
+          <a:noFill/>
+          <a:ln>
+            <a:noFill/>
+          </a:ln>
+        </p:spPr>
+        <p:txBody>
+          <a:bodyPr spcFirstLastPara="1" wrap="square" lIns="91425" tIns="91425" rIns="91425" bIns="91425" anchor="t" anchorCtr="0">
+            <a:noAutofit/>
+          </a:bodyPr>
+          <a:lstStyle/>
+          <a:p>
+            <a:pPr marL="0" lvl="0" indent="0" algn="r" rtl="0">
+              <a:lnSpc>
+                <a:spcPct val="100000"/>
+              </a:lnSpc>
+              <a:spcBef>
+                <a:spcPts val="0"/>
+              </a:spcBef>
+              <a:spcAft>
+                <a:spcPts val="0"/>
+              </a:spcAft>
+              <a:buSzPts val="1300"/>
+              <a:buNone/>
+            </a:pPr>
+            <a:fld id="{00000000-1234-1234-1234-123412341234}" type="slidenum">
+              <a:rPr lang="en"/>
+              <a:t>26</a:t>
+            </a:fld>
+            <a:endParaRPr dirty="0"/>
+          </a:p>
+        </p:txBody>
+      </p:sp>
+    </p:spTree>
+    <p:extLst>
+      <p:ext uri="{BB962C8B-B14F-4D97-AF65-F5344CB8AC3E}">
+        <p14:creationId xmlns:p14="http://schemas.microsoft.com/office/powerpoint/2010/main" val="2398864426"/>
+      </p:ext>
+    </p:extLst>
+  </p:cSld>
+  <p:clrMapOvr>
+    <a:masterClrMapping/>
+  </p:clrMapOvr>
+</p:sld>
+</file>
+
+<file path=ppt/slides/slide27.xml><?xml version="1.0" encoding="utf-8"?>
+<p:sld xmlns:a="http://schemas.openxmlformats.org/drawingml/2006/main" xmlns:r="http://schemas.openxmlformats.org/officeDocument/2006/relationships" xmlns:p="http://schemas.openxmlformats.org/presentationml/2006/main">
+  <p:cSld>
+    <p:bg>
+      <p:bgPr>
+        <a:solidFill>
+          <a:schemeClr val="accent3">
+            <a:lumMod val="60000"/>
+            <a:lumOff val="40000"/>
+          </a:schemeClr>
+        </a:solidFill>
+        <a:effectLst/>
+      </p:bgPr>
+    </p:bg>
+    <p:spTree>
+      <p:nvGrpSpPr>
+        <p:cNvPr id="1" name="Shape 149"/>
+        <p:cNvGrpSpPr/>
+        <p:nvPr/>
+      </p:nvGrpSpPr>
+      <p:grpSpPr>
+        <a:xfrm>
+          <a:off x="0" y="0"/>
+          <a:ext cx="0" cy="0"/>
+          <a:chOff x="0" y="0"/>
+          <a:chExt cx="0" cy="0"/>
+        </a:xfrm>
+      </p:grpSpPr>
+      <p:sp>
+        <p:nvSpPr>
+          <p:cNvPr id="150" name="Google Shape;150;g5c66568b58_0_22"/>
+          <p:cNvSpPr txBox="1">
+            <a:spLocks noGrp="1"/>
+          </p:cNvSpPr>
+          <p:nvPr>
+            <p:ph type="title"/>
+          </p:nvPr>
+        </p:nvSpPr>
+        <p:spPr>
+          <a:xfrm>
+            <a:off x="467725" y="648975"/>
+            <a:ext cx="4963800" cy="409500"/>
+          </a:xfrm>
+          <a:prstGeom prst="rect">
+            <a:avLst/>
+          </a:prstGeom>
+          <a:noFill/>
+          <a:ln>
+            <a:noFill/>
+          </a:ln>
+        </p:spPr>
+        <p:txBody>
+          <a:bodyPr spcFirstLastPara="1" wrap="square" lIns="91425" tIns="91425" rIns="91425" bIns="91425" anchor="b" anchorCtr="0">
+            <a:noAutofit/>
+          </a:bodyPr>
+          <a:lstStyle/>
+          <a:p>
+            <a:pPr marL="0" lvl="0" indent="0" algn="l" rtl="0">
+              <a:lnSpc>
+                <a:spcPct val="100000"/>
+              </a:lnSpc>
+              <a:spcBef>
+                <a:spcPts val="0"/>
+              </a:spcBef>
+              <a:spcAft>
+                <a:spcPts val="0"/>
+              </a:spcAft>
+              <a:buSzPts val="2400"/>
+              <a:buNone/>
+            </a:pPr>
+            <a:r>
+              <a:rPr lang="en" dirty="0">
+                <a:solidFill>
+                  <a:schemeClr val="accent3">
+                    <a:lumMod val="60000"/>
+                    <a:lumOff val="40000"/>
+                  </a:schemeClr>
+                </a:solidFill>
+              </a:rPr>
+              <a:t>Tarefa 4 – </a:t>
+            </a:r>
+            <a:r>
+              <a:rPr lang="en" i="1" dirty="0">
+                <a:solidFill>
+                  <a:schemeClr val="accent3">
+                    <a:lumMod val="60000"/>
+                    <a:lumOff val="40000"/>
+                  </a:schemeClr>
+                </a:solidFill>
+              </a:rPr>
+              <a:t>demo2</a:t>
+            </a:r>
+            <a:endParaRPr dirty="0">
+              <a:solidFill>
+                <a:schemeClr val="accent3">
+                  <a:lumMod val="60000"/>
+                  <a:lumOff val="40000"/>
+                </a:schemeClr>
+              </a:solidFill>
+            </a:endParaRPr>
+          </a:p>
+        </p:txBody>
+      </p:sp>
+      <p:sp>
+        <p:nvSpPr>
+          <p:cNvPr id="151" name="Google Shape;151;g5c66568b58_0_22"/>
+          <p:cNvSpPr txBox="1">
+            <a:spLocks noGrp="1"/>
+          </p:cNvSpPr>
+          <p:nvPr>
+            <p:ph type="body" idx="1"/>
+          </p:nvPr>
+        </p:nvSpPr>
+        <p:spPr>
+          <a:xfrm>
+            <a:off x="363018" y="1058479"/>
+            <a:ext cx="6380700" cy="3825300"/>
+          </a:xfrm>
+          <a:prstGeom prst="rect">
+            <a:avLst/>
+          </a:prstGeom>
+          <a:noFill/>
+          <a:ln>
+            <a:noFill/>
+          </a:ln>
+        </p:spPr>
+        <p:txBody>
+          <a:bodyPr spcFirstLastPara="1" wrap="square" lIns="91425" tIns="91425" rIns="91425" bIns="91425" anchor="t" anchorCtr="0">
+            <a:noAutofit/>
+          </a:bodyPr>
+          <a:lstStyle/>
+          <a:p>
+            <a:pPr marL="0" lvl="0" indent="0" algn="just" rtl="0">
+              <a:lnSpc>
+                <a:spcPct val="100000"/>
+              </a:lnSpc>
+              <a:spcBef>
+                <a:spcPts val="600"/>
+              </a:spcBef>
+              <a:spcAft>
+                <a:spcPts val="0"/>
+              </a:spcAft>
+              <a:buClr>
+                <a:srgbClr val="92D050"/>
+              </a:buClr>
+              <a:buSzPts val="2000"/>
+              <a:buFont typeface="Noto Sans Symbols"/>
+              <a:buNone/>
+            </a:pPr>
+            <a:endParaRPr lang="pt-PT" sz="1600" dirty="0"/>
+          </a:p>
+          <a:p>
+            <a:pPr marL="457200" lvl="0" indent="-355600" algn="just" rtl="0">
+              <a:lnSpc>
+                <a:spcPct val="100000"/>
+              </a:lnSpc>
+              <a:spcBef>
+                <a:spcPts val="600"/>
+              </a:spcBef>
+              <a:spcAft>
+                <a:spcPts val="0"/>
+              </a:spcAft>
+              <a:buClr>
+                <a:srgbClr val="FFC107"/>
+              </a:buClr>
+              <a:buSzPts val="2000"/>
+              <a:buFont typeface="Noto Sans Symbols"/>
+              <a:buChar char="▪"/>
+            </a:pPr>
+            <a:endParaRPr lang="pt-PT" sz="1200" dirty="0"/>
+          </a:p>
+        </p:txBody>
+      </p:sp>
+      <p:sp>
+        <p:nvSpPr>
+          <p:cNvPr id="152" name="Google Shape;152;g5c66568b58_0_22"/>
+          <p:cNvSpPr txBox="1">
+            <a:spLocks noGrp="1"/>
+          </p:cNvSpPr>
+          <p:nvPr>
+            <p:ph type="sldNum" idx="12"/>
+          </p:nvPr>
+        </p:nvSpPr>
+        <p:spPr>
+          <a:xfrm>
+            <a:off x="8543227" y="4749851"/>
+            <a:ext cx="548700" cy="393600"/>
+          </a:xfrm>
+          <a:prstGeom prst="rect">
+            <a:avLst/>
+          </a:prstGeom>
+          <a:noFill/>
+          <a:ln>
+            <a:noFill/>
+          </a:ln>
+        </p:spPr>
+        <p:txBody>
+          <a:bodyPr spcFirstLastPara="1" wrap="square" lIns="91425" tIns="91425" rIns="91425" bIns="91425" anchor="t" anchorCtr="0">
+            <a:noAutofit/>
+          </a:bodyPr>
+          <a:lstStyle/>
+          <a:p>
+            <a:pPr marL="0" lvl="0" indent="0" algn="r" rtl="0">
+              <a:lnSpc>
+                <a:spcPct val="100000"/>
+              </a:lnSpc>
+              <a:spcBef>
+                <a:spcPts val="0"/>
+              </a:spcBef>
+              <a:spcAft>
+                <a:spcPts val="0"/>
+              </a:spcAft>
+              <a:buSzPts val="1300"/>
+              <a:buNone/>
+            </a:pPr>
+            <a:fld id="{00000000-1234-1234-1234-123412341234}" type="slidenum">
+              <a:rPr lang="en"/>
+              <a:t>27</a:t>
+            </a:fld>
+            <a:endParaRPr dirty="0"/>
+          </a:p>
+        </p:txBody>
+      </p:sp>
+    </p:spTree>
+    <p:extLst>
+      <p:ext uri="{BB962C8B-B14F-4D97-AF65-F5344CB8AC3E}">
         <p14:creationId xmlns:p14="http://schemas.microsoft.com/office/powerpoint/2010/main" val="445447506"/>
       </p:ext>
     </p:extLst>
@@ -15653,7 +16859,7 @@
 </p:sld>
 </file>
 
-<file path=ppt/slides/slide26.xml><?xml version="1.0" encoding="utf-8"?>
+<file path=ppt/slides/slide28.xml><?xml version="1.0" encoding="utf-8"?>
 <p:sld xmlns:a="http://schemas.openxmlformats.org/drawingml/2006/main" xmlns:r="http://schemas.openxmlformats.org/officeDocument/2006/relationships" xmlns:p="http://schemas.openxmlformats.org/presentationml/2006/main">
   <p:cSld>
     <p:bg>
@@ -15753,10 +16959,10 @@
       </p:sp>
       <p:pic>
         <p:nvPicPr>
-          <p:cNvPr id="3" name="Gráfico 2">
+          <p:cNvPr id="5" name="Gráfico 4">
             <a:extLst>
               <a:ext uri="{FF2B5EF4-FFF2-40B4-BE49-F238E27FC236}">
-                <a16:creationId xmlns:a16="http://schemas.microsoft.com/office/drawing/2014/main" id="{61AD8CF8-F3BF-EB45-A9A0-4541479A4A2F}"/>
+                <a16:creationId xmlns:a16="http://schemas.microsoft.com/office/drawing/2014/main" id="{B98ECCBF-BCA3-184B-A7B8-354EE2D61C4A}"/>
               </a:ext>
             </a:extLst>
           </p:cNvPr>
@@ -15779,8 +16985,8 @@
         </p:blipFill>
         <p:spPr>
           <a:xfrm>
-            <a:off x="6402848" y="1046480"/>
-            <a:ext cx="2082800" cy="2082800"/>
+            <a:off x="6202017" y="1429934"/>
+            <a:ext cx="2283631" cy="2283631"/>
           </a:xfrm>
           <a:prstGeom prst="rect">
             <a:avLst/>
@@ -15800,7 +17006,611 @@
 </p:sld>
 </file>
 
-<file path=ppt/slides/slide27.xml><?xml version="1.0" encoding="utf-8"?>
+<file path=ppt/slides/slide29.xml><?xml version="1.0" encoding="utf-8"?>
+<p:sld xmlns:a="http://schemas.openxmlformats.org/drawingml/2006/main" xmlns:r="http://schemas.openxmlformats.org/officeDocument/2006/relationships" xmlns:p="http://schemas.openxmlformats.org/presentationml/2006/main">
+  <p:cSld>
+    <p:bg>
+      <p:bgPr>
+        <a:solidFill>
+          <a:schemeClr val="accent3">
+            <a:lumMod val="60000"/>
+            <a:lumOff val="40000"/>
+          </a:schemeClr>
+        </a:solidFill>
+        <a:effectLst/>
+      </p:bgPr>
+    </p:bg>
+    <p:spTree>
+      <p:nvGrpSpPr>
+        <p:cNvPr id="1" name="Shape 149"/>
+        <p:cNvGrpSpPr/>
+        <p:nvPr/>
+      </p:nvGrpSpPr>
+      <p:grpSpPr>
+        <a:xfrm>
+          <a:off x="0" y="0"/>
+          <a:ext cx="0" cy="0"/>
+          <a:chOff x="0" y="0"/>
+          <a:chExt cx="0" cy="0"/>
+        </a:xfrm>
+      </p:grpSpPr>
+      <p:sp>
+        <p:nvSpPr>
+          <p:cNvPr id="150" name="Google Shape;150;g5c66568b58_0_22"/>
+          <p:cNvSpPr txBox="1">
+            <a:spLocks noGrp="1"/>
+          </p:cNvSpPr>
+          <p:nvPr>
+            <p:ph type="title"/>
+          </p:nvPr>
+        </p:nvSpPr>
+        <p:spPr>
+          <a:xfrm>
+            <a:off x="467725" y="648975"/>
+            <a:ext cx="4963800" cy="409500"/>
+          </a:xfrm>
+          <a:prstGeom prst="rect">
+            <a:avLst/>
+          </a:prstGeom>
+          <a:noFill/>
+          <a:ln>
+            <a:noFill/>
+          </a:ln>
+        </p:spPr>
+        <p:txBody>
+          <a:bodyPr spcFirstLastPara="1" wrap="square" lIns="91425" tIns="91425" rIns="91425" bIns="91425" anchor="b" anchorCtr="0">
+            <a:noAutofit/>
+          </a:bodyPr>
+          <a:lstStyle/>
+          <a:p>
+            <a:pPr marL="0" lvl="0" indent="0" algn="l" rtl="0">
+              <a:lnSpc>
+                <a:spcPct val="100000"/>
+              </a:lnSpc>
+              <a:spcBef>
+                <a:spcPts val="0"/>
+              </a:spcBef>
+              <a:spcAft>
+                <a:spcPts val="0"/>
+              </a:spcAft>
+              <a:buSzPts val="2400"/>
+              <a:buNone/>
+            </a:pPr>
+            <a:r>
+              <a:rPr lang="en" dirty="0">
+                <a:solidFill>
+                  <a:schemeClr val="accent3">
+                    <a:lumMod val="60000"/>
+                    <a:lumOff val="40000"/>
+                  </a:schemeClr>
+                </a:solidFill>
+              </a:rPr>
+              <a:t>Tarefa extra</a:t>
+            </a:r>
+            <a:endParaRPr dirty="0">
+              <a:solidFill>
+                <a:schemeClr val="accent3">
+                  <a:lumMod val="60000"/>
+                  <a:lumOff val="40000"/>
+                </a:schemeClr>
+              </a:solidFill>
+            </a:endParaRPr>
+          </a:p>
+        </p:txBody>
+      </p:sp>
+      <p:sp>
+        <p:nvSpPr>
+          <p:cNvPr id="151" name="Google Shape;151;g5c66568b58_0_22"/>
+          <p:cNvSpPr txBox="1">
+            <a:spLocks noGrp="1"/>
+          </p:cNvSpPr>
+          <p:nvPr>
+            <p:ph type="body" idx="1"/>
+          </p:nvPr>
+        </p:nvSpPr>
+        <p:spPr>
+          <a:xfrm>
+            <a:off x="363018" y="1058479"/>
+            <a:ext cx="6380700" cy="3825300"/>
+          </a:xfrm>
+          <a:prstGeom prst="rect">
+            <a:avLst/>
+          </a:prstGeom>
+          <a:noFill/>
+          <a:ln>
+            <a:noFill/>
+          </a:ln>
+        </p:spPr>
+        <p:txBody>
+          <a:bodyPr spcFirstLastPara="1" wrap="square" lIns="91425" tIns="91425" rIns="91425" bIns="91425" anchor="t" anchorCtr="0">
+            <a:noAutofit/>
+          </a:bodyPr>
+          <a:lstStyle/>
+          <a:p>
+            <a:pPr marL="285750" indent="-285750" algn="just">
+              <a:buClr>
+                <a:schemeClr val="accent3">
+                  <a:lumMod val="60000"/>
+                  <a:lumOff val="40000"/>
+                </a:schemeClr>
+              </a:buClr>
+            </a:pPr>
+            <a:endParaRPr lang="pt-PT" sz="1600" dirty="0"/>
+          </a:p>
+          <a:p>
+            <a:pPr marL="457200" lvl="0" indent="-355600" algn="just" rtl="0">
+              <a:lnSpc>
+                <a:spcPct val="100000"/>
+              </a:lnSpc>
+              <a:spcBef>
+                <a:spcPts val="600"/>
+              </a:spcBef>
+              <a:spcAft>
+                <a:spcPts val="0"/>
+              </a:spcAft>
+              <a:buClr>
+                <a:srgbClr val="FFC107"/>
+              </a:buClr>
+              <a:buSzPts val="2000"/>
+              <a:buFont typeface="Noto Sans Symbols"/>
+              <a:buChar char="▪"/>
+            </a:pPr>
+            <a:endParaRPr lang="pt-PT" sz="1200" dirty="0"/>
+          </a:p>
+        </p:txBody>
+      </p:sp>
+      <p:sp>
+        <p:nvSpPr>
+          <p:cNvPr id="152" name="Google Shape;152;g5c66568b58_0_22"/>
+          <p:cNvSpPr txBox="1">
+            <a:spLocks noGrp="1"/>
+          </p:cNvSpPr>
+          <p:nvPr>
+            <p:ph type="sldNum" idx="12"/>
+          </p:nvPr>
+        </p:nvSpPr>
+        <p:spPr>
+          <a:xfrm>
+            <a:off x="8543227" y="4749851"/>
+            <a:ext cx="548700" cy="393600"/>
+          </a:xfrm>
+          <a:prstGeom prst="rect">
+            <a:avLst/>
+          </a:prstGeom>
+          <a:noFill/>
+          <a:ln>
+            <a:noFill/>
+          </a:ln>
+        </p:spPr>
+        <p:txBody>
+          <a:bodyPr spcFirstLastPara="1" wrap="square" lIns="91425" tIns="91425" rIns="91425" bIns="91425" anchor="t" anchorCtr="0">
+            <a:noAutofit/>
+          </a:bodyPr>
+          <a:lstStyle/>
+          <a:p>
+            <a:pPr marL="0" lvl="0" indent="0" algn="r" rtl="0">
+              <a:lnSpc>
+                <a:spcPct val="100000"/>
+              </a:lnSpc>
+              <a:spcBef>
+                <a:spcPts val="0"/>
+              </a:spcBef>
+              <a:spcAft>
+                <a:spcPts val="0"/>
+              </a:spcAft>
+              <a:buSzPts val="1300"/>
+              <a:buNone/>
+            </a:pPr>
+            <a:fld id="{00000000-1234-1234-1234-123412341234}" type="slidenum">
+              <a:rPr lang="en"/>
+              <a:t>29</a:t>
+            </a:fld>
+            <a:endParaRPr dirty="0"/>
+          </a:p>
+        </p:txBody>
+      </p:sp>
+      <p:pic>
+        <p:nvPicPr>
+          <p:cNvPr id="7" name="Gráfico 6">
+            <a:extLst>
+              <a:ext uri="{FF2B5EF4-FFF2-40B4-BE49-F238E27FC236}">
+                <a16:creationId xmlns:a16="http://schemas.microsoft.com/office/drawing/2014/main" id="{A37D6D61-E8AA-6445-BBF1-121EEE73A8CD}"/>
+              </a:ext>
+            </a:extLst>
+          </p:cNvPr>
+          <p:cNvPicPr>
+            <a:picLocks noChangeAspect="1"/>
+          </p:cNvPicPr>
+          <p:nvPr/>
+        </p:nvPicPr>
+        <p:blipFill>
+          <a:blip r:embed="rId3">
+            <a:extLst>
+              <a:ext uri="{96DAC541-7B7A-43D3-8B79-37D633B846F1}">
+                <asvg:svgBlip xmlns:asvg="http://schemas.microsoft.com/office/drawing/2016/SVG/main" r:embed="rId4"/>
+              </a:ext>
+            </a:extLst>
+          </a:blip>
+          <a:stretch>
+            <a:fillRect/>
+          </a:stretch>
+        </p:blipFill>
+        <p:spPr>
+          <a:xfrm>
+            <a:off x="7613248" y="274319"/>
+            <a:ext cx="1168685" cy="1168685"/>
+          </a:xfrm>
+          <a:prstGeom prst="rect">
+            <a:avLst/>
+          </a:prstGeom>
+        </p:spPr>
+      </p:pic>
+    </p:spTree>
+    <p:extLst>
+      <p:ext uri="{BB962C8B-B14F-4D97-AF65-F5344CB8AC3E}">
+        <p14:creationId xmlns:p14="http://schemas.microsoft.com/office/powerpoint/2010/main" val="377791589"/>
+      </p:ext>
+    </p:extLst>
+  </p:cSld>
+  <p:clrMapOvr>
+    <a:masterClrMapping/>
+  </p:clrMapOvr>
+</p:sld>
+</file>
+
+<file path=ppt/slides/slide3.xml><?xml version="1.0" encoding="utf-8"?>
+<p:sld xmlns:a="http://schemas.openxmlformats.org/drawingml/2006/main" xmlns:r="http://schemas.openxmlformats.org/officeDocument/2006/relationships" xmlns:p="http://schemas.openxmlformats.org/presentationml/2006/main">
+  <p:cSld>
+    <p:spTree>
+      <p:nvGrpSpPr>
+        <p:cNvPr id="1" name="Shape 89"/>
+        <p:cNvGrpSpPr/>
+        <p:nvPr/>
+      </p:nvGrpSpPr>
+      <p:grpSpPr>
+        <a:xfrm>
+          <a:off x="0" y="0"/>
+          <a:ext cx="0" cy="0"/>
+          <a:chOff x="0" y="0"/>
+          <a:chExt cx="0" cy="0"/>
+        </a:xfrm>
+      </p:grpSpPr>
+      <p:sp>
+        <p:nvSpPr>
+          <p:cNvPr id="90" name="Google Shape;90;p3"/>
+          <p:cNvSpPr txBox="1">
+            <a:spLocks noGrp="1"/>
+          </p:cNvSpPr>
+          <p:nvPr>
+            <p:ph type="body" idx="1"/>
+          </p:nvPr>
+        </p:nvSpPr>
+        <p:spPr>
+          <a:xfrm>
+            <a:off x="363018" y="1058479"/>
+            <a:ext cx="6400948" cy="3825247"/>
+          </a:xfrm>
+          <a:prstGeom prst="rect">
+            <a:avLst/>
+          </a:prstGeom>
+          <a:noFill/>
+          <a:ln>
+            <a:noFill/>
+          </a:ln>
+        </p:spPr>
+        <p:txBody>
+          <a:bodyPr spcFirstLastPara="1" wrap="square" lIns="91425" tIns="91425" rIns="91425" bIns="91425" anchor="t" anchorCtr="0">
+            <a:noAutofit/>
+          </a:bodyPr>
+          <a:lstStyle/>
+          <a:p>
+            <a:pPr marL="514350" indent="-285750" algn="just">
+              <a:buClr>
+                <a:srgbClr val="92D050"/>
+              </a:buClr>
+            </a:pPr>
+            <a:r>
+              <a:rPr lang="pt-PT" sz="1400" dirty="0"/>
+              <a:t>Neste projeto foi-nos proposto a realização de várias tarefas de forma a analisar a qualidade das duas soluções desenvolvidas pelos alunos de </a:t>
+            </a:r>
+            <a:r>
+              <a:rPr lang="pt-PT" sz="1400" i="1" dirty="0"/>
+              <a:t>POO </a:t>
+            </a:r>
+            <a:r>
+              <a:rPr lang="pt-PT" sz="1400" dirty="0"/>
+              <a:t>no ano letivo de 2018/2019. </a:t>
+            </a:r>
+          </a:p>
+          <a:p>
+            <a:pPr marL="514350" indent="-285750" algn="just">
+              <a:buClr>
+                <a:srgbClr val="92D050"/>
+              </a:buClr>
+            </a:pPr>
+            <a:endParaRPr lang="pt-PT" sz="1600" dirty="0"/>
+          </a:p>
+          <a:p>
+            <a:pPr marL="514350" indent="-285750" algn="just">
+              <a:buClr>
+                <a:srgbClr val="92D050"/>
+              </a:buClr>
+            </a:pPr>
+            <a:r>
+              <a:rPr lang="pt-PT" sz="1400" dirty="0"/>
+              <a:t>As duas soluções da aplicação em causa, denominada por </a:t>
+            </a:r>
+            <a:r>
+              <a:rPr lang="pt-PT" sz="1400" i="1" dirty="0" err="1"/>
+              <a:t>UmCarroJá</a:t>
+            </a:r>
+            <a:r>
+              <a:rPr lang="pt-PT" sz="1400" dirty="0"/>
+              <a:t>, foram disponibilizadas na página desta unidade curricular. Os nomes associados a cada uma das mesmas são </a:t>
+            </a:r>
+            <a:r>
+              <a:rPr lang="pt-PT" sz="1400" b="1" dirty="0"/>
+              <a:t>demo1</a:t>
+            </a:r>
+            <a:r>
+              <a:rPr lang="pt-PT" sz="1400" dirty="0"/>
+              <a:t> e </a:t>
+            </a:r>
+            <a:r>
+              <a:rPr lang="pt-PT" sz="1400" b="1" i="1" dirty="0"/>
+              <a:t>demo2</a:t>
+            </a:r>
+            <a:r>
+              <a:rPr lang="pt-PT" sz="1400" i="1" dirty="0"/>
+              <a:t>.</a:t>
+            </a:r>
+            <a:endParaRPr lang="pt-PT" sz="1400" dirty="0"/>
+          </a:p>
+          <a:p>
+            <a:pPr marL="514350" indent="-285750" algn="just">
+              <a:buClr>
+                <a:srgbClr val="92D050"/>
+              </a:buClr>
+            </a:pPr>
+            <a:endParaRPr lang="pt-PT" sz="1400" dirty="0"/>
+          </a:p>
+          <a:p>
+            <a:pPr marL="514350" indent="-285750" algn="just">
+              <a:buClr>
+                <a:srgbClr val="92D050"/>
+              </a:buClr>
+            </a:pPr>
+            <a:r>
+              <a:rPr lang="pt-PT" sz="1400" dirty="0"/>
+              <a:t>De forma sucinta, estas tarefas tratam, em ambas as versões, o seguinte:</a:t>
+            </a:r>
+          </a:p>
+          <a:p>
+            <a:pPr marL="971550" lvl="1" indent="-285750" algn="just">
+              <a:buClr>
+                <a:srgbClr val="92D050"/>
+              </a:buClr>
+            </a:pPr>
+            <a:r>
+              <a:rPr lang="pt-PT" sz="1400" dirty="0"/>
+              <a:t>Identificação de </a:t>
+            </a:r>
+            <a:r>
+              <a:rPr lang="pt-PT" sz="1400" i="1" dirty="0"/>
+              <a:t>bad smells</a:t>
+            </a:r>
+            <a:r>
+              <a:rPr lang="pt-PT" sz="1400" dirty="0"/>
+              <a:t> no código fonte e ainda o seu </a:t>
+            </a:r>
+            <a:r>
+              <a:rPr lang="pt-PT" sz="1400" i="1" dirty="0"/>
+              <a:t>technical debt;</a:t>
+            </a:r>
+          </a:p>
+          <a:p>
+            <a:pPr marL="971550" lvl="1" indent="-285750" algn="just">
+              <a:buClr>
+                <a:srgbClr val="92D050"/>
+              </a:buClr>
+            </a:pPr>
+            <a:r>
+              <a:rPr lang="pt-PT" sz="1400" dirty="0"/>
+              <a:t>Aplicação de </a:t>
+            </a:r>
+            <a:r>
+              <a:rPr lang="pt-PT" sz="1400" i="1" dirty="0"/>
+              <a:t>refactoring </a:t>
+            </a:r>
+            <a:r>
+              <a:rPr lang="pt-PT" sz="1400" dirty="0"/>
+              <a:t>de modo a eliminar os </a:t>
+            </a:r>
+            <a:r>
+              <a:rPr lang="pt-PT" sz="1400" i="1" dirty="0"/>
+              <a:t>bad smells </a:t>
+            </a:r>
+            <a:r>
+              <a:rPr lang="pt-PT" sz="1400" dirty="0"/>
+              <a:t>encontrados;</a:t>
+            </a:r>
+          </a:p>
+          <a:p>
+            <a:pPr marL="971550" lvl="1" indent="-285750" algn="just">
+              <a:buClr>
+                <a:srgbClr val="92D050"/>
+              </a:buClr>
+            </a:pPr>
+            <a:r>
+              <a:rPr lang="pt-PT" sz="1400" dirty="0"/>
+              <a:t>Teste do </a:t>
+            </a:r>
+            <a:r>
+              <a:rPr lang="pt-PT" sz="1400" i="1" dirty="0"/>
+              <a:t>software</a:t>
+            </a:r>
+            <a:r>
+              <a:rPr lang="pt-PT" sz="1400" dirty="0"/>
+              <a:t> implementado;</a:t>
+            </a:r>
+          </a:p>
+          <a:p>
+            <a:pPr marL="971550" lvl="1" indent="-285750" algn="just">
+              <a:buClr>
+                <a:srgbClr val="92D050"/>
+              </a:buClr>
+            </a:pPr>
+            <a:r>
+              <a:rPr lang="pt-PT" sz="1400" dirty="0"/>
+              <a:t>Análise de desempenho das versões iniciais e finais de cada implementação.</a:t>
+            </a:r>
+          </a:p>
+        </p:txBody>
+      </p:sp>
+      <p:sp>
+        <p:nvSpPr>
+          <p:cNvPr id="91" name="Google Shape;91;p3"/>
+          <p:cNvSpPr txBox="1">
+            <a:spLocks noGrp="1"/>
+          </p:cNvSpPr>
+          <p:nvPr>
+            <p:ph type="sldNum" idx="12"/>
+          </p:nvPr>
+        </p:nvSpPr>
+        <p:spPr>
+          <a:xfrm>
+            <a:off x="8543227" y="4749851"/>
+            <a:ext cx="548700" cy="393600"/>
+          </a:xfrm>
+          <a:prstGeom prst="rect">
+            <a:avLst/>
+          </a:prstGeom>
+          <a:noFill/>
+          <a:ln>
+            <a:noFill/>
+          </a:ln>
+        </p:spPr>
+        <p:txBody>
+          <a:bodyPr spcFirstLastPara="1" wrap="square" lIns="91425" tIns="91425" rIns="91425" bIns="91425" anchor="t" anchorCtr="0">
+            <a:noAutofit/>
+          </a:bodyPr>
+          <a:lstStyle/>
+          <a:p>
+            <a:pPr marL="0" lvl="0" indent="0" algn="r" rtl="0">
+              <a:lnSpc>
+                <a:spcPct val="100000"/>
+              </a:lnSpc>
+              <a:spcBef>
+                <a:spcPts val="0"/>
+              </a:spcBef>
+              <a:spcAft>
+                <a:spcPts val="0"/>
+              </a:spcAft>
+              <a:buSzPts val="1300"/>
+              <a:buNone/>
+            </a:pPr>
+            <a:fld id="{00000000-1234-1234-1234-123412341234}" type="slidenum">
+              <a:rPr lang="en"/>
+              <a:t>3</a:t>
+            </a:fld>
+            <a:endParaRPr dirty="0"/>
+          </a:p>
+        </p:txBody>
+      </p:sp>
+      <p:sp>
+        <p:nvSpPr>
+          <p:cNvPr id="92" name="Google Shape;92;p3"/>
+          <p:cNvSpPr txBox="1">
+            <a:spLocks noGrp="1"/>
+          </p:cNvSpPr>
+          <p:nvPr>
+            <p:ph type="title"/>
+          </p:nvPr>
+        </p:nvSpPr>
+        <p:spPr>
+          <a:xfrm>
+            <a:off x="467725" y="648975"/>
+            <a:ext cx="2254500" cy="409500"/>
+          </a:xfrm>
+          <a:prstGeom prst="rect">
+            <a:avLst/>
+          </a:prstGeom>
+          <a:noFill/>
+          <a:ln>
+            <a:noFill/>
+          </a:ln>
+        </p:spPr>
+        <p:txBody>
+          <a:bodyPr spcFirstLastPara="1" wrap="square" lIns="91425" tIns="91425" rIns="91425" bIns="91425" anchor="b" anchorCtr="0">
+            <a:noAutofit/>
+          </a:bodyPr>
+          <a:lstStyle/>
+          <a:p>
+            <a:pPr marL="0" lvl="0" indent="0" algn="l" rtl="0">
+              <a:lnSpc>
+                <a:spcPct val="100000"/>
+              </a:lnSpc>
+              <a:spcBef>
+                <a:spcPts val="0"/>
+              </a:spcBef>
+              <a:spcAft>
+                <a:spcPts val="0"/>
+              </a:spcAft>
+              <a:buSzPts val="2400"/>
+              <a:buNone/>
+            </a:pPr>
+            <a:r>
+              <a:rPr lang="en" dirty="0">
+                <a:solidFill>
+                  <a:srgbClr val="92D050"/>
+                </a:solidFill>
+              </a:rPr>
+              <a:t>Introdução</a:t>
+            </a:r>
+            <a:endParaRPr dirty="0">
+              <a:solidFill>
+                <a:srgbClr val="92D050"/>
+              </a:solidFill>
+            </a:endParaRPr>
+          </a:p>
+        </p:txBody>
+      </p:sp>
+      <p:pic>
+        <p:nvPicPr>
+          <p:cNvPr id="93" name="Google Shape;93;p3"/>
+          <p:cNvPicPr preferRelativeResize="0"/>
+          <p:nvPr/>
+        </p:nvPicPr>
+        <p:blipFill rotWithShape="1">
+          <a:blip r:embed="rId3">
+            <a:alphaModFix/>
+          </a:blip>
+          <a:srcRect/>
+          <a:stretch/>
+        </p:blipFill>
+        <p:spPr>
+          <a:xfrm>
+            <a:off x="7759186" y="545650"/>
+            <a:ext cx="1025650" cy="1025650"/>
+          </a:xfrm>
+          <a:prstGeom prst="rect">
+            <a:avLst/>
+          </a:prstGeom>
+          <a:noFill/>
+          <a:ln>
+            <a:noFill/>
+          </a:ln>
+        </p:spPr>
+      </p:pic>
+    </p:spTree>
+  </p:cSld>
+  <p:clrMapOvr>
+    <a:masterClrMapping/>
+  </p:clrMapOvr>
+</p:sld>
+</file>
+
+<file path=ppt/slides/slide30.xml><?xml version="1.0" encoding="utf-8"?>
 <p:sld xmlns:a="http://schemas.openxmlformats.org/drawingml/2006/main" xmlns:r="http://schemas.openxmlformats.org/officeDocument/2006/relationships" xmlns:p="http://schemas.openxmlformats.org/presentationml/2006/main">
   <p:cSld>
     <p:bg>
@@ -15869,7 +17679,7 @@
             </a:pPr>
             <a:fld id="{00000000-1234-1234-1234-123412341234}" type="slidenum">
               <a:rPr lang="en"/>
-              <a:t>27</a:t>
+              <a:t>30</a:t>
             </a:fld>
             <a:endParaRPr dirty="0"/>
           </a:p>
@@ -16173,7 +17983,7 @@
 </p:sld>
 </file>
 
-<file path=ppt/slides/slide28.xml><?xml version="1.0" encoding="utf-8"?>
+<file path=ppt/slides/slide31.xml><?xml version="1.0" encoding="utf-8"?>
 <p:sld xmlns:a="http://schemas.openxmlformats.org/drawingml/2006/main" xmlns:r="http://schemas.openxmlformats.org/officeDocument/2006/relationships" xmlns:p="http://schemas.openxmlformats.org/presentationml/2006/main">
   <p:cSld>
     <p:bg>
@@ -16350,376 +18160,12 @@
             </a:pPr>
             <a:fld id="{00000000-1234-1234-1234-123412341234}" type="slidenum">
               <a:rPr lang="en"/>
-              <a:t>28</a:t>
+              <a:t>31</a:t>
             </a:fld>
             <a:endParaRPr dirty="0"/>
           </a:p>
         </p:txBody>
       </p:sp>
-    </p:spTree>
-  </p:cSld>
-  <p:clrMapOvr>
-    <a:masterClrMapping/>
-  </p:clrMapOvr>
-</p:sld>
-</file>
-
-<file path=ppt/slides/slide3.xml><?xml version="1.0" encoding="utf-8"?>
-<p:sld xmlns:a="http://schemas.openxmlformats.org/drawingml/2006/main" xmlns:r="http://schemas.openxmlformats.org/officeDocument/2006/relationships" xmlns:p="http://schemas.openxmlformats.org/presentationml/2006/main">
-  <p:cSld>
-    <p:spTree>
-      <p:nvGrpSpPr>
-        <p:cNvPr id="1" name="Shape 89"/>
-        <p:cNvGrpSpPr/>
-        <p:nvPr/>
-      </p:nvGrpSpPr>
-      <p:grpSpPr>
-        <a:xfrm>
-          <a:off x="0" y="0"/>
-          <a:ext cx="0" cy="0"/>
-          <a:chOff x="0" y="0"/>
-          <a:chExt cx="0" cy="0"/>
-        </a:xfrm>
-      </p:grpSpPr>
-      <p:sp>
-        <p:nvSpPr>
-          <p:cNvPr id="90" name="Google Shape;90;p3"/>
-          <p:cNvSpPr txBox="1">
-            <a:spLocks noGrp="1"/>
-          </p:cNvSpPr>
-          <p:nvPr>
-            <p:ph type="body" idx="1"/>
-          </p:nvPr>
-        </p:nvSpPr>
-        <p:spPr>
-          <a:xfrm>
-            <a:off x="363018" y="1058479"/>
-            <a:ext cx="6400948" cy="3825247"/>
-          </a:xfrm>
-          <a:prstGeom prst="rect">
-            <a:avLst/>
-          </a:prstGeom>
-          <a:noFill/>
-          <a:ln>
-            <a:noFill/>
-          </a:ln>
-        </p:spPr>
-        <p:txBody>
-          <a:bodyPr spcFirstLastPara="1" wrap="square" lIns="91425" tIns="91425" rIns="91425" bIns="91425" anchor="t" anchorCtr="0">
-            <a:noAutofit/>
-          </a:bodyPr>
-          <a:lstStyle/>
-          <a:p>
-            <a:pPr marL="514350" indent="-285750" algn="just">
-              <a:buClr>
-                <a:srgbClr val="92D050"/>
-              </a:buClr>
-            </a:pPr>
-            <a:r>
-              <a:rPr lang="pt-PT" sz="1400" dirty="0"/>
-              <a:t>Neste projeto foi-nos proposto a realização de várias tarefas de forma a analisar a qualidade das duas soluções desenvolvidas pelos alunos de </a:t>
-            </a:r>
-            <a:r>
-              <a:rPr lang="pt-PT" sz="1400" i="1" dirty="0"/>
-              <a:t>POO </a:t>
-            </a:r>
-            <a:r>
-              <a:rPr lang="pt-PT" sz="1400" dirty="0"/>
-              <a:t>no ano letivo de 2018/2019. </a:t>
-            </a:r>
-          </a:p>
-          <a:p>
-            <a:pPr marL="514350" indent="-285750" algn="just">
-              <a:buClr>
-                <a:srgbClr val="92D050"/>
-              </a:buClr>
-            </a:pPr>
-            <a:endParaRPr lang="pt-PT" sz="1600" dirty="0"/>
-          </a:p>
-          <a:p>
-            <a:pPr marL="514350" indent="-285750" algn="just">
-              <a:buClr>
-                <a:srgbClr val="92D050"/>
-              </a:buClr>
-            </a:pPr>
-            <a:r>
-              <a:rPr lang="pt-PT" sz="1400" dirty="0"/>
-              <a:t>As duas soluções da aplicação em causa, denominada por </a:t>
-            </a:r>
-            <a:r>
-              <a:rPr lang="pt-PT" sz="1400" i="1" dirty="0" err="1"/>
-              <a:t>UmCarroJá</a:t>
-            </a:r>
-            <a:r>
-              <a:rPr lang="pt-PT" sz="1400" dirty="0"/>
-              <a:t>, foram disponibilizadas na página desta unidade curricular. Os nomes associados a cada uma das mesmas são </a:t>
-            </a:r>
-            <a:r>
-              <a:rPr lang="pt-PT" sz="1400" b="1" dirty="0"/>
-              <a:t>demo1</a:t>
-            </a:r>
-            <a:r>
-              <a:rPr lang="pt-PT" sz="1400" dirty="0"/>
-              <a:t> e </a:t>
-            </a:r>
-            <a:r>
-              <a:rPr lang="pt-PT" sz="1400" b="1" i="1" dirty="0"/>
-              <a:t>demo2</a:t>
-            </a:r>
-            <a:r>
-              <a:rPr lang="pt-PT" sz="1400" i="1" dirty="0"/>
-              <a:t>.</a:t>
-            </a:r>
-            <a:endParaRPr lang="pt-PT" sz="1400" dirty="0"/>
-          </a:p>
-          <a:p>
-            <a:pPr marL="514350" indent="-285750" algn="just">
-              <a:buClr>
-                <a:srgbClr val="92D050"/>
-              </a:buClr>
-            </a:pPr>
-            <a:endParaRPr lang="pt-PT" sz="1400" dirty="0"/>
-          </a:p>
-          <a:p>
-            <a:pPr marL="514350" indent="-285750" algn="just">
-              <a:buClr>
-                <a:srgbClr val="92D050"/>
-              </a:buClr>
-            </a:pPr>
-            <a:r>
-              <a:rPr lang="pt-PT" sz="1400" dirty="0"/>
-              <a:t>De forma sucinta, estas tarefas tratam, em ambas as versões, o seguinte:</a:t>
-            </a:r>
-          </a:p>
-          <a:p>
-            <a:pPr marL="971550" lvl="1" indent="-285750" algn="just">
-              <a:buClr>
-                <a:srgbClr val="92D050"/>
-              </a:buClr>
-            </a:pPr>
-            <a:r>
-              <a:rPr lang="pt-PT" sz="1400" dirty="0"/>
-              <a:t>Identificação de </a:t>
-            </a:r>
-            <a:r>
-              <a:rPr lang="pt-PT" sz="1400" i="1" dirty="0" err="1"/>
-              <a:t>bad</a:t>
-            </a:r>
-            <a:r>
-              <a:rPr lang="pt-PT" sz="1400" i="1" dirty="0"/>
-              <a:t> smells</a:t>
-            </a:r>
-            <a:r>
-              <a:rPr lang="pt-PT" sz="1400" dirty="0"/>
-              <a:t> no código fonte e ainda o seu </a:t>
-            </a:r>
-            <a:r>
-              <a:rPr lang="pt-PT" sz="1400" i="1" dirty="0"/>
-              <a:t>technical debt;</a:t>
-            </a:r>
-          </a:p>
-          <a:p>
-            <a:pPr marL="971550" lvl="1" indent="-285750" algn="just">
-              <a:buClr>
-                <a:srgbClr val="92D050"/>
-              </a:buClr>
-            </a:pPr>
-            <a:r>
-              <a:rPr lang="pt-PT" sz="1400" dirty="0"/>
-              <a:t>Aplicação de </a:t>
-            </a:r>
-            <a:r>
-              <a:rPr lang="pt-PT" sz="1400" i="1" dirty="0" err="1"/>
-              <a:t>refactoring</a:t>
-            </a:r>
-            <a:r>
-              <a:rPr lang="pt-PT" sz="1400" i="1" dirty="0"/>
-              <a:t> </a:t>
-            </a:r>
-            <a:r>
-              <a:rPr lang="pt-PT" sz="1400" dirty="0"/>
-              <a:t>de modo a eliminar os </a:t>
-            </a:r>
-            <a:r>
-              <a:rPr lang="pt-PT" sz="1400" i="1" dirty="0" err="1"/>
-              <a:t>bad</a:t>
-            </a:r>
-            <a:r>
-              <a:rPr lang="pt-PT" sz="1400" i="1" dirty="0"/>
-              <a:t> smells </a:t>
-            </a:r>
-            <a:r>
-              <a:rPr lang="pt-PT" sz="1400" dirty="0"/>
-              <a:t>encontrados;</a:t>
-            </a:r>
-          </a:p>
-          <a:p>
-            <a:pPr marL="971550" lvl="1" indent="-285750" algn="just">
-              <a:buClr>
-                <a:srgbClr val="92D050"/>
-              </a:buClr>
-            </a:pPr>
-            <a:r>
-              <a:rPr lang="pt-PT" sz="1400" dirty="0"/>
-              <a:t>Teste do </a:t>
-            </a:r>
-            <a:r>
-              <a:rPr lang="pt-PT" sz="1400" i="1" dirty="0"/>
-              <a:t>software</a:t>
-            </a:r>
-            <a:r>
-              <a:rPr lang="pt-PT" sz="1400" dirty="0"/>
-              <a:t> implementado;</a:t>
-            </a:r>
-          </a:p>
-          <a:p>
-            <a:pPr marL="971550" lvl="1" indent="-285750" algn="just">
-              <a:buClr>
-                <a:srgbClr val="92D050"/>
-              </a:buClr>
-            </a:pPr>
-            <a:r>
-              <a:rPr lang="pt-PT" sz="1400" dirty="0"/>
-              <a:t>Análise de desempenho das versões iniciais e finais de cada implementação.</a:t>
-            </a:r>
-          </a:p>
-        </p:txBody>
-      </p:sp>
-      <p:sp>
-        <p:nvSpPr>
-          <p:cNvPr id="91" name="Google Shape;91;p3"/>
-          <p:cNvSpPr txBox="1">
-            <a:spLocks noGrp="1"/>
-          </p:cNvSpPr>
-          <p:nvPr>
-            <p:ph type="sldNum" idx="12"/>
-          </p:nvPr>
-        </p:nvSpPr>
-        <p:spPr>
-          <a:xfrm>
-            <a:off x="8543227" y="4749851"/>
-            <a:ext cx="548700" cy="393600"/>
-          </a:xfrm>
-          <a:prstGeom prst="rect">
-            <a:avLst/>
-          </a:prstGeom>
-          <a:noFill/>
-          <a:ln>
-            <a:noFill/>
-          </a:ln>
-        </p:spPr>
-        <p:txBody>
-          <a:bodyPr spcFirstLastPara="1" wrap="square" lIns="91425" tIns="91425" rIns="91425" bIns="91425" anchor="t" anchorCtr="0">
-            <a:noAutofit/>
-          </a:bodyPr>
-          <a:lstStyle/>
-          <a:p>
-            <a:pPr marL="0" lvl="0" indent="0" algn="r" rtl="0">
-              <a:lnSpc>
-                <a:spcPct val="100000"/>
-              </a:lnSpc>
-              <a:spcBef>
-                <a:spcPts val="0"/>
-              </a:spcBef>
-              <a:spcAft>
-                <a:spcPts val="0"/>
-              </a:spcAft>
-              <a:buSzPts val="1300"/>
-              <a:buNone/>
-            </a:pPr>
-            <a:fld id="{00000000-1234-1234-1234-123412341234}" type="slidenum">
-              <a:rPr lang="en"/>
-              <a:t>3</a:t>
-            </a:fld>
-            <a:endParaRPr dirty="0"/>
-          </a:p>
-        </p:txBody>
-      </p:sp>
-      <p:sp>
-        <p:nvSpPr>
-          <p:cNvPr id="92" name="Google Shape;92;p3"/>
-          <p:cNvSpPr txBox="1">
-            <a:spLocks noGrp="1"/>
-          </p:cNvSpPr>
-          <p:nvPr>
-            <p:ph type="title"/>
-          </p:nvPr>
-        </p:nvSpPr>
-        <p:spPr>
-          <a:xfrm>
-            <a:off x="467725" y="648975"/>
-            <a:ext cx="2254500" cy="409500"/>
-          </a:xfrm>
-          <a:prstGeom prst="rect">
-            <a:avLst/>
-          </a:prstGeom>
-          <a:noFill/>
-          <a:ln>
-            <a:noFill/>
-          </a:ln>
-        </p:spPr>
-        <p:txBody>
-          <a:bodyPr spcFirstLastPara="1" wrap="square" lIns="91425" tIns="91425" rIns="91425" bIns="91425" anchor="b" anchorCtr="0">
-            <a:noAutofit/>
-          </a:bodyPr>
-          <a:lstStyle/>
-          <a:p>
-            <a:pPr marL="0" lvl="0" indent="0" algn="l" rtl="0">
-              <a:lnSpc>
-                <a:spcPct val="100000"/>
-              </a:lnSpc>
-              <a:spcBef>
-                <a:spcPts val="0"/>
-              </a:spcBef>
-              <a:spcAft>
-                <a:spcPts val="0"/>
-              </a:spcAft>
-              <a:buSzPts val="2400"/>
-              <a:buNone/>
-            </a:pPr>
-            <a:r>
-              <a:rPr lang="en" dirty="0">
-                <a:solidFill>
-                  <a:srgbClr val="92D050"/>
-                </a:solidFill>
-              </a:rPr>
-              <a:t>Introdução</a:t>
-            </a:r>
-            <a:endParaRPr dirty="0">
-              <a:solidFill>
-                <a:srgbClr val="92D050"/>
-              </a:solidFill>
-            </a:endParaRPr>
-          </a:p>
-        </p:txBody>
-      </p:sp>
-      <p:pic>
-        <p:nvPicPr>
-          <p:cNvPr id="93" name="Google Shape;93;p3"/>
-          <p:cNvPicPr preferRelativeResize="0"/>
-          <p:nvPr/>
-        </p:nvPicPr>
-        <p:blipFill rotWithShape="1">
-          <a:blip r:embed="rId3">
-            <a:alphaModFix/>
-          </a:blip>
-          <a:srcRect/>
-          <a:stretch/>
-        </p:blipFill>
-        <p:spPr>
-          <a:xfrm>
-            <a:off x="7759186" y="545650"/>
-            <a:ext cx="1025650" cy="1025650"/>
-          </a:xfrm>
-          <a:prstGeom prst="rect">
-            <a:avLst/>
-          </a:prstGeom>
-          <a:noFill/>
-          <a:ln>
-            <a:noFill/>
-          </a:ln>
-        </p:spPr>
-      </p:pic>
     </p:spTree>
   </p:cSld>
   <p:clrMapOvr>
@@ -16811,12 +18257,8 @@
               <a:t>, permitindo aumentar a deteção de um maior leque de </a:t>
             </a:r>
             <a:r>
-              <a:rPr lang="pt-PT" sz="1400" i="1" dirty="0" err="1"/>
-              <a:t>bad</a:t>
-            </a:r>
-            <a:r>
               <a:rPr lang="pt-PT" sz="1400" i="1" dirty="0"/>
-              <a:t> smells</a:t>
+              <a:t>bad smells</a:t>
             </a:r>
             <a:r>
               <a:rPr lang="pt-PT" sz="1400" dirty="0"/>

</xml_diff>

<commit_message>
#97 Commit: PPT + Relatório     --> apaguei o ficheiro jar com as regras do SonarQube da pasta do SonarQube.
</commit_message>
<xml_diff>
--- a/Apresentação.pptx
+++ b/Apresentação.pptx
@@ -5,7 +5,7 @@
     <p:sldMasterId id="2147483648" r:id="rId1"/>
   </p:sldMasterIdLst>
   <p:notesMasterIdLst>
-    <p:notesMasterId r:id="rId33"/>
+    <p:notesMasterId r:id="rId34"/>
   </p:notesMasterIdLst>
   <p:sldIdLst>
     <p:sldId id="256" r:id="rId2"/>
@@ -30,15 +30,16 @@
     <p:sldId id="308" r:id="rId21"/>
     <p:sldId id="307" r:id="rId22"/>
     <p:sldId id="294" r:id="rId23"/>
-    <p:sldId id="295" r:id="rId24"/>
-    <p:sldId id="285" r:id="rId25"/>
-    <p:sldId id="288" r:id="rId26"/>
-    <p:sldId id="296" r:id="rId27"/>
-    <p:sldId id="297" r:id="rId28"/>
-    <p:sldId id="299" r:id="rId29"/>
-    <p:sldId id="306" r:id="rId30"/>
-    <p:sldId id="281" r:id="rId31"/>
-    <p:sldId id="282" r:id="rId32"/>
+    <p:sldId id="309" r:id="rId24"/>
+    <p:sldId id="295" r:id="rId25"/>
+    <p:sldId id="285" r:id="rId26"/>
+    <p:sldId id="288" r:id="rId27"/>
+    <p:sldId id="296" r:id="rId28"/>
+    <p:sldId id="297" r:id="rId29"/>
+    <p:sldId id="299" r:id="rId30"/>
+    <p:sldId id="306" r:id="rId31"/>
+    <p:sldId id="281" r:id="rId32"/>
+    <p:sldId id="282" r:id="rId33"/>
   </p:sldIdLst>
   <p:sldSz cx="9144000" cy="5143500" type="screen16x9"/>
   <p:notesSz cx="6858000" cy="9144000"/>
@@ -276,7 +277,7 @@
       <p15:sldGuideLst xmlns:p15="http://schemas.microsoft.com/office/powerpoint/2012/main"/>
     </p:ext>
     <p:ext uri="http://customooxmlschemas.google.com/">
-      <go:slidesCustomData xmlns="" xmlns:mc="http://schemas.openxmlformats.org/markup-compatibility/2006" xmlns:mv="urn:schemas-microsoft-com:mac:vml" xmlns:c="http://schemas.openxmlformats.org/drawingml/2006/chart" xmlns:dgm="http://schemas.openxmlformats.org/drawingml/2006/diagram" xmlns:o="urn:schemas-microsoft-com:office:office" xmlns:v="urn:schemas-microsoft-com:vml" xmlns:pvml="urn:schemas-microsoft-com:office:powerpoint" xmlns:com="http://schemas.openxmlformats.org/drawingml/2006/compatibility" xmlns:p14="http://schemas.microsoft.com/office/powerpoint/2010/main" xmlns:p15="http://schemas.microsoft.com/office/powerpoint/2012/main" xmlns:go="http://customooxmlschemas.google.com/" r:id="rId34" roundtripDataSignature="AMtx7mi2giJIhmxq+e/rTQEB/kbV3AzsFA=="/>
+      <go:slidesCustomData xmlns:go="http://customooxmlschemas.google.com/" xmlns:p15="http://schemas.microsoft.com/office/powerpoint/2012/main" xmlns:p14="http://schemas.microsoft.com/office/powerpoint/2010/main" xmlns:com="http://schemas.openxmlformats.org/drawingml/2006/compatibility" xmlns:pvml="urn:schemas-microsoft-com:office:powerpoint" xmlns:v="urn:schemas-microsoft-com:vml" xmlns:o="urn:schemas-microsoft-com:office:office" xmlns:dgm="http://schemas.openxmlformats.org/drawingml/2006/diagram" xmlns:c="http://schemas.openxmlformats.org/drawingml/2006/chart" xmlns:mv="urn:schemas-microsoft-com:mac:vml" xmlns:mc="http://schemas.openxmlformats.org/markup-compatibility/2006" xmlns="" r:id="rId35" roundtripDataSignature="AMtx7mi2giJIhmxq+e/rTQEB/kbV3AzsFA=="/>
     </p:ext>
   </p:extLst>
 </p:presentation>
@@ -2619,6 +2620,133 @@
     </p:spTree>
     <p:extLst>
       <p:ext uri="{BB962C8B-B14F-4D97-AF65-F5344CB8AC3E}">
+        <p14:creationId xmlns:p14="http://schemas.microsoft.com/office/powerpoint/2010/main" val="1526959123"/>
+      </p:ext>
+    </p:extLst>
+  </p:cSld>
+  <p:clrMapOvr>
+    <a:masterClrMapping/>
+  </p:clrMapOvr>
+</p:notes>
+</file>
+
+<file path=ppt/notesSlides/notesSlide22.xml><?xml version="1.0" encoding="utf-8"?>
+<p:notes xmlns:a="http://schemas.openxmlformats.org/drawingml/2006/main" xmlns:r="http://schemas.openxmlformats.org/officeDocument/2006/relationships" xmlns:p="http://schemas.openxmlformats.org/presentationml/2006/main" showMasterSp="0" showMasterPhAnim="0">
+  <p:cSld>
+    <p:spTree>
+      <p:nvGrpSpPr>
+        <p:cNvPr id="1" name="Shape 146"/>
+        <p:cNvGrpSpPr/>
+        <p:nvPr/>
+      </p:nvGrpSpPr>
+      <p:grpSpPr>
+        <a:xfrm>
+          <a:off x="0" y="0"/>
+          <a:ext cx="0" cy="0"/>
+          <a:chOff x="0" y="0"/>
+          <a:chExt cx="0" cy="0"/>
+        </a:xfrm>
+      </p:grpSpPr>
+      <p:sp>
+        <p:nvSpPr>
+          <p:cNvPr id="147" name="Google Shape;147;g5c66568b58_0_22:notes"/>
+          <p:cNvSpPr txBox="1">
+            <a:spLocks noGrp="1"/>
+          </p:cNvSpPr>
+          <p:nvPr>
+            <p:ph type="body" idx="1"/>
+          </p:nvPr>
+        </p:nvSpPr>
+        <p:spPr>
+          <a:xfrm>
+            <a:off x="685800" y="4343400"/>
+            <a:ext cx="5486400" cy="4114800"/>
+          </a:xfrm>
+          <a:prstGeom prst="rect">
+            <a:avLst/>
+          </a:prstGeom>
+          <a:noFill/>
+          <a:ln>
+            <a:noFill/>
+          </a:ln>
+        </p:spPr>
+        <p:txBody>
+          <a:bodyPr spcFirstLastPara="1" wrap="square" lIns="91425" tIns="91425" rIns="91425" bIns="91425" anchor="t" anchorCtr="0">
+            <a:noAutofit/>
+          </a:bodyPr>
+          <a:lstStyle/>
+          <a:p>
+            <a:pPr marL="0" lvl="0" indent="0" algn="l" rtl="0">
+              <a:lnSpc>
+                <a:spcPct val="100000"/>
+              </a:lnSpc>
+              <a:spcBef>
+                <a:spcPts val="0"/>
+              </a:spcBef>
+              <a:spcAft>
+                <a:spcPts val="0"/>
+              </a:spcAft>
+              <a:buSzPts val="1400"/>
+              <a:buNone/>
+            </a:pPr>
+            <a:endParaRPr dirty="0"/>
+          </a:p>
+        </p:txBody>
+      </p:sp>
+      <p:sp>
+        <p:nvSpPr>
+          <p:cNvPr id="148" name="Google Shape;148;g5c66568b58_0_22:notes"/>
+          <p:cNvSpPr>
+            <a:spLocks noGrp="1" noRot="1" noChangeAspect="1"/>
+          </p:cNvSpPr>
+          <p:nvPr>
+            <p:ph type="sldImg" idx="2"/>
+          </p:nvPr>
+        </p:nvSpPr>
+        <p:spPr>
+          <a:xfrm>
+            <a:off x="381000" y="685800"/>
+            <a:ext cx="6096000" cy="3429000"/>
+          </a:xfrm>
+          <a:custGeom>
+            <a:avLst/>
+            <a:gdLst/>
+            <a:ahLst/>
+            <a:cxnLst/>
+            <a:rect l="l" t="t" r="r" b="b"/>
+            <a:pathLst>
+              <a:path w="120000" h="120000" extrusionOk="0">
+                <a:moveTo>
+                  <a:pt x="0" y="0"/>
+                </a:moveTo>
+                <a:lnTo>
+                  <a:pt x="120000" y="0"/>
+                </a:lnTo>
+                <a:lnTo>
+                  <a:pt x="120000" y="120000"/>
+                </a:lnTo>
+                <a:lnTo>
+                  <a:pt x="0" y="120000"/>
+                </a:lnTo>
+                <a:close/>
+              </a:path>
+            </a:pathLst>
+          </a:custGeom>
+          <a:noFill/>
+          <a:ln w="9525" cap="flat" cmpd="sng">
+            <a:solidFill>
+              <a:srgbClr val="000000"/>
+            </a:solidFill>
+            <a:prstDash val="solid"/>
+            <a:round/>
+            <a:headEnd type="none" w="sm" len="sm"/>
+            <a:tailEnd type="none" w="sm" len="sm"/>
+          </a:ln>
+        </p:spPr>
+      </p:sp>
+    </p:spTree>
+    <p:extLst>
+      <p:ext uri="{BB962C8B-B14F-4D97-AF65-F5344CB8AC3E}">
         <p14:creationId xmlns:p14="http://schemas.microsoft.com/office/powerpoint/2010/main" val="2764593706"/>
       </p:ext>
     </p:extLst>
@@ -2629,7 +2757,7 @@
 </p:notes>
 </file>
 
-<file path=ppt/notesSlides/notesSlide22.xml><?xml version="1.0" encoding="utf-8"?>
+<file path=ppt/notesSlides/notesSlide23.xml><?xml version="1.0" encoding="utf-8"?>
 <p:notes xmlns:a="http://schemas.openxmlformats.org/drawingml/2006/main" xmlns:r="http://schemas.openxmlformats.org/officeDocument/2006/relationships" xmlns:p="http://schemas.openxmlformats.org/presentationml/2006/main" showMasterSp="0" showMasterPhAnim="0">
   <p:cSld>
     <p:spTree>
@@ -2756,7 +2884,7 @@
 </p:notes>
 </file>
 
-<file path=ppt/notesSlides/notesSlide23.xml><?xml version="1.0" encoding="utf-8"?>
+<file path=ppt/notesSlides/notesSlide24.xml><?xml version="1.0" encoding="utf-8"?>
 <p:notes xmlns:a="http://schemas.openxmlformats.org/drawingml/2006/main" xmlns:r="http://schemas.openxmlformats.org/officeDocument/2006/relationships" xmlns:p="http://schemas.openxmlformats.org/presentationml/2006/main" showMasterSp="0" showMasterPhAnim="0">
   <p:cSld>
     <p:spTree>
@@ -2883,7 +3011,7 @@
 </p:notes>
 </file>
 
-<file path=ppt/notesSlides/notesSlide24.xml><?xml version="1.0" encoding="utf-8"?>
+<file path=ppt/notesSlides/notesSlide25.xml><?xml version="1.0" encoding="utf-8"?>
 <p:notes xmlns:a="http://schemas.openxmlformats.org/drawingml/2006/main" xmlns:r="http://schemas.openxmlformats.org/officeDocument/2006/relationships" xmlns:p="http://schemas.openxmlformats.org/presentationml/2006/main" showMasterSp="0" showMasterPhAnim="0">
   <p:cSld>
     <p:spTree>
@@ -3010,7 +3138,7 @@
 </p:notes>
 </file>
 
-<file path=ppt/notesSlides/notesSlide25.xml><?xml version="1.0" encoding="utf-8"?>
+<file path=ppt/notesSlides/notesSlide26.xml><?xml version="1.0" encoding="utf-8"?>
 <p:notes xmlns:a="http://schemas.openxmlformats.org/drawingml/2006/main" xmlns:r="http://schemas.openxmlformats.org/officeDocument/2006/relationships" xmlns:p="http://schemas.openxmlformats.org/presentationml/2006/main" showMasterSp="0" showMasterPhAnim="0">
   <p:cSld>
     <p:spTree>
@@ -3137,7 +3265,7 @@
 </p:notes>
 </file>
 
-<file path=ppt/notesSlides/notesSlide26.xml><?xml version="1.0" encoding="utf-8"?>
+<file path=ppt/notesSlides/notesSlide27.xml><?xml version="1.0" encoding="utf-8"?>
 <p:notes xmlns:a="http://schemas.openxmlformats.org/drawingml/2006/main" xmlns:r="http://schemas.openxmlformats.org/officeDocument/2006/relationships" xmlns:p="http://schemas.openxmlformats.org/presentationml/2006/main" showMasterSp="0" showMasterPhAnim="0">
   <p:cSld>
     <p:spTree>
@@ -3259,7 +3387,7 @@
 </p:notes>
 </file>
 
-<file path=ppt/notesSlides/notesSlide27.xml><?xml version="1.0" encoding="utf-8"?>
+<file path=ppt/notesSlides/notesSlide28.xml><?xml version="1.0" encoding="utf-8"?>
 <p:notes xmlns:a="http://schemas.openxmlformats.org/drawingml/2006/main" xmlns:r="http://schemas.openxmlformats.org/officeDocument/2006/relationships" xmlns:p="http://schemas.openxmlformats.org/presentationml/2006/main" showMasterSp="0" showMasterPhAnim="0">
   <p:cSld>
     <p:spTree>
@@ -12505,12 +12633,8 @@
               </a:buClr>
             </a:pPr>
             <a:r>
-              <a:rPr lang="pt-PT" sz="1400" i="1" dirty="0" err="1"/>
-              <a:t>Blocker</a:t>
-            </a:r>
-            <a:r>
               <a:rPr lang="pt-PT" sz="1400" i="1" dirty="0"/>
-              <a:t>: </a:t>
+              <a:t>Blocker: </a:t>
             </a:r>
             <a:r>
               <a:rPr lang="pt-PT" sz="1400" dirty="0"/>
@@ -12524,12 +12648,8 @@
               </a:buClr>
             </a:pPr>
             <a:r>
-              <a:rPr lang="pt-PT" sz="1400" i="1" dirty="0" err="1"/>
-              <a:t>Critical</a:t>
-            </a:r>
-            <a:r>
               <a:rPr lang="pt-PT" sz="1400" i="1" dirty="0"/>
-              <a:t>: </a:t>
+              <a:t>Critical: </a:t>
             </a:r>
             <a:r>
               <a:rPr lang="pt-PT" sz="1400" dirty="0"/>
@@ -12558,12 +12678,8 @@
               </a:buClr>
             </a:pPr>
             <a:r>
-              <a:rPr lang="pt-PT" sz="1400" i="1" dirty="0" err="1"/>
-              <a:t>Minor</a:t>
-            </a:r>
-            <a:r>
               <a:rPr lang="pt-PT" sz="1400" i="1" dirty="0"/>
-              <a:t>: </a:t>
+              <a:t>Minor: </a:t>
             </a:r>
             <a:r>
               <a:rPr lang="pt-PT" sz="1400" dirty="0"/>
@@ -13093,7 +13209,7 @@
             </a:pPr>
             <a:r>
               <a:rPr lang="pt-PT" sz="1400" dirty="0"/>
-              <a:t>Esta supremacia surge pelo simples facto de a adição de novas regras à ferramenta </a:t>
+              <a:t>Esta supremacia surge pelos simples facto de a adição de novas regras à ferramenta </a:t>
             </a:r>
             <a:r>
               <a:rPr lang="pt-PT" sz="1400" i="1" dirty="0"/>
@@ -13101,7 +13217,66 @@
             </a:r>
             <a:r>
               <a:rPr lang="pt-PT" sz="1400" dirty="0"/>
-              <a:t> não ter sido muito explorada nas aulas e também não ter havido grande oportunidade para experimentar esta tarefa de forma mais cuidada. </a:t>
+              <a:t> ser impraticável. Isto é, quando as novas regras são geradas, é criado um novo ficheiro </a:t>
+            </a:r>
+            <a:r>
+              <a:rPr lang="pt-PT" sz="1400" i="1" dirty="0"/>
+              <a:t>jar</a:t>
+            </a:r>
+            <a:r>
+              <a:rPr lang="pt-PT" sz="1400" dirty="0"/>
+              <a:t> com a informação respetiva. Posteriormente, este é incorporado na ferramenta </a:t>
+            </a:r>
+            <a:r>
+              <a:rPr lang="pt-PT" sz="1400" i="1" dirty="0"/>
+              <a:t>SonarQube</a:t>
+            </a:r>
+            <a:r>
+              <a:rPr lang="pt-PT" sz="1400" dirty="0"/>
+              <a:t>, dentro da pasta “</a:t>
+            </a:r>
+            <a:r>
+              <a:rPr lang="pt-PT" sz="1400" i="1" dirty="0"/>
+              <a:t>extensions/plugins”</a:t>
+            </a:r>
+            <a:r>
+              <a:rPr lang="pt-PT" sz="1400" dirty="0"/>
+              <a:t>, tal como é sugerido no tutorial indicado nos </a:t>
+            </a:r>
+            <a:r>
+              <a:rPr lang="pt-PT" sz="1400" i="1" dirty="0"/>
+              <a:t>slides</a:t>
+            </a:r>
+            <a:r>
+              <a:rPr lang="pt-PT" sz="1400" dirty="0"/>
+              <a:t> dos docentes.</a:t>
+            </a:r>
+          </a:p>
+          <a:p>
+            <a:pPr marL="285750" indent="-285750" algn="just">
+              <a:buClr>
+                <a:srgbClr val="FF4900"/>
+              </a:buClr>
+            </a:pPr>
+            <a:endParaRPr lang="pt-PT" sz="1400" dirty="0"/>
+          </a:p>
+          <a:p>
+            <a:pPr marL="285750" indent="-285750" algn="just">
+              <a:buClr>
+                <a:srgbClr val="FF4900"/>
+              </a:buClr>
+            </a:pPr>
+            <a:r>
+              <a:rPr lang="pt-PT" sz="1400" dirty="0"/>
+              <a:t>Ao arrancar o software </a:t>
+            </a:r>
+            <a:r>
+              <a:rPr lang="pt-PT" sz="1400" i="1" dirty="0"/>
+              <a:t>SonarQube</a:t>
+            </a:r>
+            <a:r>
+              <a:rPr lang="pt-PT" sz="1400" dirty="0"/>
+              <a:t>, este acaba por colapsar ou terminar abruptamente sem indicar qualquer tipo de erro. Desta forma, tal como já tínhamos indicado juntos dos docentes, fica aqui explícito a razão pela qual a execução desta tarefa extra fica incompleta.</a:t>
             </a:r>
           </a:p>
           <a:p>
@@ -13479,7 +13654,15 @@
             </a:pPr>
             <a:r>
               <a:rPr lang="pt-PT" sz="1400" dirty="0"/>
-              <a:t>Nesta tarefa são utilizadas ferramentas como o autorefactor, </a:t>
+              <a:t>Nesta tarefa são utilizadas ferramentas como o </a:t>
+            </a:r>
+            <a:r>
+              <a:rPr lang="pt-PT" sz="1400" i="1" dirty="0"/>
+              <a:t>autorefactor</a:t>
+            </a:r>
+            <a:r>
+              <a:rPr lang="pt-PT" sz="1400" dirty="0"/>
+              <a:t>, </a:t>
             </a:r>
             <a:r>
               <a:rPr lang="pt-PT" sz="1400" i="1" dirty="0"/>
@@ -14819,7 +15002,7 @@
             </a:r>
             <a:r>
               <a:rPr lang="pt-PT" sz="1400" dirty="0"/>
-              <a:t> para testar a aplicação </a:t>
+              <a:t> para testar a aplicação </a:t>
             </a:r>
             <a:r>
               <a:rPr lang="pt-PT" sz="1400" i="1" dirty="0"/>
@@ -15344,7 +15527,34 @@
             </a:r>
             <a:r>
               <a:rPr lang="pt-PT" sz="1400" dirty="0"/>
-              <a:t>, permitindo assim uma simulação fidedigna e correta da aplicação.</a:t>
+              <a:t>, permitindo assim uma simulação fidedigna e correta da aplicação.</a:t>
+            </a:r>
+          </a:p>
+          <a:p>
+            <a:pPr marL="285750" indent="-285750"/>
+            <a:endParaRPr lang="pt-PT" sz="1400" dirty="0"/>
+          </a:p>
+          <a:p>
+            <a:pPr marL="285750" indent="-285750"/>
+            <a:r>
+              <a:rPr lang="pt-PT" sz="1400" dirty="0"/>
+              <a:t>Por fim, de maneira a executar o gerador proposto, foi necessário parametrizar numa variável o número de registos a serem escritos para o ficheiro </a:t>
+            </a:r>
+            <a:r>
+              <a:rPr lang="pt-PT" sz="1400" i="1" dirty="0"/>
+              <a:t>logs.bak,</a:t>
+            </a:r>
+            <a:r>
+              <a:rPr lang="pt-PT" sz="1400" dirty="0"/>
+              <a:t> que irá armazenar toda esta informação. Desta forma, durante a execução da função </a:t>
+            </a:r>
+            <a:r>
+              <a:rPr lang="pt-PT" sz="1400" b="1" i="1" dirty="0"/>
+              <a:t>genLogsIO</a:t>
+            </a:r>
+            <a:r>
+              <a:rPr lang="pt-PT" sz="1400" dirty="0"/>
+              <a:t> é perguntado ao utilizador quantos registos pretende produzir.</a:t>
             </a:r>
             <a:br>
               <a:rPr lang="pt-PT" sz="1400" dirty="0"/>
@@ -15640,8 +15850,8 @@
         </p:nvSpPr>
         <p:spPr>
           <a:xfrm>
-            <a:off x="467725" y="648975"/>
-            <a:ext cx="4963800" cy="409500"/>
+            <a:off x="467723" y="536895"/>
+            <a:ext cx="5622684" cy="521579"/>
           </a:xfrm>
           <a:prstGeom prst="rect">
             <a:avLst/>
@@ -15657,19 +15867,6 @@
           </a:bodyPr>
           <a:lstStyle/>
           <a:p>
-            <a:pPr marL="0" lvl="0" indent="0" algn="l" rtl="0">
-              <a:lnSpc>
-                <a:spcPct val="100000"/>
-              </a:lnSpc>
-              <a:spcBef>
-                <a:spcPts val="0"/>
-              </a:spcBef>
-              <a:spcAft>
-                <a:spcPts val="0"/>
-              </a:spcAft>
-              <a:buSzPts val="2400"/>
-              <a:buNone/>
-            </a:pPr>
             <a:r>
               <a:rPr lang="en" dirty="0">
                 <a:solidFill>
@@ -15686,81 +15883,35 @@
               </a:rPr>
               <a:t>demo1</a:t>
             </a:r>
-            <a:endParaRPr i="1" dirty="0">
+            <a:r>
+              <a:rPr lang="en" dirty="0">
+                <a:solidFill>
+                  <a:schemeClr val="bg2"/>
+                </a:solidFill>
+              </a:rPr>
+              <a:t>:    </a:t>
+            </a:r>
+            <a:r>
+              <a:rPr lang="pt-PT" dirty="0">
+                <a:solidFill>
+                  <a:srgbClr val="F38B20"/>
+                </a:solidFill>
+              </a:rPr>
+              <a:t>Testes unitários - </a:t>
+            </a:r>
+            <a:r>
+              <a:rPr lang="pt-PT" i="1" dirty="0">
+                <a:solidFill>
+                  <a:srgbClr val="F38B20"/>
+                </a:solidFill>
+              </a:rPr>
+              <a:t>JUnit</a:t>
+            </a:r>
+            <a:endParaRPr sz="2800" i="1" dirty="0">
               <a:solidFill>
-                <a:schemeClr val="bg2"/>
+                <a:srgbClr val="F38B20"/>
               </a:solidFill>
             </a:endParaRPr>
-          </a:p>
-        </p:txBody>
-      </p:sp>
-      <p:sp>
-        <p:nvSpPr>
-          <p:cNvPr id="151" name="Google Shape;151;g5c66568b58_0_22"/>
-          <p:cNvSpPr txBox="1">
-            <a:spLocks noGrp="1"/>
-          </p:cNvSpPr>
-          <p:nvPr>
-            <p:ph type="body" idx="1"/>
-          </p:nvPr>
-        </p:nvSpPr>
-        <p:spPr>
-          <a:xfrm>
-            <a:off x="363018" y="1058479"/>
-            <a:ext cx="6380700" cy="3825300"/>
-          </a:xfrm>
-          <a:prstGeom prst="rect">
-            <a:avLst/>
-          </a:prstGeom>
-          <a:noFill/>
-          <a:ln>
-            <a:noFill/>
-          </a:ln>
-        </p:spPr>
-        <p:txBody>
-          <a:bodyPr spcFirstLastPara="1" wrap="square" lIns="91425" tIns="91425" rIns="91425" bIns="91425" anchor="t" anchorCtr="0">
-            <a:noAutofit/>
-          </a:bodyPr>
-          <a:lstStyle/>
-          <a:p>
-            <a:pPr marL="0" lvl="0" indent="0" algn="just" rtl="0">
-              <a:lnSpc>
-                <a:spcPct val="100000"/>
-              </a:lnSpc>
-              <a:spcBef>
-                <a:spcPts val="600"/>
-              </a:spcBef>
-              <a:spcAft>
-                <a:spcPts val="0"/>
-              </a:spcAft>
-              <a:buClr>
-                <a:srgbClr val="92D050"/>
-              </a:buClr>
-              <a:buSzPts val="2000"/>
-              <a:buFont typeface="Noto Sans Symbols"/>
-              <a:buNone/>
-            </a:pPr>
-            <a:endParaRPr lang="pt-PT" sz="1600" dirty="0"/>
-          </a:p>
-          <a:p>
-            <a:pPr marL="457200" lvl="0" indent="-355600" algn="just" rtl="0">
-              <a:lnSpc>
-                <a:spcPct val="100000"/>
-              </a:lnSpc>
-              <a:spcBef>
-                <a:spcPts val="600"/>
-              </a:spcBef>
-              <a:spcAft>
-                <a:spcPts val="0"/>
-              </a:spcAft>
-              <a:buClr>
-                <a:srgbClr val="FFC107"/>
-              </a:buClr>
-              <a:buSzPts val="2000"/>
-              <a:buFont typeface="Noto Sans Symbols"/>
-              <a:buChar char="▪"/>
-            </a:pPr>
-            <a:endParaRPr lang="pt-PT" sz="1200" dirty="0"/>
           </a:p>
         </p:txBody>
       </p:sp>
@@ -15811,6 +15962,174 @@
               <a:t>22</a:t>
             </a:fld>
             <a:endParaRPr dirty="0"/>
+          </a:p>
+        </p:txBody>
+      </p:sp>
+      <p:sp>
+        <p:nvSpPr>
+          <p:cNvPr id="7" name="Google Shape;151;g5c66568b58_0_22">
+            <a:extLst>
+              <a:ext uri="{FF2B5EF4-FFF2-40B4-BE49-F238E27FC236}">
+                <a16:creationId xmlns:a16="http://schemas.microsoft.com/office/drawing/2014/main" id="{FC04C232-45A7-DD42-B288-86B123EB6369}"/>
+              </a:ext>
+            </a:extLst>
+          </p:cNvPr>
+          <p:cNvSpPr txBox="1">
+            <a:spLocks noGrp="1"/>
+          </p:cNvSpPr>
+          <p:nvPr>
+            <p:ph type="body" idx="1"/>
+          </p:nvPr>
+        </p:nvSpPr>
+        <p:spPr>
+          <a:xfrm>
+            <a:off x="295907" y="1058474"/>
+            <a:ext cx="6380700" cy="3825300"/>
+          </a:xfrm>
+          <a:prstGeom prst="rect">
+            <a:avLst/>
+          </a:prstGeom>
+          <a:noFill/>
+          <a:ln>
+            <a:noFill/>
+          </a:ln>
+        </p:spPr>
+        <p:txBody>
+          <a:bodyPr spcFirstLastPara="1" wrap="square" lIns="91425" tIns="91425" rIns="91425" bIns="91425" anchor="t" anchorCtr="0">
+            <a:noAutofit/>
+          </a:bodyPr>
+          <a:lstStyle/>
+          <a:p>
+            <a:r>
+              <a:rPr lang="pt-PT" sz="1400" dirty="0"/>
+              <a:t>A maior parte dos testes unitários são gerados automaticamente pelo </a:t>
+            </a:r>
+            <a:r>
+              <a:rPr lang="pt-PT" sz="1400" i="1" dirty="0"/>
+              <a:t>software</a:t>
+            </a:r>
+            <a:r>
+              <a:rPr lang="pt-PT" sz="1400" dirty="0"/>
+              <a:t> </a:t>
+            </a:r>
+            <a:r>
+              <a:rPr lang="pt-PT" sz="1400" i="1" dirty="0"/>
+              <a:t>EvoSuite</a:t>
+            </a:r>
+            <a:r>
+              <a:rPr lang="pt-PT" sz="1400" dirty="0"/>
+              <a:t>, mas além disso, decidimos fazer uma pequena análise pessoal ao código do projeto.</a:t>
+            </a:r>
+          </a:p>
+          <a:p>
+            <a:endParaRPr lang="pt-PT" sz="1400" dirty="0"/>
+          </a:p>
+          <a:p>
+            <a:r>
+              <a:rPr lang="pt-PT" sz="1400" dirty="0"/>
+              <a:t>Concentramos a nossa análise nas classes </a:t>
+            </a:r>
+            <a:r>
+              <a:rPr lang="pt-PT" sz="1400" i="1" dirty="0"/>
+              <a:t>Cars</a:t>
+            </a:r>
+            <a:r>
+              <a:rPr lang="pt-PT" sz="1400" dirty="0"/>
+              <a:t>, </a:t>
+            </a:r>
+            <a:r>
+              <a:rPr lang="pt-PT" sz="1400" i="1" dirty="0"/>
+              <a:t>Rentals</a:t>
+            </a:r>
+            <a:r>
+              <a:rPr lang="pt-PT" sz="1400" dirty="0"/>
+              <a:t> e um </a:t>
+            </a:r>
+            <a:r>
+              <a:rPr lang="pt-PT" sz="1400" i="1" dirty="0"/>
+              <a:t>UmCarroJa</a:t>
+            </a:r>
+            <a:r>
+              <a:rPr lang="pt-PT" sz="1400" dirty="0"/>
+              <a:t>, que achámos que são as mais relevantes a nível de evolução do sistema.</a:t>
+            </a:r>
+          </a:p>
+          <a:p>
+            <a:endParaRPr lang="pt-PT" sz="1400" dirty="0"/>
+          </a:p>
+          <a:p>
+            <a:r>
+              <a:rPr lang="pt-PT" sz="1400" dirty="0"/>
+              <a:t>Estes testes foram colocados no </a:t>
+            </a:r>
+            <a:r>
+              <a:rPr lang="pt-PT" sz="1400" i="1" dirty="0"/>
+              <a:t>package</a:t>
+            </a:r>
+            <a:r>
+              <a:rPr lang="pt-PT" sz="1400" dirty="0"/>
+              <a:t> </a:t>
+            </a:r>
+            <a:r>
+              <a:rPr lang="pt-PT" sz="1400" b="1" i="1" dirty="0"/>
+              <a:t>test</a:t>
+            </a:r>
+            <a:r>
+              <a:rPr lang="pt-PT" sz="1400" dirty="0"/>
+              <a:t> e estão devidamente anotados seguindo a anotação dos testes manuais do </a:t>
+            </a:r>
+            <a:r>
+              <a:rPr lang="pt-PT" sz="1400" i="1" dirty="0"/>
+              <a:t>JUnit</a:t>
+            </a:r>
+            <a:r>
+              <a:rPr lang="pt-PT" sz="1400" dirty="0"/>
+              <a:t>.</a:t>
+            </a:r>
+          </a:p>
+          <a:p>
+            <a:pPr marL="285750" lvl="0" indent="-285750"/>
+            <a:endParaRPr lang="pt-PT" sz="1400" dirty="0"/>
+          </a:p>
+          <a:p>
+            <a:pPr marL="285750" lvl="0" indent="-285750" algn="just"/>
+            <a:endParaRPr lang="pt-PT" sz="1400" dirty="0"/>
+          </a:p>
+          <a:p>
+            <a:pPr marL="0" lvl="0" indent="0" algn="just" rtl="0">
+              <a:lnSpc>
+                <a:spcPct val="100000"/>
+              </a:lnSpc>
+              <a:spcBef>
+                <a:spcPts val="600"/>
+              </a:spcBef>
+              <a:spcAft>
+                <a:spcPts val="0"/>
+              </a:spcAft>
+              <a:buSzPts val="2000"/>
+              <a:buNone/>
+            </a:pPr>
+            <a:endParaRPr lang="pt-PT" sz="1600" dirty="0"/>
+          </a:p>
+          <a:p>
+            <a:pPr marL="457200" lvl="0" indent="-355600" algn="just" rtl="0">
+              <a:lnSpc>
+                <a:spcPct val="100000"/>
+              </a:lnSpc>
+              <a:spcBef>
+                <a:spcPts val="600"/>
+              </a:spcBef>
+              <a:spcAft>
+                <a:spcPts val="0"/>
+              </a:spcAft>
+              <a:buClr>
+                <a:srgbClr val="FFC107"/>
+              </a:buClr>
+              <a:buSzPts val="2000"/>
+              <a:buFont typeface="Noto Sans Symbols"/>
+              <a:buChar char="▪"/>
+            </a:pPr>
+            <a:endParaRPr lang="pt-PT" sz="1200" dirty="0"/>
           </a:p>
         </p:txBody>
       </p:sp>
@@ -15864,6 +16183,283 @@
         </p:nvSpPr>
         <p:spPr>
           <a:xfrm>
+            <a:off x="467722" y="536895"/>
+            <a:ext cx="6016967" cy="521579"/>
+          </a:xfrm>
+          <a:prstGeom prst="rect">
+            <a:avLst/>
+          </a:prstGeom>
+          <a:noFill/>
+          <a:ln>
+            <a:noFill/>
+          </a:ln>
+        </p:spPr>
+        <p:txBody>
+          <a:bodyPr spcFirstLastPara="1" wrap="square" lIns="91425" tIns="91425" rIns="91425" bIns="91425" anchor="b" anchorCtr="0">
+            <a:noAutofit/>
+          </a:bodyPr>
+          <a:lstStyle/>
+          <a:p>
+            <a:r>
+              <a:rPr lang="en" dirty="0">
+                <a:solidFill>
+                  <a:schemeClr val="bg2"/>
+                </a:solidFill>
+              </a:rPr>
+              <a:t>Tarefa 3 – </a:t>
+            </a:r>
+            <a:r>
+              <a:rPr lang="en" i="1" dirty="0">
+                <a:solidFill>
+                  <a:schemeClr val="bg2"/>
+                </a:solidFill>
+              </a:rPr>
+              <a:t>demo1</a:t>
+            </a:r>
+            <a:r>
+              <a:rPr lang="en" dirty="0">
+                <a:solidFill>
+                  <a:schemeClr val="bg2"/>
+                </a:solidFill>
+              </a:rPr>
+              <a:t>:    </a:t>
+            </a:r>
+            <a:r>
+              <a:rPr lang="pt-PT" dirty="0">
+                <a:solidFill>
+                  <a:srgbClr val="F38B20"/>
+                </a:solidFill>
+              </a:rPr>
+              <a:t>Testes unitários - </a:t>
+            </a:r>
+            <a:r>
+              <a:rPr lang="pt-PT" i="1" dirty="0">
+                <a:solidFill>
+                  <a:srgbClr val="F38B20"/>
+                </a:solidFill>
+              </a:rPr>
+              <a:t>EvoSuite</a:t>
+            </a:r>
+            <a:endParaRPr sz="2800" i="1" dirty="0">
+              <a:solidFill>
+                <a:srgbClr val="F38B20"/>
+              </a:solidFill>
+            </a:endParaRPr>
+          </a:p>
+        </p:txBody>
+      </p:sp>
+      <p:sp>
+        <p:nvSpPr>
+          <p:cNvPr id="152" name="Google Shape;152;g5c66568b58_0_22"/>
+          <p:cNvSpPr txBox="1">
+            <a:spLocks noGrp="1"/>
+          </p:cNvSpPr>
+          <p:nvPr>
+            <p:ph type="sldNum" idx="12"/>
+          </p:nvPr>
+        </p:nvSpPr>
+        <p:spPr>
+          <a:xfrm>
+            <a:off x="8543227" y="4749851"/>
+            <a:ext cx="548700" cy="393600"/>
+          </a:xfrm>
+          <a:prstGeom prst="rect">
+            <a:avLst/>
+          </a:prstGeom>
+          <a:noFill/>
+          <a:ln>
+            <a:noFill/>
+          </a:ln>
+        </p:spPr>
+        <p:txBody>
+          <a:bodyPr spcFirstLastPara="1" wrap="square" lIns="91425" tIns="91425" rIns="91425" bIns="91425" anchor="t" anchorCtr="0">
+            <a:noAutofit/>
+          </a:bodyPr>
+          <a:lstStyle/>
+          <a:p>
+            <a:pPr marL="0" lvl="0" indent="0" algn="r" rtl="0">
+              <a:lnSpc>
+                <a:spcPct val="100000"/>
+              </a:lnSpc>
+              <a:spcBef>
+                <a:spcPts val="0"/>
+              </a:spcBef>
+              <a:spcAft>
+                <a:spcPts val="0"/>
+              </a:spcAft>
+              <a:buSzPts val="1300"/>
+              <a:buNone/>
+            </a:pPr>
+            <a:fld id="{00000000-1234-1234-1234-123412341234}" type="slidenum">
+              <a:rPr lang="en"/>
+              <a:t>23</a:t>
+            </a:fld>
+            <a:endParaRPr dirty="0"/>
+          </a:p>
+        </p:txBody>
+      </p:sp>
+      <p:sp>
+        <p:nvSpPr>
+          <p:cNvPr id="7" name="Google Shape;151;g5c66568b58_0_22">
+            <a:extLst>
+              <a:ext uri="{FF2B5EF4-FFF2-40B4-BE49-F238E27FC236}">
+                <a16:creationId xmlns:a16="http://schemas.microsoft.com/office/drawing/2014/main" id="{FC04C232-45A7-DD42-B288-86B123EB6369}"/>
+              </a:ext>
+            </a:extLst>
+          </p:cNvPr>
+          <p:cNvSpPr txBox="1">
+            <a:spLocks noGrp="1"/>
+          </p:cNvSpPr>
+          <p:nvPr>
+            <p:ph type="body" idx="1"/>
+          </p:nvPr>
+        </p:nvSpPr>
+        <p:spPr>
+          <a:xfrm>
+            <a:off x="295907" y="1058474"/>
+            <a:ext cx="6380700" cy="3825300"/>
+          </a:xfrm>
+          <a:prstGeom prst="rect">
+            <a:avLst/>
+          </a:prstGeom>
+          <a:noFill/>
+          <a:ln>
+            <a:noFill/>
+          </a:ln>
+        </p:spPr>
+        <p:txBody>
+          <a:bodyPr spcFirstLastPara="1" wrap="square" lIns="91425" tIns="91425" rIns="91425" bIns="91425" anchor="t" anchorCtr="0">
+            <a:noAutofit/>
+          </a:bodyPr>
+          <a:lstStyle/>
+          <a:p>
+            <a:pPr marL="0" lvl="0" indent="0">
+              <a:buNone/>
+            </a:pPr>
+            <a:endParaRPr lang="pt-PT" sz="1400" dirty="0"/>
+          </a:p>
+          <a:p>
+            <a:pPr marL="285750" lvl="0" indent="-285750" algn="just"/>
+            <a:endParaRPr lang="pt-PT" sz="1400" dirty="0"/>
+          </a:p>
+          <a:p>
+            <a:pPr marL="0" lvl="0" indent="0" algn="just" rtl="0">
+              <a:lnSpc>
+                <a:spcPct val="100000"/>
+              </a:lnSpc>
+              <a:spcBef>
+                <a:spcPts val="600"/>
+              </a:spcBef>
+              <a:spcAft>
+                <a:spcPts val="0"/>
+              </a:spcAft>
+              <a:buSzPts val="2000"/>
+              <a:buNone/>
+            </a:pPr>
+            <a:endParaRPr lang="pt-PT" sz="1600" dirty="0"/>
+          </a:p>
+          <a:p>
+            <a:pPr marL="457200" lvl="0" indent="-355600" algn="just" rtl="0">
+              <a:lnSpc>
+                <a:spcPct val="100000"/>
+              </a:lnSpc>
+              <a:spcBef>
+                <a:spcPts val="600"/>
+              </a:spcBef>
+              <a:spcAft>
+                <a:spcPts val="0"/>
+              </a:spcAft>
+              <a:buClr>
+                <a:srgbClr val="FFC107"/>
+              </a:buClr>
+              <a:buSzPts val="2000"/>
+              <a:buFont typeface="Noto Sans Symbols"/>
+              <a:buChar char="▪"/>
+            </a:pPr>
+            <a:endParaRPr lang="pt-PT" sz="1200" dirty="0"/>
+          </a:p>
+        </p:txBody>
+      </p:sp>
+      <p:pic>
+        <p:nvPicPr>
+          <p:cNvPr id="2" name="Imagem 1">
+            <a:extLst>
+              <a:ext uri="{FF2B5EF4-FFF2-40B4-BE49-F238E27FC236}">
+                <a16:creationId xmlns:a16="http://schemas.microsoft.com/office/drawing/2014/main" id="{810A1AB0-1F26-F44C-9C46-41F89FAD009B}"/>
+              </a:ext>
+            </a:extLst>
+          </p:cNvPr>
+          <p:cNvPicPr>
+            <a:picLocks noChangeAspect="1"/>
+          </p:cNvPicPr>
+          <p:nvPr/>
+        </p:nvPicPr>
+        <p:blipFill>
+          <a:blip r:embed="rId3"/>
+          <a:stretch>
+            <a:fillRect/>
+          </a:stretch>
+        </p:blipFill>
+        <p:spPr>
+          <a:xfrm>
+            <a:off x="412323" y="1789912"/>
+            <a:ext cx="6264284" cy="2155092"/>
+          </a:xfrm>
+          <a:prstGeom prst="rect">
+            <a:avLst/>
+          </a:prstGeom>
+        </p:spPr>
+      </p:pic>
+    </p:spTree>
+    <p:extLst>
+      <p:ext uri="{BB962C8B-B14F-4D97-AF65-F5344CB8AC3E}">
+        <p14:creationId xmlns:p14="http://schemas.microsoft.com/office/powerpoint/2010/main" val="2528969269"/>
+      </p:ext>
+    </p:extLst>
+  </p:cSld>
+  <p:clrMapOvr>
+    <a:masterClrMapping/>
+  </p:clrMapOvr>
+</p:sld>
+</file>
+
+<file path=ppt/slides/slide24.xml><?xml version="1.0" encoding="utf-8"?>
+<p:sld xmlns:a="http://schemas.openxmlformats.org/drawingml/2006/main" xmlns:r="http://schemas.openxmlformats.org/officeDocument/2006/relationships" xmlns:p="http://schemas.openxmlformats.org/presentationml/2006/main">
+  <p:cSld>
+    <p:bg>
+      <p:bgPr>
+        <a:solidFill>
+          <a:schemeClr val="bg2"/>
+        </a:solidFill>
+        <a:effectLst/>
+      </p:bgPr>
+    </p:bg>
+    <p:spTree>
+      <p:nvGrpSpPr>
+        <p:cNvPr id="1" name="Shape 149"/>
+        <p:cNvGrpSpPr/>
+        <p:nvPr/>
+      </p:nvGrpSpPr>
+      <p:grpSpPr>
+        <a:xfrm>
+          <a:off x="0" y="0"/>
+          <a:ext cx="0" cy="0"/>
+          <a:chOff x="0" y="0"/>
+          <a:chExt cx="0" cy="0"/>
+        </a:xfrm>
+      </p:grpSpPr>
+      <p:sp>
+        <p:nvSpPr>
+          <p:cNvPr id="150" name="Google Shape;150;g5c66568b58_0_22"/>
+          <p:cNvSpPr txBox="1">
+            <a:spLocks noGrp="1"/>
+          </p:cNvSpPr>
+          <p:nvPr>
+            <p:ph type="title"/>
+          </p:nvPr>
+        </p:nvSpPr>
+        <p:spPr>
+          <a:xfrm>
             <a:off x="467725" y="648975"/>
             <a:ext cx="4963800" cy="409500"/>
           </a:xfrm>
@@ -16032,7 +16628,7 @@
             </a:pPr>
             <a:fld id="{00000000-1234-1234-1234-123412341234}" type="slidenum">
               <a:rPr lang="en"/>
-              <a:t>23</a:t>
+              <a:t>24</a:t>
             </a:fld>
             <a:endParaRPr dirty="0"/>
           </a:p>
@@ -16051,7 +16647,7 @@
 </p:sld>
 </file>
 
-<file path=ppt/slides/slide24.xml><?xml version="1.0" encoding="utf-8"?>
+<file path=ppt/slides/slide25.xml><?xml version="1.0" encoding="utf-8"?>
 <p:sld xmlns:a="http://schemas.openxmlformats.org/drawingml/2006/main" xmlns:r="http://schemas.openxmlformats.org/officeDocument/2006/relationships" xmlns:p="http://schemas.openxmlformats.org/presentationml/2006/main">
   <p:cSld>
     <p:bg>
@@ -16153,231 +16749,6 @@
     <p:extLst>
       <p:ext uri="{BB962C8B-B14F-4D97-AF65-F5344CB8AC3E}">
         <p14:creationId xmlns:p14="http://schemas.microsoft.com/office/powerpoint/2010/main" val="1093529290"/>
-      </p:ext>
-    </p:extLst>
-  </p:cSld>
-  <p:clrMapOvr>
-    <a:masterClrMapping/>
-  </p:clrMapOvr>
-</p:sld>
-</file>
-
-<file path=ppt/slides/slide25.xml><?xml version="1.0" encoding="utf-8"?>
-<p:sld xmlns:a="http://schemas.openxmlformats.org/drawingml/2006/main" xmlns:r="http://schemas.openxmlformats.org/officeDocument/2006/relationships" xmlns:p="http://schemas.openxmlformats.org/presentationml/2006/main">
-  <p:cSld>
-    <p:bg>
-      <p:bgPr>
-        <a:solidFill>
-          <a:schemeClr val="accent3">
-            <a:lumMod val="60000"/>
-            <a:lumOff val="40000"/>
-          </a:schemeClr>
-        </a:solidFill>
-        <a:effectLst/>
-      </p:bgPr>
-    </p:bg>
-    <p:spTree>
-      <p:nvGrpSpPr>
-        <p:cNvPr id="1" name="Shape 149"/>
-        <p:cNvGrpSpPr/>
-        <p:nvPr/>
-      </p:nvGrpSpPr>
-      <p:grpSpPr>
-        <a:xfrm>
-          <a:off x="0" y="0"/>
-          <a:ext cx="0" cy="0"/>
-          <a:chOff x="0" y="0"/>
-          <a:chExt cx="0" cy="0"/>
-        </a:xfrm>
-      </p:grpSpPr>
-      <p:sp>
-        <p:nvSpPr>
-          <p:cNvPr id="150" name="Google Shape;150;g5c66568b58_0_22"/>
-          <p:cNvSpPr txBox="1">
-            <a:spLocks noGrp="1"/>
-          </p:cNvSpPr>
-          <p:nvPr>
-            <p:ph type="title"/>
-          </p:nvPr>
-        </p:nvSpPr>
-        <p:spPr>
-          <a:xfrm>
-            <a:off x="467725" y="648975"/>
-            <a:ext cx="4963800" cy="409500"/>
-          </a:xfrm>
-          <a:prstGeom prst="rect">
-            <a:avLst/>
-          </a:prstGeom>
-          <a:noFill/>
-          <a:ln>
-            <a:noFill/>
-          </a:ln>
-        </p:spPr>
-        <p:txBody>
-          <a:bodyPr spcFirstLastPara="1" wrap="square" lIns="91425" tIns="91425" rIns="91425" bIns="91425" anchor="b" anchorCtr="0">
-            <a:noAutofit/>
-          </a:bodyPr>
-          <a:lstStyle/>
-          <a:p>
-            <a:pPr marL="0" lvl="0" indent="0" algn="l" rtl="0">
-              <a:lnSpc>
-                <a:spcPct val="100000"/>
-              </a:lnSpc>
-              <a:spcBef>
-                <a:spcPts val="0"/>
-              </a:spcBef>
-              <a:spcAft>
-                <a:spcPts val="0"/>
-              </a:spcAft>
-              <a:buSzPts val="2400"/>
-              <a:buNone/>
-            </a:pPr>
-            <a:r>
-              <a:rPr lang="en" dirty="0">
-                <a:solidFill>
-                  <a:schemeClr val="accent3">
-                    <a:lumMod val="60000"/>
-                    <a:lumOff val="40000"/>
-                  </a:schemeClr>
-                </a:solidFill>
-              </a:rPr>
-              <a:t>Tarefa 4</a:t>
-            </a:r>
-            <a:endParaRPr dirty="0">
-              <a:solidFill>
-                <a:schemeClr val="accent3">
-                  <a:lumMod val="60000"/>
-                  <a:lumOff val="40000"/>
-                </a:schemeClr>
-              </a:solidFill>
-            </a:endParaRPr>
-          </a:p>
-        </p:txBody>
-      </p:sp>
-      <p:sp>
-        <p:nvSpPr>
-          <p:cNvPr id="151" name="Google Shape;151;g5c66568b58_0_22"/>
-          <p:cNvSpPr txBox="1">
-            <a:spLocks noGrp="1"/>
-          </p:cNvSpPr>
-          <p:nvPr>
-            <p:ph type="body" idx="1"/>
-          </p:nvPr>
-        </p:nvSpPr>
-        <p:spPr>
-          <a:xfrm>
-            <a:off x="363018" y="1058479"/>
-            <a:ext cx="6380700" cy="3825300"/>
-          </a:xfrm>
-          <a:prstGeom prst="rect">
-            <a:avLst/>
-          </a:prstGeom>
-          <a:noFill/>
-          <a:ln>
-            <a:noFill/>
-          </a:ln>
-        </p:spPr>
-        <p:txBody>
-          <a:bodyPr spcFirstLastPara="1" wrap="square" lIns="91425" tIns="91425" rIns="91425" bIns="91425" anchor="t" anchorCtr="0">
-            <a:noAutofit/>
-          </a:bodyPr>
-          <a:lstStyle/>
-          <a:p>
-            <a:pPr marL="0" lvl="0" indent="0" algn="just" rtl="0">
-              <a:lnSpc>
-                <a:spcPct val="100000"/>
-              </a:lnSpc>
-              <a:spcBef>
-                <a:spcPts val="600"/>
-              </a:spcBef>
-              <a:spcAft>
-                <a:spcPts val="0"/>
-              </a:spcAft>
-              <a:buClr>
-                <a:srgbClr val="92D050"/>
-              </a:buClr>
-              <a:buSzPts val="2000"/>
-              <a:buFont typeface="Noto Sans Symbols"/>
-              <a:buNone/>
-            </a:pPr>
-            <a:endParaRPr lang="pt-PT" sz="1600" dirty="0"/>
-          </a:p>
-          <a:p>
-            <a:pPr marL="457200" lvl="0" indent="-355600" algn="just" rtl="0">
-              <a:lnSpc>
-                <a:spcPct val="100000"/>
-              </a:lnSpc>
-              <a:spcBef>
-                <a:spcPts val="600"/>
-              </a:spcBef>
-              <a:spcAft>
-                <a:spcPts val="0"/>
-              </a:spcAft>
-              <a:buClr>
-                <a:srgbClr val="FFC107"/>
-              </a:buClr>
-              <a:buSzPts val="2000"/>
-              <a:buFont typeface="Noto Sans Symbols"/>
-              <a:buChar char="▪"/>
-            </a:pPr>
-            <a:endParaRPr lang="pt-PT" sz="1200" dirty="0"/>
-          </a:p>
-        </p:txBody>
-      </p:sp>
-      <p:sp>
-        <p:nvSpPr>
-          <p:cNvPr id="152" name="Google Shape;152;g5c66568b58_0_22"/>
-          <p:cNvSpPr txBox="1">
-            <a:spLocks noGrp="1"/>
-          </p:cNvSpPr>
-          <p:nvPr>
-            <p:ph type="sldNum" idx="12"/>
-          </p:nvPr>
-        </p:nvSpPr>
-        <p:spPr>
-          <a:xfrm>
-            <a:off x="8543227" y="4749851"/>
-            <a:ext cx="548700" cy="393600"/>
-          </a:xfrm>
-          <a:prstGeom prst="rect">
-            <a:avLst/>
-          </a:prstGeom>
-          <a:noFill/>
-          <a:ln>
-            <a:noFill/>
-          </a:ln>
-        </p:spPr>
-        <p:txBody>
-          <a:bodyPr spcFirstLastPara="1" wrap="square" lIns="91425" tIns="91425" rIns="91425" bIns="91425" anchor="t" anchorCtr="0">
-            <a:noAutofit/>
-          </a:bodyPr>
-          <a:lstStyle/>
-          <a:p>
-            <a:pPr marL="0" lvl="0" indent="0" algn="r" rtl="0">
-              <a:lnSpc>
-                <a:spcPct val="100000"/>
-              </a:lnSpc>
-              <a:spcBef>
-                <a:spcPts val="0"/>
-              </a:spcBef>
-              <a:spcAft>
-                <a:spcPts val="0"/>
-              </a:spcAft>
-              <a:buSzPts val="1300"/>
-              <a:buNone/>
-            </a:pPr>
-            <a:fld id="{00000000-1234-1234-1234-123412341234}" type="slidenum">
-              <a:rPr lang="en"/>
-              <a:t>25</a:t>
-            </a:fld>
-            <a:endParaRPr dirty="0"/>
-          </a:p>
-        </p:txBody>
-      </p:sp>
-    </p:spTree>
-    <p:extLst>
-      <p:ext uri="{BB962C8B-B14F-4D97-AF65-F5344CB8AC3E}">
-        <p14:creationId xmlns:p14="http://schemas.microsoft.com/office/powerpoint/2010/main" val="2164786495"/>
       </p:ext>
     </p:extLst>
   </p:cSld>
@@ -16466,18 +16837,7 @@
                   </a:schemeClr>
                 </a:solidFill>
               </a:rPr>
-              <a:t>Tarefa 4 – </a:t>
-            </a:r>
-            <a:r>
-              <a:rPr lang="en" i="1" dirty="0">
-                <a:solidFill>
-                  <a:schemeClr val="accent3">
-                    <a:lumMod val="60000"/>
-                    <a:lumOff val="40000"/>
-                  </a:schemeClr>
-                </a:solidFill>
-              </a:rPr>
-              <a:t>demo1</a:t>
+              <a:t>Tarefa 4</a:t>
             </a:r>
             <a:endParaRPr dirty="0">
               <a:solidFill>
@@ -16613,7 +16973,7 @@
     </p:spTree>
     <p:extLst>
       <p:ext uri="{BB962C8B-B14F-4D97-AF65-F5344CB8AC3E}">
-        <p14:creationId xmlns:p14="http://schemas.microsoft.com/office/powerpoint/2010/main" val="2398864426"/>
+        <p14:creationId xmlns:p14="http://schemas.microsoft.com/office/powerpoint/2010/main" val="2164786495"/>
       </p:ext>
     </p:extLst>
   </p:cSld>
@@ -16713,7 +17073,7 @@
                   </a:schemeClr>
                 </a:solidFill>
               </a:rPr>
-              <a:t>demo2</a:t>
+              <a:t>demo1</a:t>
             </a:r>
             <a:endParaRPr dirty="0">
               <a:solidFill>
@@ -16849,6 +17209,242 @@
     </p:spTree>
     <p:extLst>
       <p:ext uri="{BB962C8B-B14F-4D97-AF65-F5344CB8AC3E}">
+        <p14:creationId xmlns:p14="http://schemas.microsoft.com/office/powerpoint/2010/main" val="2398864426"/>
+      </p:ext>
+    </p:extLst>
+  </p:cSld>
+  <p:clrMapOvr>
+    <a:masterClrMapping/>
+  </p:clrMapOvr>
+</p:sld>
+</file>
+
+<file path=ppt/slides/slide28.xml><?xml version="1.0" encoding="utf-8"?>
+<p:sld xmlns:a="http://schemas.openxmlformats.org/drawingml/2006/main" xmlns:r="http://schemas.openxmlformats.org/officeDocument/2006/relationships" xmlns:p="http://schemas.openxmlformats.org/presentationml/2006/main">
+  <p:cSld>
+    <p:bg>
+      <p:bgPr>
+        <a:solidFill>
+          <a:schemeClr val="accent3">
+            <a:lumMod val="60000"/>
+            <a:lumOff val="40000"/>
+          </a:schemeClr>
+        </a:solidFill>
+        <a:effectLst/>
+      </p:bgPr>
+    </p:bg>
+    <p:spTree>
+      <p:nvGrpSpPr>
+        <p:cNvPr id="1" name="Shape 149"/>
+        <p:cNvGrpSpPr/>
+        <p:nvPr/>
+      </p:nvGrpSpPr>
+      <p:grpSpPr>
+        <a:xfrm>
+          <a:off x="0" y="0"/>
+          <a:ext cx="0" cy="0"/>
+          <a:chOff x="0" y="0"/>
+          <a:chExt cx="0" cy="0"/>
+        </a:xfrm>
+      </p:grpSpPr>
+      <p:sp>
+        <p:nvSpPr>
+          <p:cNvPr id="150" name="Google Shape;150;g5c66568b58_0_22"/>
+          <p:cNvSpPr txBox="1">
+            <a:spLocks noGrp="1"/>
+          </p:cNvSpPr>
+          <p:nvPr>
+            <p:ph type="title"/>
+          </p:nvPr>
+        </p:nvSpPr>
+        <p:spPr>
+          <a:xfrm>
+            <a:off x="467725" y="648975"/>
+            <a:ext cx="4963800" cy="409500"/>
+          </a:xfrm>
+          <a:prstGeom prst="rect">
+            <a:avLst/>
+          </a:prstGeom>
+          <a:noFill/>
+          <a:ln>
+            <a:noFill/>
+          </a:ln>
+        </p:spPr>
+        <p:txBody>
+          <a:bodyPr spcFirstLastPara="1" wrap="square" lIns="91425" tIns="91425" rIns="91425" bIns="91425" anchor="b" anchorCtr="0">
+            <a:noAutofit/>
+          </a:bodyPr>
+          <a:lstStyle/>
+          <a:p>
+            <a:pPr marL="0" lvl="0" indent="0" algn="l" rtl="0">
+              <a:lnSpc>
+                <a:spcPct val="100000"/>
+              </a:lnSpc>
+              <a:spcBef>
+                <a:spcPts val="0"/>
+              </a:spcBef>
+              <a:spcAft>
+                <a:spcPts val="0"/>
+              </a:spcAft>
+              <a:buSzPts val="2400"/>
+              <a:buNone/>
+            </a:pPr>
+            <a:r>
+              <a:rPr lang="en" dirty="0">
+                <a:solidFill>
+                  <a:schemeClr val="accent3">
+                    <a:lumMod val="60000"/>
+                    <a:lumOff val="40000"/>
+                  </a:schemeClr>
+                </a:solidFill>
+              </a:rPr>
+              <a:t>Tarefa 4 – </a:t>
+            </a:r>
+            <a:r>
+              <a:rPr lang="en" i="1" dirty="0">
+                <a:solidFill>
+                  <a:schemeClr val="accent3">
+                    <a:lumMod val="60000"/>
+                    <a:lumOff val="40000"/>
+                  </a:schemeClr>
+                </a:solidFill>
+              </a:rPr>
+              <a:t>demo2</a:t>
+            </a:r>
+            <a:endParaRPr dirty="0">
+              <a:solidFill>
+                <a:schemeClr val="accent3">
+                  <a:lumMod val="60000"/>
+                  <a:lumOff val="40000"/>
+                </a:schemeClr>
+              </a:solidFill>
+            </a:endParaRPr>
+          </a:p>
+        </p:txBody>
+      </p:sp>
+      <p:sp>
+        <p:nvSpPr>
+          <p:cNvPr id="151" name="Google Shape;151;g5c66568b58_0_22"/>
+          <p:cNvSpPr txBox="1">
+            <a:spLocks noGrp="1"/>
+          </p:cNvSpPr>
+          <p:nvPr>
+            <p:ph type="body" idx="1"/>
+          </p:nvPr>
+        </p:nvSpPr>
+        <p:spPr>
+          <a:xfrm>
+            <a:off x="363018" y="1058479"/>
+            <a:ext cx="6380700" cy="3825300"/>
+          </a:xfrm>
+          <a:prstGeom prst="rect">
+            <a:avLst/>
+          </a:prstGeom>
+          <a:noFill/>
+          <a:ln>
+            <a:noFill/>
+          </a:ln>
+        </p:spPr>
+        <p:txBody>
+          <a:bodyPr spcFirstLastPara="1" wrap="square" lIns="91425" tIns="91425" rIns="91425" bIns="91425" anchor="t" anchorCtr="0">
+            <a:noAutofit/>
+          </a:bodyPr>
+          <a:lstStyle/>
+          <a:p>
+            <a:pPr marL="0" lvl="0" indent="0" algn="just" rtl="0">
+              <a:lnSpc>
+                <a:spcPct val="100000"/>
+              </a:lnSpc>
+              <a:spcBef>
+                <a:spcPts val="600"/>
+              </a:spcBef>
+              <a:spcAft>
+                <a:spcPts val="0"/>
+              </a:spcAft>
+              <a:buClr>
+                <a:srgbClr val="92D050"/>
+              </a:buClr>
+              <a:buSzPts val="2000"/>
+              <a:buFont typeface="Noto Sans Symbols"/>
+              <a:buNone/>
+            </a:pPr>
+            <a:endParaRPr lang="pt-PT" sz="1600" dirty="0"/>
+          </a:p>
+          <a:p>
+            <a:pPr marL="457200" lvl="0" indent="-355600" algn="just" rtl="0">
+              <a:lnSpc>
+                <a:spcPct val="100000"/>
+              </a:lnSpc>
+              <a:spcBef>
+                <a:spcPts val="600"/>
+              </a:spcBef>
+              <a:spcAft>
+                <a:spcPts val="0"/>
+              </a:spcAft>
+              <a:buClr>
+                <a:srgbClr val="FFC107"/>
+              </a:buClr>
+              <a:buSzPts val="2000"/>
+              <a:buFont typeface="Noto Sans Symbols"/>
+              <a:buChar char="▪"/>
+            </a:pPr>
+            <a:endParaRPr lang="pt-PT" sz="1200" dirty="0"/>
+          </a:p>
+        </p:txBody>
+      </p:sp>
+      <p:sp>
+        <p:nvSpPr>
+          <p:cNvPr id="152" name="Google Shape;152;g5c66568b58_0_22"/>
+          <p:cNvSpPr txBox="1">
+            <a:spLocks noGrp="1"/>
+          </p:cNvSpPr>
+          <p:nvPr>
+            <p:ph type="sldNum" idx="12"/>
+          </p:nvPr>
+        </p:nvSpPr>
+        <p:spPr>
+          <a:xfrm>
+            <a:off x="8543227" y="4749851"/>
+            <a:ext cx="548700" cy="393600"/>
+          </a:xfrm>
+          <a:prstGeom prst="rect">
+            <a:avLst/>
+          </a:prstGeom>
+          <a:noFill/>
+          <a:ln>
+            <a:noFill/>
+          </a:ln>
+        </p:spPr>
+        <p:txBody>
+          <a:bodyPr spcFirstLastPara="1" wrap="square" lIns="91425" tIns="91425" rIns="91425" bIns="91425" anchor="t" anchorCtr="0">
+            <a:noAutofit/>
+          </a:bodyPr>
+          <a:lstStyle/>
+          <a:p>
+            <a:pPr marL="0" lvl="0" indent="0" algn="r" rtl="0">
+              <a:lnSpc>
+                <a:spcPct val="100000"/>
+              </a:lnSpc>
+              <a:spcBef>
+                <a:spcPts val="0"/>
+              </a:spcBef>
+              <a:spcAft>
+                <a:spcPts val="0"/>
+              </a:spcAft>
+              <a:buSzPts val="1300"/>
+              <a:buNone/>
+            </a:pPr>
+            <a:fld id="{00000000-1234-1234-1234-123412341234}" type="slidenum">
+              <a:rPr lang="en"/>
+              <a:t>28</a:t>
+            </a:fld>
+            <a:endParaRPr dirty="0"/>
+          </a:p>
+        </p:txBody>
+      </p:sp>
+    </p:spTree>
+    <p:extLst>
+      <p:ext uri="{BB962C8B-B14F-4D97-AF65-F5344CB8AC3E}">
         <p14:creationId xmlns:p14="http://schemas.microsoft.com/office/powerpoint/2010/main" val="445447506"/>
       </p:ext>
     </p:extLst>
@@ -16859,7 +17455,7 @@
 </p:sld>
 </file>
 
-<file path=ppt/slides/slide28.xml><?xml version="1.0" encoding="utf-8"?>
+<file path=ppt/slides/slide29.xml><?xml version="1.0" encoding="utf-8"?>
 <p:sld xmlns:a="http://schemas.openxmlformats.org/drawingml/2006/main" xmlns:r="http://schemas.openxmlformats.org/officeDocument/2006/relationships" xmlns:p="http://schemas.openxmlformats.org/presentationml/2006/main">
   <p:cSld>
     <p:bg>
@@ -17006,7 +17602,359 @@
 </p:sld>
 </file>
 
-<file path=ppt/slides/slide29.xml><?xml version="1.0" encoding="utf-8"?>
+<file path=ppt/slides/slide3.xml><?xml version="1.0" encoding="utf-8"?>
+<p:sld xmlns:a="http://schemas.openxmlformats.org/drawingml/2006/main" xmlns:r="http://schemas.openxmlformats.org/officeDocument/2006/relationships" xmlns:p="http://schemas.openxmlformats.org/presentationml/2006/main">
+  <p:cSld>
+    <p:spTree>
+      <p:nvGrpSpPr>
+        <p:cNvPr id="1" name="Shape 89"/>
+        <p:cNvGrpSpPr/>
+        <p:nvPr/>
+      </p:nvGrpSpPr>
+      <p:grpSpPr>
+        <a:xfrm>
+          <a:off x="0" y="0"/>
+          <a:ext cx="0" cy="0"/>
+          <a:chOff x="0" y="0"/>
+          <a:chExt cx="0" cy="0"/>
+        </a:xfrm>
+      </p:grpSpPr>
+      <p:sp>
+        <p:nvSpPr>
+          <p:cNvPr id="90" name="Google Shape;90;p3"/>
+          <p:cNvSpPr txBox="1">
+            <a:spLocks noGrp="1"/>
+          </p:cNvSpPr>
+          <p:nvPr>
+            <p:ph type="body" idx="1"/>
+          </p:nvPr>
+        </p:nvSpPr>
+        <p:spPr>
+          <a:xfrm>
+            <a:off x="363018" y="1058479"/>
+            <a:ext cx="6400948" cy="3825247"/>
+          </a:xfrm>
+          <a:prstGeom prst="rect">
+            <a:avLst/>
+          </a:prstGeom>
+          <a:noFill/>
+          <a:ln>
+            <a:noFill/>
+          </a:ln>
+        </p:spPr>
+        <p:txBody>
+          <a:bodyPr spcFirstLastPara="1" wrap="square" lIns="91425" tIns="91425" rIns="91425" bIns="91425" anchor="t" anchorCtr="0">
+            <a:noAutofit/>
+          </a:bodyPr>
+          <a:lstStyle/>
+          <a:p>
+            <a:pPr marL="514350" indent="-285750" algn="just">
+              <a:buClr>
+                <a:srgbClr val="92D050"/>
+              </a:buClr>
+            </a:pPr>
+            <a:r>
+              <a:rPr lang="pt-PT" sz="1400" dirty="0"/>
+              <a:t>Neste projeto foi-nos proposto a realização de várias tarefas de forma a analisar a qualidade das duas soluções desenvolvidas pelos alunos de </a:t>
+            </a:r>
+            <a:r>
+              <a:rPr lang="pt-PT" sz="1400" i="1" dirty="0"/>
+              <a:t>POO </a:t>
+            </a:r>
+            <a:r>
+              <a:rPr lang="pt-PT" sz="1400" dirty="0"/>
+              <a:t>no ano letivo de 2018/2019. </a:t>
+            </a:r>
+          </a:p>
+          <a:p>
+            <a:pPr marL="514350" indent="-285750" algn="just">
+              <a:buClr>
+                <a:srgbClr val="92D050"/>
+              </a:buClr>
+            </a:pPr>
+            <a:endParaRPr lang="pt-PT" sz="1600" dirty="0"/>
+          </a:p>
+          <a:p>
+            <a:pPr marL="514350" indent="-285750" algn="just">
+              <a:buClr>
+                <a:srgbClr val="92D050"/>
+              </a:buClr>
+            </a:pPr>
+            <a:r>
+              <a:rPr lang="pt-PT" sz="1400" dirty="0"/>
+              <a:t>As duas soluções da aplicação em causa, denominada por </a:t>
+            </a:r>
+            <a:r>
+              <a:rPr lang="pt-PT" sz="1400" i="1" dirty="0"/>
+              <a:t>UmCarroJá</a:t>
+            </a:r>
+            <a:r>
+              <a:rPr lang="pt-PT" sz="1400" dirty="0"/>
+              <a:t>, foram disponibilizadas na página desta unidade curricular. Os nomes associados a cada uma das mesmas são </a:t>
+            </a:r>
+            <a:r>
+              <a:rPr lang="pt-PT" sz="1400" b="1" dirty="0"/>
+              <a:t>demo1</a:t>
+            </a:r>
+            <a:r>
+              <a:rPr lang="pt-PT" sz="1400" dirty="0"/>
+              <a:t> e </a:t>
+            </a:r>
+            <a:r>
+              <a:rPr lang="pt-PT" sz="1400" b="1" i="1" dirty="0"/>
+              <a:t>demo2</a:t>
+            </a:r>
+            <a:r>
+              <a:rPr lang="pt-PT" sz="1400" i="1" dirty="0"/>
+              <a:t>.</a:t>
+            </a:r>
+            <a:endParaRPr lang="pt-PT" sz="1400" dirty="0"/>
+          </a:p>
+          <a:p>
+            <a:pPr marL="514350" indent="-285750" algn="just">
+              <a:buClr>
+                <a:srgbClr val="92D050"/>
+              </a:buClr>
+            </a:pPr>
+            <a:endParaRPr lang="pt-PT" sz="1400" dirty="0"/>
+          </a:p>
+          <a:p>
+            <a:pPr marL="514350" indent="-285750" algn="just">
+              <a:buClr>
+                <a:srgbClr val="92D050"/>
+              </a:buClr>
+            </a:pPr>
+            <a:r>
+              <a:rPr lang="pt-PT" sz="1400" dirty="0"/>
+              <a:t>De forma sucinta, estas tarefas tratam, em ambas as versões, o seguinte:</a:t>
+            </a:r>
+          </a:p>
+          <a:p>
+            <a:pPr marL="971550" lvl="1" indent="-285750" algn="just">
+              <a:buClr>
+                <a:srgbClr val="92D050"/>
+              </a:buClr>
+            </a:pPr>
+            <a:r>
+              <a:rPr lang="pt-PT" sz="1400" dirty="0"/>
+              <a:t>Identificação de </a:t>
+            </a:r>
+            <a:r>
+              <a:rPr lang="pt-PT" sz="1400" i="1" dirty="0"/>
+              <a:t>bad smells</a:t>
+            </a:r>
+            <a:r>
+              <a:rPr lang="pt-PT" sz="1400" dirty="0"/>
+              <a:t> no código fonte e ainda o seu </a:t>
+            </a:r>
+            <a:r>
+              <a:rPr lang="pt-PT" sz="1400" i="1" dirty="0"/>
+              <a:t>technical debt;</a:t>
+            </a:r>
+          </a:p>
+          <a:p>
+            <a:pPr marL="971550" lvl="1" indent="-285750" algn="just">
+              <a:buClr>
+                <a:srgbClr val="92D050"/>
+              </a:buClr>
+            </a:pPr>
+            <a:r>
+              <a:rPr lang="pt-PT" sz="1400" dirty="0"/>
+              <a:t>Aplicação de </a:t>
+            </a:r>
+            <a:r>
+              <a:rPr lang="pt-PT" sz="1400" i="1" dirty="0"/>
+              <a:t>refactoring </a:t>
+            </a:r>
+            <a:r>
+              <a:rPr lang="pt-PT" sz="1400" dirty="0"/>
+              <a:t>de modo a eliminar os </a:t>
+            </a:r>
+            <a:r>
+              <a:rPr lang="pt-PT" sz="1400" i="1" dirty="0"/>
+              <a:t>bad smells </a:t>
+            </a:r>
+            <a:r>
+              <a:rPr lang="pt-PT" sz="1400" dirty="0"/>
+              <a:t>encontrados;</a:t>
+            </a:r>
+          </a:p>
+          <a:p>
+            <a:pPr marL="971550" lvl="1" indent="-285750" algn="just">
+              <a:buClr>
+                <a:srgbClr val="92D050"/>
+              </a:buClr>
+            </a:pPr>
+            <a:r>
+              <a:rPr lang="pt-PT" sz="1400" dirty="0"/>
+              <a:t>Teste do </a:t>
+            </a:r>
+            <a:r>
+              <a:rPr lang="pt-PT" sz="1400" i="1" dirty="0"/>
+              <a:t>software</a:t>
+            </a:r>
+            <a:r>
+              <a:rPr lang="pt-PT" sz="1400" dirty="0"/>
+              <a:t> implementado;</a:t>
+            </a:r>
+          </a:p>
+          <a:p>
+            <a:pPr marL="971550" lvl="1" indent="-285750" algn="just">
+              <a:buClr>
+                <a:srgbClr val="92D050"/>
+              </a:buClr>
+            </a:pPr>
+            <a:r>
+              <a:rPr lang="pt-PT" sz="1400" dirty="0"/>
+              <a:t>Análise de desempenho das versões iniciais e finais de cada implementação.</a:t>
+            </a:r>
+          </a:p>
+        </p:txBody>
+      </p:sp>
+      <p:sp>
+        <p:nvSpPr>
+          <p:cNvPr id="91" name="Google Shape;91;p3"/>
+          <p:cNvSpPr txBox="1">
+            <a:spLocks noGrp="1"/>
+          </p:cNvSpPr>
+          <p:nvPr>
+            <p:ph type="sldNum" idx="12"/>
+          </p:nvPr>
+        </p:nvSpPr>
+        <p:spPr>
+          <a:xfrm>
+            <a:off x="8543227" y="4749851"/>
+            <a:ext cx="548700" cy="393600"/>
+          </a:xfrm>
+          <a:prstGeom prst="rect">
+            <a:avLst/>
+          </a:prstGeom>
+          <a:noFill/>
+          <a:ln>
+            <a:noFill/>
+          </a:ln>
+        </p:spPr>
+        <p:txBody>
+          <a:bodyPr spcFirstLastPara="1" wrap="square" lIns="91425" tIns="91425" rIns="91425" bIns="91425" anchor="t" anchorCtr="0">
+            <a:noAutofit/>
+          </a:bodyPr>
+          <a:lstStyle/>
+          <a:p>
+            <a:pPr marL="0" lvl="0" indent="0" algn="r" rtl="0">
+              <a:lnSpc>
+                <a:spcPct val="100000"/>
+              </a:lnSpc>
+              <a:spcBef>
+                <a:spcPts val="0"/>
+              </a:spcBef>
+              <a:spcAft>
+                <a:spcPts val="0"/>
+              </a:spcAft>
+              <a:buSzPts val="1300"/>
+              <a:buNone/>
+            </a:pPr>
+            <a:fld id="{00000000-1234-1234-1234-123412341234}" type="slidenum">
+              <a:rPr lang="en"/>
+              <a:t>3</a:t>
+            </a:fld>
+            <a:endParaRPr dirty="0"/>
+          </a:p>
+        </p:txBody>
+      </p:sp>
+      <p:sp>
+        <p:nvSpPr>
+          <p:cNvPr id="92" name="Google Shape;92;p3"/>
+          <p:cNvSpPr txBox="1">
+            <a:spLocks noGrp="1"/>
+          </p:cNvSpPr>
+          <p:nvPr>
+            <p:ph type="title"/>
+          </p:nvPr>
+        </p:nvSpPr>
+        <p:spPr>
+          <a:xfrm>
+            <a:off x="467725" y="648975"/>
+            <a:ext cx="2254500" cy="409500"/>
+          </a:xfrm>
+          <a:prstGeom prst="rect">
+            <a:avLst/>
+          </a:prstGeom>
+          <a:noFill/>
+          <a:ln>
+            <a:noFill/>
+          </a:ln>
+        </p:spPr>
+        <p:txBody>
+          <a:bodyPr spcFirstLastPara="1" wrap="square" lIns="91425" tIns="91425" rIns="91425" bIns="91425" anchor="b" anchorCtr="0">
+            <a:noAutofit/>
+          </a:bodyPr>
+          <a:lstStyle/>
+          <a:p>
+            <a:pPr marL="0" lvl="0" indent="0" algn="l" rtl="0">
+              <a:lnSpc>
+                <a:spcPct val="100000"/>
+              </a:lnSpc>
+              <a:spcBef>
+                <a:spcPts val="0"/>
+              </a:spcBef>
+              <a:spcAft>
+                <a:spcPts val="0"/>
+              </a:spcAft>
+              <a:buSzPts val="2400"/>
+              <a:buNone/>
+            </a:pPr>
+            <a:r>
+              <a:rPr lang="en" dirty="0">
+                <a:solidFill>
+                  <a:srgbClr val="92D050"/>
+                </a:solidFill>
+              </a:rPr>
+              <a:t>Introdução</a:t>
+            </a:r>
+            <a:endParaRPr dirty="0">
+              <a:solidFill>
+                <a:srgbClr val="92D050"/>
+              </a:solidFill>
+            </a:endParaRPr>
+          </a:p>
+        </p:txBody>
+      </p:sp>
+      <p:pic>
+        <p:nvPicPr>
+          <p:cNvPr id="93" name="Google Shape;93;p3"/>
+          <p:cNvPicPr preferRelativeResize="0"/>
+          <p:nvPr/>
+        </p:nvPicPr>
+        <p:blipFill rotWithShape="1">
+          <a:blip r:embed="rId3">
+            <a:alphaModFix/>
+          </a:blip>
+          <a:srcRect/>
+          <a:stretch/>
+        </p:blipFill>
+        <p:spPr>
+          <a:xfrm>
+            <a:off x="7759186" y="545650"/>
+            <a:ext cx="1025650" cy="1025650"/>
+          </a:xfrm>
+          <a:prstGeom prst="rect">
+            <a:avLst/>
+          </a:prstGeom>
+          <a:noFill/>
+          <a:ln>
+            <a:noFill/>
+          </a:ln>
+        </p:spPr>
+      </p:pic>
+    </p:spTree>
+  </p:cSld>
+  <p:clrMapOvr>
+    <a:masterClrMapping/>
+  </p:clrMapOvr>
+</p:sld>
+</file>
+
+<file path=ppt/slides/slide30.xml><?xml version="1.0" encoding="utf-8"?>
 <p:sld xmlns:a="http://schemas.openxmlformats.org/drawingml/2006/main" xmlns:r="http://schemas.openxmlformats.org/officeDocument/2006/relationships" xmlns:p="http://schemas.openxmlformats.org/presentationml/2006/main">
   <p:cSld>
     <p:bg>
@@ -17203,7 +18151,7 @@
             </a:pPr>
             <a:fld id="{00000000-1234-1234-1234-123412341234}" type="slidenum">
               <a:rPr lang="en"/>
-              <a:t>29</a:t>
+              <a:t>30</a:t>
             </a:fld>
             <a:endParaRPr dirty="0"/>
           </a:p>
@@ -17258,359 +18206,7 @@
 </p:sld>
 </file>
 
-<file path=ppt/slides/slide3.xml><?xml version="1.0" encoding="utf-8"?>
-<p:sld xmlns:a="http://schemas.openxmlformats.org/drawingml/2006/main" xmlns:r="http://schemas.openxmlformats.org/officeDocument/2006/relationships" xmlns:p="http://schemas.openxmlformats.org/presentationml/2006/main">
-  <p:cSld>
-    <p:spTree>
-      <p:nvGrpSpPr>
-        <p:cNvPr id="1" name="Shape 89"/>
-        <p:cNvGrpSpPr/>
-        <p:nvPr/>
-      </p:nvGrpSpPr>
-      <p:grpSpPr>
-        <a:xfrm>
-          <a:off x="0" y="0"/>
-          <a:ext cx="0" cy="0"/>
-          <a:chOff x="0" y="0"/>
-          <a:chExt cx="0" cy="0"/>
-        </a:xfrm>
-      </p:grpSpPr>
-      <p:sp>
-        <p:nvSpPr>
-          <p:cNvPr id="90" name="Google Shape;90;p3"/>
-          <p:cNvSpPr txBox="1">
-            <a:spLocks noGrp="1"/>
-          </p:cNvSpPr>
-          <p:nvPr>
-            <p:ph type="body" idx="1"/>
-          </p:nvPr>
-        </p:nvSpPr>
-        <p:spPr>
-          <a:xfrm>
-            <a:off x="363018" y="1058479"/>
-            <a:ext cx="6400948" cy="3825247"/>
-          </a:xfrm>
-          <a:prstGeom prst="rect">
-            <a:avLst/>
-          </a:prstGeom>
-          <a:noFill/>
-          <a:ln>
-            <a:noFill/>
-          </a:ln>
-        </p:spPr>
-        <p:txBody>
-          <a:bodyPr spcFirstLastPara="1" wrap="square" lIns="91425" tIns="91425" rIns="91425" bIns="91425" anchor="t" anchorCtr="0">
-            <a:noAutofit/>
-          </a:bodyPr>
-          <a:lstStyle/>
-          <a:p>
-            <a:pPr marL="514350" indent="-285750" algn="just">
-              <a:buClr>
-                <a:srgbClr val="92D050"/>
-              </a:buClr>
-            </a:pPr>
-            <a:r>
-              <a:rPr lang="pt-PT" sz="1400" dirty="0"/>
-              <a:t>Neste projeto foi-nos proposto a realização de várias tarefas de forma a analisar a qualidade das duas soluções desenvolvidas pelos alunos de </a:t>
-            </a:r>
-            <a:r>
-              <a:rPr lang="pt-PT" sz="1400" i="1" dirty="0"/>
-              <a:t>POO </a:t>
-            </a:r>
-            <a:r>
-              <a:rPr lang="pt-PT" sz="1400" dirty="0"/>
-              <a:t>no ano letivo de 2018/2019. </a:t>
-            </a:r>
-          </a:p>
-          <a:p>
-            <a:pPr marL="514350" indent="-285750" algn="just">
-              <a:buClr>
-                <a:srgbClr val="92D050"/>
-              </a:buClr>
-            </a:pPr>
-            <a:endParaRPr lang="pt-PT" sz="1600" dirty="0"/>
-          </a:p>
-          <a:p>
-            <a:pPr marL="514350" indent="-285750" algn="just">
-              <a:buClr>
-                <a:srgbClr val="92D050"/>
-              </a:buClr>
-            </a:pPr>
-            <a:r>
-              <a:rPr lang="pt-PT" sz="1400" dirty="0"/>
-              <a:t>As duas soluções da aplicação em causa, denominada por </a:t>
-            </a:r>
-            <a:r>
-              <a:rPr lang="pt-PT" sz="1400" i="1" dirty="0" err="1"/>
-              <a:t>UmCarroJá</a:t>
-            </a:r>
-            <a:r>
-              <a:rPr lang="pt-PT" sz="1400" dirty="0"/>
-              <a:t>, foram disponibilizadas na página desta unidade curricular. Os nomes associados a cada uma das mesmas são </a:t>
-            </a:r>
-            <a:r>
-              <a:rPr lang="pt-PT" sz="1400" b="1" dirty="0"/>
-              <a:t>demo1</a:t>
-            </a:r>
-            <a:r>
-              <a:rPr lang="pt-PT" sz="1400" dirty="0"/>
-              <a:t> e </a:t>
-            </a:r>
-            <a:r>
-              <a:rPr lang="pt-PT" sz="1400" b="1" i="1" dirty="0"/>
-              <a:t>demo2</a:t>
-            </a:r>
-            <a:r>
-              <a:rPr lang="pt-PT" sz="1400" i="1" dirty="0"/>
-              <a:t>.</a:t>
-            </a:r>
-            <a:endParaRPr lang="pt-PT" sz="1400" dirty="0"/>
-          </a:p>
-          <a:p>
-            <a:pPr marL="514350" indent="-285750" algn="just">
-              <a:buClr>
-                <a:srgbClr val="92D050"/>
-              </a:buClr>
-            </a:pPr>
-            <a:endParaRPr lang="pt-PT" sz="1400" dirty="0"/>
-          </a:p>
-          <a:p>
-            <a:pPr marL="514350" indent="-285750" algn="just">
-              <a:buClr>
-                <a:srgbClr val="92D050"/>
-              </a:buClr>
-            </a:pPr>
-            <a:r>
-              <a:rPr lang="pt-PT" sz="1400" dirty="0"/>
-              <a:t>De forma sucinta, estas tarefas tratam, em ambas as versões, o seguinte:</a:t>
-            </a:r>
-          </a:p>
-          <a:p>
-            <a:pPr marL="971550" lvl="1" indent="-285750" algn="just">
-              <a:buClr>
-                <a:srgbClr val="92D050"/>
-              </a:buClr>
-            </a:pPr>
-            <a:r>
-              <a:rPr lang="pt-PT" sz="1400" dirty="0"/>
-              <a:t>Identificação de </a:t>
-            </a:r>
-            <a:r>
-              <a:rPr lang="pt-PT" sz="1400" i="1" dirty="0"/>
-              <a:t>bad smells</a:t>
-            </a:r>
-            <a:r>
-              <a:rPr lang="pt-PT" sz="1400" dirty="0"/>
-              <a:t> no código fonte e ainda o seu </a:t>
-            </a:r>
-            <a:r>
-              <a:rPr lang="pt-PT" sz="1400" i="1" dirty="0"/>
-              <a:t>technical debt;</a:t>
-            </a:r>
-          </a:p>
-          <a:p>
-            <a:pPr marL="971550" lvl="1" indent="-285750" algn="just">
-              <a:buClr>
-                <a:srgbClr val="92D050"/>
-              </a:buClr>
-            </a:pPr>
-            <a:r>
-              <a:rPr lang="pt-PT" sz="1400" dirty="0"/>
-              <a:t>Aplicação de </a:t>
-            </a:r>
-            <a:r>
-              <a:rPr lang="pt-PT" sz="1400" i="1" dirty="0"/>
-              <a:t>refactoring </a:t>
-            </a:r>
-            <a:r>
-              <a:rPr lang="pt-PT" sz="1400" dirty="0"/>
-              <a:t>de modo a eliminar os </a:t>
-            </a:r>
-            <a:r>
-              <a:rPr lang="pt-PT" sz="1400" i="1" dirty="0"/>
-              <a:t>bad smells </a:t>
-            </a:r>
-            <a:r>
-              <a:rPr lang="pt-PT" sz="1400" dirty="0"/>
-              <a:t>encontrados;</a:t>
-            </a:r>
-          </a:p>
-          <a:p>
-            <a:pPr marL="971550" lvl="1" indent="-285750" algn="just">
-              <a:buClr>
-                <a:srgbClr val="92D050"/>
-              </a:buClr>
-            </a:pPr>
-            <a:r>
-              <a:rPr lang="pt-PT" sz="1400" dirty="0"/>
-              <a:t>Teste do </a:t>
-            </a:r>
-            <a:r>
-              <a:rPr lang="pt-PT" sz="1400" i="1" dirty="0"/>
-              <a:t>software</a:t>
-            </a:r>
-            <a:r>
-              <a:rPr lang="pt-PT" sz="1400" dirty="0"/>
-              <a:t> implementado;</a:t>
-            </a:r>
-          </a:p>
-          <a:p>
-            <a:pPr marL="971550" lvl="1" indent="-285750" algn="just">
-              <a:buClr>
-                <a:srgbClr val="92D050"/>
-              </a:buClr>
-            </a:pPr>
-            <a:r>
-              <a:rPr lang="pt-PT" sz="1400" dirty="0"/>
-              <a:t>Análise de desempenho das versões iniciais e finais de cada implementação.</a:t>
-            </a:r>
-          </a:p>
-        </p:txBody>
-      </p:sp>
-      <p:sp>
-        <p:nvSpPr>
-          <p:cNvPr id="91" name="Google Shape;91;p3"/>
-          <p:cNvSpPr txBox="1">
-            <a:spLocks noGrp="1"/>
-          </p:cNvSpPr>
-          <p:nvPr>
-            <p:ph type="sldNum" idx="12"/>
-          </p:nvPr>
-        </p:nvSpPr>
-        <p:spPr>
-          <a:xfrm>
-            <a:off x="8543227" y="4749851"/>
-            <a:ext cx="548700" cy="393600"/>
-          </a:xfrm>
-          <a:prstGeom prst="rect">
-            <a:avLst/>
-          </a:prstGeom>
-          <a:noFill/>
-          <a:ln>
-            <a:noFill/>
-          </a:ln>
-        </p:spPr>
-        <p:txBody>
-          <a:bodyPr spcFirstLastPara="1" wrap="square" lIns="91425" tIns="91425" rIns="91425" bIns="91425" anchor="t" anchorCtr="0">
-            <a:noAutofit/>
-          </a:bodyPr>
-          <a:lstStyle/>
-          <a:p>
-            <a:pPr marL="0" lvl="0" indent="0" algn="r" rtl="0">
-              <a:lnSpc>
-                <a:spcPct val="100000"/>
-              </a:lnSpc>
-              <a:spcBef>
-                <a:spcPts val="0"/>
-              </a:spcBef>
-              <a:spcAft>
-                <a:spcPts val="0"/>
-              </a:spcAft>
-              <a:buSzPts val="1300"/>
-              <a:buNone/>
-            </a:pPr>
-            <a:fld id="{00000000-1234-1234-1234-123412341234}" type="slidenum">
-              <a:rPr lang="en"/>
-              <a:t>3</a:t>
-            </a:fld>
-            <a:endParaRPr dirty="0"/>
-          </a:p>
-        </p:txBody>
-      </p:sp>
-      <p:sp>
-        <p:nvSpPr>
-          <p:cNvPr id="92" name="Google Shape;92;p3"/>
-          <p:cNvSpPr txBox="1">
-            <a:spLocks noGrp="1"/>
-          </p:cNvSpPr>
-          <p:nvPr>
-            <p:ph type="title"/>
-          </p:nvPr>
-        </p:nvSpPr>
-        <p:spPr>
-          <a:xfrm>
-            <a:off x="467725" y="648975"/>
-            <a:ext cx="2254500" cy="409500"/>
-          </a:xfrm>
-          <a:prstGeom prst="rect">
-            <a:avLst/>
-          </a:prstGeom>
-          <a:noFill/>
-          <a:ln>
-            <a:noFill/>
-          </a:ln>
-        </p:spPr>
-        <p:txBody>
-          <a:bodyPr spcFirstLastPara="1" wrap="square" lIns="91425" tIns="91425" rIns="91425" bIns="91425" anchor="b" anchorCtr="0">
-            <a:noAutofit/>
-          </a:bodyPr>
-          <a:lstStyle/>
-          <a:p>
-            <a:pPr marL="0" lvl="0" indent="0" algn="l" rtl="0">
-              <a:lnSpc>
-                <a:spcPct val="100000"/>
-              </a:lnSpc>
-              <a:spcBef>
-                <a:spcPts val="0"/>
-              </a:spcBef>
-              <a:spcAft>
-                <a:spcPts val="0"/>
-              </a:spcAft>
-              <a:buSzPts val="2400"/>
-              <a:buNone/>
-            </a:pPr>
-            <a:r>
-              <a:rPr lang="en" dirty="0">
-                <a:solidFill>
-                  <a:srgbClr val="92D050"/>
-                </a:solidFill>
-              </a:rPr>
-              <a:t>Introdução</a:t>
-            </a:r>
-            <a:endParaRPr dirty="0">
-              <a:solidFill>
-                <a:srgbClr val="92D050"/>
-              </a:solidFill>
-            </a:endParaRPr>
-          </a:p>
-        </p:txBody>
-      </p:sp>
-      <p:pic>
-        <p:nvPicPr>
-          <p:cNvPr id="93" name="Google Shape;93;p3"/>
-          <p:cNvPicPr preferRelativeResize="0"/>
-          <p:nvPr/>
-        </p:nvPicPr>
-        <p:blipFill rotWithShape="1">
-          <a:blip r:embed="rId3">
-            <a:alphaModFix/>
-          </a:blip>
-          <a:srcRect/>
-          <a:stretch/>
-        </p:blipFill>
-        <p:spPr>
-          <a:xfrm>
-            <a:off x="7759186" y="545650"/>
-            <a:ext cx="1025650" cy="1025650"/>
-          </a:xfrm>
-          <a:prstGeom prst="rect">
-            <a:avLst/>
-          </a:prstGeom>
-          <a:noFill/>
-          <a:ln>
-            <a:noFill/>
-          </a:ln>
-        </p:spPr>
-      </p:pic>
-    </p:spTree>
-  </p:cSld>
-  <p:clrMapOvr>
-    <a:masterClrMapping/>
-  </p:clrMapOvr>
-</p:sld>
-</file>
-
-<file path=ppt/slides/slide30.xml><?xml version="1.0" encoding="utf-8"?>
+<file path=ppt/slides/slide31.xml><?xml version="1.0" encoding="utf-8"?>
 <p:sld xmlns:a="http://schemas.openxmlformats.org/drawingml/2006/main" xmlns:r="http://schemas.openxmlformats.org/officeDocument/2006/relationships" xmlns:p="http://schemas.openxmlformats.org/presentationml/2006/main">
   <p:cSld>
     <p:bg>
@@ -17679,7 +18275,7 @@
             </a:pPr>
             <a:fld id="{00000000-1234-1234-1234-123412341234}" type="slidenum">
               <a:rPr lang="en"/>
-              <a:t>30</a:t>
+              <a:t>31</a:t>
             </a:fld>
             <a:endParaRPr dirty="0"/>
           </a:p>
@@ -17983,7 +18579,7 @@
 </p:sld>
 </file>
 
-<file path=ppt/slides/slide31.xml><?xml version="1.0" encoding="utf-8"?>
+<file path=ppt/slides/slide32.xml><?xml version="1.0" encoding="utf-8"?>
 <p:sld xmlns:a="http://schemas.openxmlformats.org/drawingml/2006/main" xmlns:r="http://schemas.openxmlformats.org/officeDocument/2006/relationships" xmlns:p="http://schemas.openxmlformats.org/presentationml/2006/main">
   <p:cSld>
     <p:bg>
@@ -18160,7 +18756,7 @@
             </a:pPr>
             <a:fld id="{00000000-1234-1234-1234-123412341234}" type="slidenum">
               <a:rPr lang="en"/>
-              <a:t>31</a:t>
+              <a:t>32</a:t>
             </a:fld>
             <a:endParaRPr dirty="0"/>
           </a:p>
@@ -18284,7 +18880,7 @@
               <a:t>Na segunda tarefa extra analisa-se de forma mais detalhada o impacto que cada tipo de </a:t>
             </a:r>
             <a:r>
-              <a:rPr lang="pt-PT" sz="1400" i="1" dirty="0" err="1"/>
+              <a:rPr lang="pt-PT" sz="1400" i="1" dirty="0"/>
               <a:t>smell</a:t>
             </a:r>
             <a:r>
@@ -18292,7 +18888,7 @@
               <a:t> tem no desempenho de cada versão da aplicação </a:t>
             </a:r>
             <a:r>
-              <a:rPr lang="pt-PT" sz="1400" i="1" dirty="0" err="1"/>
+              <a:rPr lang="pt-PT" sz="1400" i="1" dirty="0"/>
               <a:t>UmCarroJá</a:t>
             </a:r>
             <a:r>
@@ -19147,12 +19743,8 @@
               </a:buClr>
             </a:pPr>
             <a:r>
-              <a:rPr lang="pt-PT" sz="1400" i="1" dirty="0" err="1"/>
-              <a:t>Blocker</a:t>
-            </a:r>
-            <a:r>
               <a:rPr lang="pt-PT" sz="1400" i="1" dirty="0"/>
-              <a:t>: </a:t>
+              <a:t>Blocker: </a:t>
             </a:r>
             <a:r>
               <a:rPr lang="pt-PT" sz="1400" dirty="0"/>
@@ -19166,12 +19758,8 @@
               </a:buClr>
             </a:pPr>
             <a:r>
-              <a:rPr lang="pt-PT" sz="1400" i="1" dirty="0" err="1"/>
-              <a:t>Critical</a:t>
-            </a:r>
-            <a:r>
               <a:rPr lang="pt-PT" sz="1400" i="1" dirty="0"/>
-              <a:t>: </a:t>
+              <a:t>Critical: </a:t>
             </a:r>
             <a:r>
               <a:rPr lang="pt-PT" sz="1400" dirty="0"/>
@@ -19200,12 +19788,8 @@
               </a:buClr>
             </a:pPr>
             <a:r>
-              <a:rPr lang="pt-PT" sz="1400" i="1" dirty="0" err="1"/>
-              <a:t>Minor</a:t>
-            </a:r>
-            <a:r>
               <a:rPr lang="pt-PT" sz="1400" i="1" dirty="0"/>
-              <a:t>: </a:t>
+              <a:t>Minor: </a:t>
             </a:r>
             <a:r>
               <a:rPr lang="pt-PT" sz="1400" dirty="0"/>
@@ -19246,12 +19830,8 @@
               <a:t>1 vulnerabilidade do tipo </a:t>
             </a:r>
             <a:r>
-              <a:rPr lang="pt-PT" sz="1400" i="1" dirty="0" err="1"/>
-              <a:t>minor</a:t>
-            </a:r>
-            <a:r>
               <a:rPr lang="pt-PT" sz="1400" i="1" dirty="0"/>
-              <a:t>;</a:t>
+              <a:t>minor;</a:t>
             </a:r>
           </a:p>
           <a:p>
@@ -19629,12 +20209,8 @@
               </a:buClr>
             </a:pPr>
             <a:r>
-              <a:rPr lang="pt-PT" sz="1400" i="1" dirty="0" err="1"/>
-              <a:t>Blocker</a:t>
-            </a:r>
-            <a:r>
               <a:rPr lang="pt-PT" sz="1400" i="1" dirty="0"/>
-              <a:t>: </a:t>
+              <a:t>Blocker: </a:t>
             </a:r>
             <a:r>
               <a:rPr lang="pt-PT" sz="1400" dirty="0"/>
@@ -19648,12 +20224,8 @@
               </a:buClr>
             </a:pPr>
             <a:r>
-              <a:rPr lang="pt-PT" sz="1400" i="1" dirty="0" err="1"/>
-              <a:t>Critical</a:t>
-            </a:r>
-            <a:r>
               <a:rPr lang="pt-PT" sz="1400" i="1" dirty="0"/>
-              <a:t>: </a:t>
+              <a:t>Critical: </a:t>
             </a:r>
             <a:r>
               <a:rPr lang="pt-PT" sz="1400" dirty="0"/>
@@ -19682,12 +20254,8 @@
               </a:buClr>
             </a:pPr>
             <a:r>
-              <a:rPr lang="pt-PT" sz="1400" i="1" dirty="0" err="1"/>
-              <a:t>Minor</a:t>
-            </a:r>
-            <a:r>
               <a:rPr lang="pt-PT" sz="1400" i="1" dirty="0"/>
-              <a:t>: </a:t>
+              <a:t>Minor: </a:t>
             </a:r>
             <a:r>
               <a:rPr lang="pt-PT" sz="1400" dirty="0"/>
@@ -20101,12 +20669,8 @@
               </a:buClr>
             </a:pPr>
             <a:r>
-              <a:rPr lang="pt-PT" sz="1400" i="1" dirty="0" err="1"/>
-              <a:t>Blocker</a:t>
-            </a:r>
-            <a:r>
               <a:rPr lang="pt-PT" sz="1400" i="1" dirty="0"/>
-              <a:t>: 4</a:t>
+              <a:t>Blocker: 4</a:t>
             </a:r>
             <a:endParaRPr lang="pt-PT" sz="1400" dirty="0"/>
           </a:p>
@@ -20117,12 +20681,8 @@
               </a:buClr>
             </a:pPr>
             <a:r>
-              <a:rPr lang="pt-PT" sz="1400" i="1" dirty="0" err="1"/>
-              <a:t>Critical</a:t>
-            </a:r>
-            <a:r>
               <a:rPr lang="pt-PT" sz="1400" i="1" dirty="0"/>
-              <a:t>: 0</a:t>
+              <a:t>Critical: 0</a:t>
             </a:r>
             <a:endParaRPr lang="pt-PT" sz="1400" dirty="0"/>
           </a:p>
@@ -20145,12 +20705,8 @@
               </a:buClr>
             </a:pPr>
             <a:r>
-              <a:rPr lang="pt-PT" sz="1400" i="1" dirty="0" err="1"/>
-              <a:t>Minor</a:t>
-            </a:r>
-            <a:r>
               <a:rPr lang="pt-PT" sz="1400" i="1" dirty="0"/>
-              <a:t>: 27</a:t>
+              <a:t>Minor: 27</a:t>
             </a:r>
             <a:endParaRPr lang="pt-PT" sz="1400" dirty="0"/>
           </a:p>
@@ -20188,12 +20744,8 @@
               <a:t>10 vulnerabilidade do tipo </a:t>
             </a:r>
             <a:r>
-              <a:rPr lang="pt-PT" sz="1400" i="1" dirty="0" err="1"/>
-              <a:t>minor</a:t>
-            </a:r>
-            <a:r>
               <a:rPr lang="pt-PT" sz="1400" i="1" dirty="0"/>
-              <a:t>;</a:t>
+              <a:t>minor;</a:t>
             </a:r>
           </a:p>
           <a:p>

</xml_diff>

<commit_message>
#98 Commit: PPT (conclusão)
</commit_message>
<xml_diff>
--- a/Apresentação.pptx
+++ b/Apresentação.pptx
@@ -277,7 +277,7 @@
       <p15:sldGuideLst xmlns:p15="http://schemas.microsoft.com/office/powerpoint/2012/main"/>
     </p:ext>
     <p:ext uri="http://customooxmlschemas.google.com/">
-      <go:slidesCustomData xmlns:go="http://customooxmlschemas.google.com/" xmlns:p15="http://schemas.microsoft.com/office/powerpoint/2012/main" xmlns:p14="http://schemas.microsoft.com/office/powerpoint/2010/main" xmlns:com="http://schemas.openxmlformats.org/drawingml/2006/compatibility" xmlns:pvml="urn:schemas-microsoft-com:office:powerpoint" xmlns:v="urn:schemas-microsoft-com:vml" xmlns:o="urn:schemas-microsoft-com:office:office" xmlns:dgm="http://schemas.openxmlformats.org/drawingml/2006/diagram" xmlns:c="http://schemas.openxmlformats.org/drawingml/2006/chart" xmlns:mv="urn:schemas-microsoft-com:mac:vml" xmlns:mc="http://schemas.openxmlformats.org/markup-compatibility/2006" xmlns="" r:id="rId35" roundtripDataSignature="AMtx7mi2giJIhmxq+e/rTQEB/kbV3AzsFA=="/>
+      <go:slidesCustomData xmlns="" xmlns:mc="http://schemas.openxmlformats.org/markup-compatibility/2006" xmlns:mv="urn:schemas-microsoft-com:mac:vml" xmlns:c="http://schemas.openxmlformats.org/drawingml/2006/chart" xmlns:dgm="http://schemas.openxmlformats.org/drawingml/2006/diagram" xmlns:o="urn:schemas-microsoft-com:office:office" xmlns:v="urn:schemas-microsoft-com:vml" xmlns:pvml="urn:schemas-microsoft-com:office:powerpoint" xmlns:com="http://schemas.openxmlformats.org/drawingml/2006/compatibility" xmlns:p14="http://schemas.microsoft.com/office/powerpoint/2010/main" xmlns:p15="http://schemas.microsoft.com/office/powerpoint/2012/main" xmlns:go="http://customooxmlschemas.google.com/" r:id="rId35" roundtripDataSignature="AMtx7mi2giJIhmxq+e/rTQEB/kbV3AzsFA=="/>
     </p:ext>
   </p:extLst>
 </p:presentation>
@@ -18083,6 +18083,18 @@
                 </a:schemeClr>
               </a:buClr>
             </a:pPr>
+            <a:r>
+              <a:rPr lang="pt-PT" sz="1600" dirty="0" err="1"/>
+              <a:t>Ks</a:t>
+            </a:r>
+            <a:r>
+              <a:rPr lang="pt-PT" sz="1600" dirty="0"/>
+              <a:t> </a:t>
+            </a:r>
+            <a:r>
+              <a:rPr lang="pt-PT" sz="1600" dirty="0" err="1"/>
+              <a:t>ack</a:t>
+            </a:r>
             <a:endParaRPr lang="pt-PT" sz="1600" dirty="0"/>
           </a:p>
           <a:p>
@@ -18571,6 +18583,42 @@
           </a:p>
         </p:txBody>
       </p:sp>
+      <p:pic>
+        <p:nvPicPr>
+          <p:cNvPr id="3" name="Gráfico 2">
+            <a:extLst>
+              <a:ext uri="{FF2B5EF4-FFF2-40B4-BE49-F238E27FC236}">
+                <a16:creationId xmlns:a16="http://schemas.microsoft.com/office/drawing/2014/main" id="{197635B5-629D-A34F-9D9A-A695DF6A6385}"/>
+              </a:ext>
+            </a:extLst>
+          </p:cNvPr>
+          <p:cNvPicPr>
+            <a:picLocks noChangeAspect="1"/>
+          </p:cNvPicPr>
+          <p:nvPr/>
+        </p:nvPicPr>
+        <p:blipFill>
+          <a:blip r:embed="rId3">
+            <a:extLst>
+              <a:ext uri="{96DAC541-7B7A-43D3-8B79-37D633B846F1}">
+                <asvg:svgBlip xmlns:asvg="http://schemas.microsoft.com/office/drawing/2016/SVG/main" r:embed="rId4"/>
+              </a:ext>
+            </a:extLst>
+          </a:blip>
+          <a:stretch>
+            <a:fillRect/>
+          </a:stretch>
+        </p:blipFill>
+        <p:spPr>
+          <a:xfrm>
+            <a:off x="6027924" y="1342887"/>
+            <a:ext cx="2457725" cy="2457725"/>
+          </a:xfrm>
+          <a:prstGeom prst="rect">
+            <a:avLst/>
+          </a:prstGeom>
+        </p:spPr>
+      </p:pic>
     </p:spTree>
   </p:cSld>
   <p:clrMapOvr>
@@ -18664,56 +18712,6 @@
       </p:sp>
       <p:sp>
         <p:nvSpPr>
-          <p:cNvPr id="290" name="Google Shape;290;g5c71c07026_7_2"/>
-          <p:cNvSpPr txBox="1">
-            <a:spLocks noGrp="1"/>
-          </p:cNvSpPr>
-          <p:nvPr>
-            <p:ph type="body" idx="1"/>
-          </p:nvPr>
-        </p:nvSpPr>
-        <p:spPr>
-          <a:xfrm>
-            <a:off x="363018" y="1058479"/>
-            <a:ext cx="6380700" cy="3825300"/>
-          </a:xfrm>
-          <a:prstGeom prst="rect">
-            <a:avLst/>
-          </a:prstGeom>
-          <a:noFill/>
-          <a:ln>
-            <a:noFill/>
-          </a:ln>
-        </p:spPr>
-        <p:txBody>
-          <a:bodyPr spcFirstLastPara="1" wrap="square" lIns="91425" tIns="91425" rIns="91425" bIns="91425" anchor="t" anchorCtr="0">
-            <a:noAutofit/>
-          </a:bodyPr>
-          <a:lstStyle/>
-          <a:p>
-            <a:pPr marL="228600" lvl="0" indent="0" algn="just" rtl="0">
-              <a:lnSpc>
-                <a:spcPct val="100000"/>
-              </a:lnSpc>
-              <a:spcBef>
-                <a:spcPts val="600"/>
-              </a:spcBef>
-              <a:spcAft>
-                <a:spcPts val="0"/>
-              </a:spcAft>
-              <a:buClr>
-                <a:srgbClr val="92D050"/>
-              </a:buClr>
-              <a:buSzPts val="2000"/>
-              <a:buFont typeface="Noto Sans Symbols"/>
-              <a:buNone/>
-            </a:pPr>
-            <a:endParaRPr sz="1600" dirty="0"/>
-          </a:p>
-        </p:txBody>
-      </p:sp>
-      <p:sp>
-        <p:nvSpPr>
           <p:cNvPr id="291" name="Google Shape;291;g5c71c07026_7_2"/>
           <p:cNvSpPr txBox="1">
             <a:spLocks noGrp="1"/>
@@ -18762,6 +18760,132 @@
           </a:p>
         </p:txBody>
       </p:sp>
+      <p:sp>
+        <p:nvSpPr>
+          <p:cNvPr id="8" name="Google Shape;151;g5c66568b58_0_22">
+            <a:extLst>
+              <a:ext uri="{FF2B5EF4-FFF2-40B4-BE49-F238E27FC236}">
+                <a16:creationId xmlns:a16="http://schemas.microsoft.com/office/drawing/2014/main" id="{D7435A4D-FDC3-A048-AD66-516D438FDB05}"/>
+              </a:ext>
+            </a:extLst>
+          </p:cNvPr>
+          <p:cNvSpPr txBox="1">
+            <a:spLocks noGrp="1"/>
+          </p:cNvSpPr>
+          <p:nvPr>
+            <p:ph type="body" idx="1"/>
+          </p:nvPr>
+        </p:nvSpPr>
+        <p:spPr>
+          <a:xfrm>
+            <a:off x="363018" y="1058479"/>
+            <a:ext cx="6380700" cy="3825300"/>
+          </a:xfrm>
+          <a:prstGeom prst="rect">
+            <a:avLst/>
+          </a:prstGeom>
+          <a:noFill/>
+          <a:ln>
+            <a:noFill/>
+          </a:ln>
+        </p:spPr>
+        <p:txBody>
+          <a:bodyPr spcFirstLastPara="1" wrap="square" lIns="91425" tIns="91425" rIns="91425" bIns="91425" anchor="t" anchorCtr="0">
+            <a:noAutofit/>
+          </a:bodyPr>
+          <a:lstStyle/>
+          <a:p>
+            <a:pPr marL="285750" indent="-285750" algn="just">
+              <a:buClr>
+                <a:srgbClr val="0070C0"/>
+              </a:buClr>
+            </a:pPr>
+            <a:r>
+              <a:rPr lang="pt-PT" sz="1400" dirty="0"/>
+              <a:t>Após a demonstração da abordagem tomada para cada uma das tarefas propostas neste trabalho prático e, ainda, a exibição dos resultados obtidos em cada uma das mesmas, dá-se por concluído a execução deste projeto.</a:t>
+            </a:r>
+          </a:p>
+          <a:p>
+            <a:pPr marL="285750" indent="-285750" algn="just">
+              <a:buClr>
+                <a:srgbClr val="0070C0"/>
+              </a:buClr>
+            </a:pPr>
+            <a:endParaRPr lang="pt-PT" sz="1400" dirty="0"/>
+          </a:p>
+          <a:p>
+            <a:pPr marL="285750" indent="-285750" algn="just">
+              <a:buClr>
+                <a:srgbClr val="0070C0"/>
+              </a:buClr>
+            </a:pPr>
+            <a:r>
+              <a:rPr lang="pt-PT" sz="1400" dirty="0"/>
+              <a:t>Neste trabalho prático foi possível comparar as duas implementações distintas de 2 grupos de </a:t>
+            </a:r>
+            <a:r>
+              <a:rPr lang="pt-PT" sz="1400" i="1" dirty="0"/>
+              <a:t>POO</a:t>
+            </a:r>
+            <a:r>
+              <a:rPr lang="pt-PT" sz="1400" dirty="0"/>
+              <a:t> do ano letivo 2018/2019 quer a nível de consumo energético quer a nível de tempo de execução e de consumo de memória, para </a:t>
+            </a:r>
+            <a:r>
+              <a:rPr lang="pt-PT" sz="1400" i="1" dirty="0"/>
+              <a:t>inputs </a:t>
+            </a:r>
+            <a:r>
+              <a:rPr lang="pt-PT" sz="1400" dirty="0"/>
+              <a:t>de tamanho diferente.</a:t>
+            </a:r>
+          </a:p>
+          <a:p>
+            <a:pPr marL="285750" indent="-285750" algn="just">
+              <a:buClr>
+                <a:srgbClr val="0070C0"/>
+              </a:buClr>
+            </a:pPr>
+            <a:endParaRPr lang="pt-PT" sz="1600" dirty="0"/>
+          </a:p>
+        </p:txBody>
+      </p:sp>
+      <p:pic>
+        <p:nvPicPr>
+          <p:cNvPr id="9" name="Gráfico 8">
+            <a:extLst>
+              <a:ext uri="{FF2B5EF4-FFF2-40B4-BE49-F238E27FC236}">
+                <a16:creationId xmlns:a16="http://schemas.microsoft.com/office/drawing/2014/main" id="{16A34161-0E38-474D-8497-FD2FA32684A6}"/>
+              </a:ext>
+            </a:extLst>
+          </p:cNvPr>
+          <p:cNvPicPr>
+            <a:picLocks noChangeAspect="1"/>
+          </p:cNvPicPr>
+          <p:nvPr/>
+        </p:nvPicPr>
+        <p:blipFill>
+          <a:blip r:embed="rId3">
+            <a:extLst>
+              <a:ext uri="{96DAC541-7B7A-43D3-8B79-37D633B846F1}">
+                <asvg:svgBlip xmlns:asvg="http://schemas.microsoft.com/office/drawing/2016/SVG/main" r:embed="rId4"/>
+              </a:ext>
+            </a:extLst>
+          </a:blip>
+          <a:stretch>
+            <a:fillRect/>
+          </a:stretch>
+        </p:blipFill>
+        <p:spPr>
+          <a:xfrm>
+            <a:off x="7636884" y="297665"/>
+            <a:ext cx="1039391" cy="1039391"/>
+          </a:xfrm>
+          <a:prstGeom prst="rect">
+            <a:avLst/>
+          </a:prstGeom>
+        </p:spPr>
+      </p:pic>
     </p:spTree>
   </p:cSld>
   <p:clrMapOvr>

</xml_diff>

<commit_message>
#99 Commit: PPT + Relatório
</commit_message>
<xml_diff>
--- a/Apresentação.pptx
+++ b/Apresentação.pptx
@@ -5,7 +5,7 @@
     <p:sldMasterId id="2147483648" r:id="rId1"/>
   </p:sldMasterIdLst>
   <p:notesMasterIdLst>
-    <p:notesMasterId r:id="rId34"/>
+    <p:notesMasterId r:id="rId35"/>
   </p:notesMasterIdLst>
   <p:sldIdLst>
     <p:sldId id="256" r:id="rId2"/>
@@ -38,8 +38,9 @@
     <p:sldId id="297" r:id="rId29"/>
     <p:sldId id="299" r:id="rId30"/>
     <p:sldId id="306" r:id="rId31"/>
-    <p:sldId id="281" r:id="rId32"/>
-    <p:sldId id="282" r:id="rId33"/>
+    <p:sldId id="310" r:id="rId32"/>
+    <p:sldId id="281" r:id="rId33"/>
+    <p:sldId id="282" r:id="rId34"/>
   </p:sldIdLst>
   <p:sldSz cx="9144000" cy="5143500" type="screen16x9"/>
   <p:notesSz cx="6858000" cy="9144000"/>
@@ -277,7 +278,7 @@
       <p15:sldGuideLst xmlns:p15="http://schemas.microsoft.com/office/powerpoint/2012/main"/>
     </p:ext>
     <p:ext uri="http://customooxmlschemas.google.com/">
-      <go:slidesCustomData xmlns="" xmlns:mc="http://schemas.openxmlformats.org/markup-compatibility/2006" xmlns:mv="urn:schemas-microsoft-com:mac:vml" xmlns:c="http://schemas.openxmlformats.org/drawingml/2006/chart" xmlns:dgm="http://schemas.openxmlformats.org/drawingml/2006/diagram" xmlns:o="urn:schemas-microsoft-com:office:office" xmlns:v="urn:schemas-microsoft-com:vml" xmlns:pvml="urn:schemas-microsoft-com:office:powerpoint" xmlns:com="http://schemas.openxmlformats.org/drawingml/2006/compatibility" xmlns:p14="http://schemas.microsoft.com/office/powerpoint/2010/main" xmlns:p15="http://schemas.microsoft.com/office/powerpoint/2012/main" xmlns:go="http://customooxmlschemas.google.com/" r:id="rId35" roundtripDataSignature="AMtx7mi2giJIhmxq+e/rTQEB/kbV3AzsFA=="/>
+      <go:slidesCustomData xmlns:go="http://customooxmlschemas.google.com/" xmlns:p15="http://schemas.microsoft.com/office/powerpoint/2012/main" xmlns:p14="http://schemas.microsoft.com/office/powerpoint/2010/main" xmlns:com="http://schemas.openxmlformats.org/drawingml/2006/compatibility" xmlns:pvml="urn:schemas-microsoft-com:office:powerpoint" xmlns:v="urn:schemas-microsoft-com:vml" xmlns:o="urn:schemas-microsoft-com:office:office" xmlns:dgm="http://schemas.openxmlformats.org/drawingml/2006/diagram" xmlns:c="http://schemas.openxmlformats.org/drawingml/2006/chart" xmlns:mv="urn:schemas-microsoft-com:mac:vml" xmlns:mc="http://schemas.openxmlformats.org/markup-compatibility/2006" xmlns="" r:id="rId36" roundtripDataSignature="AMtx7mi2giJIhmxq+e/rTQEB/kbV3AzsFA=="/>
     </p:ext>
   </p:extLst>
 </p:presentation>
@@ -3270,6 +3271,133 @@
   <p:cSld>
     <p:spTree>
       <p:nvGrpSpPr>
+        <p:cNvPr id="1" name="Shape 146"/>
+        <p:cNvGrpSpPr/>
+        <p:nvPr/>
+      </p:nvGrpSpPr>
+      <p:grpSpPr>
+        <a:xfrm>
+          <a:off x="0" y="0"/>
+          <a:ext cx="0" cy="0"/>
+          <a:chOff x="0" y="0"/>
+          <a:chExt cx="0" cy="0"/>
+        </a:xfrm>
+      </p:grpSpPr>
+      <p:sp>
+        <p:nvSpPr>
+          <p:cNvPr id="147" name="Google Shape;147;g5c66568b58_0_22:notes"/>
+          <p:cNvSpPr txBox="1">
+            <a:spLocks noGrp="1"/>
+          </p:cNvSpPr>
+          <p:nvPr>
+            <p:ph type="body" idx="1"/>
+          </p:nvPr>
+        </p:nvSpPr>
+        <p:spPr>
+          <a:xfrm>
+            <a:off x="685800" y="4343400"/>
+            <a:ext cx="5486400" cy="4114800"/>
+          </a:xfrm>
+          <a:prstGeom prst="rect">
+            <a:avLst/>
+          </a:prstGeom>
+          <a:noFill/>
+          <a:ln>
+            <a:noFill/>
+          </a:ln>
+        </p:spPr>
+        <p:txBody>
+          <a:bodyPr spcFirstLastPara="1" wrap="square" lIns="91425" tIns="91425" rIns="91425" bIns="91425" anchor="t" anchorCtr="0">
+            <a:noAutofit/>
+          </a:bodyPr>
+          <a:lstStyle/>
+          <a:p>
+            <a:pPr marL="0" lvl="0" indent="0" algn="l" rtl="0">
+              <a:lnSpc>
+                <a:spcPct val="100000"/>
+              </a:lnSpc>
+              <a:spcBef>
+                <a:spcPts val="0"/>
+              </a:spcBef>
+              <a:spcAft>
+                <a:spcPts val="0"/>
+              </a:spcAft>
+              <a:buSzPts val="1400"/>
+              <a:buNone/>
+            </a:pPr>
+            <a:endParaRPr dirty="0"/>
+          </a:p>
+        </p:txBody>
+      </p:sp>
+      <p:sp>
+        <p:nvSpPr>
+          <p:cNvPr id="148" name="Google Shape;148;g5c66568b58_0_22:notes"/>
+          <p:cNvSpPr>
+            <a:spLocks noGrp="1" noRot="1" noChangeAspect="1"/>
+          </p:cNvSpPr>
+          <p:nvPr>
+            <p:ph type="sldImg" idx="2"/>
+          </p:nvPr>
+        </p:nvSpPr>
+        <p:spPr>
+          <a:xfrm>
+            <a:off x="381000" y="685800"/>
+            <a:ext cx="6096000" cy="3429000"/>
+          </a:xfrm>
+          <a:custGeom>
+            <a:avLst/>
+            <a:gdLst/>
+            <a:ahLst/>
+            <a:cxnLst/>
+            <a:rect l="l" t="t" r="r" b="b"/>
+            <a:pathLst>
+              <a:path w="120000" h="120000" extrusionOk="0">
+                <a:moveTo>
+                  <a:pt x="0" y="0"/>
+                </a:moveTo>
+                <a:lnTo>
+                  <a:pt x="120000" y="0"/>
+                </a:lnTo>
+                <a:lnTo>
+                  <a:pt x="120000" y="120000"/>
+                </a:lnTo>
+                <a:lnTo>
+                  <a:pt x="0" y="120000"/>
+                </a:lnTo>
+                <a:close/>
+              </a:path>
+            </a:pathLst>
+          </a:custGeom>
+          <a:noFill/>
+          <a:ln w="9525" cap="flat" cmpd="sng">
+            <a:solidFill>
+              <a:srgbClr val="000000"/>
+            </a:solidFill>
+            <a:prstDash val="solid"/>
+            <a:round/>
+            <a:headEnd type="none" w="sm" len="sm"/>
+            <a:tailEnd type="none" w="sm" len="sm"/>
+          </a:ln>
+        </p:spPr>
+      </p:sp>
+    </p:spTree>
+    <p:extLst>
+      <p:ext uri="{BB962C8B-B14F-4D97-AF65-F5344CB8AC3E}">
+        <p14:creationId xmlns:p14="http://schemas.microsoft.com/office/powerpoint/2010/main" val="2743316123"/>
+      </p:ext>
+    </p:extLst>
+  </p:cSld>
+  <p:clrMapOvr>
+    <a:masterClrMapping/>
+  </p:clrMapOvr>
+</p:notes>
+</file>
+
+<file path=ppt/notesSlides/notesSlide28.xml><?xml version="1.0" encoding="utf-8"?>
+<p:notes xmlns:a="http://schemas.openxmlformats.org/drawingml/2006/main" xmlns:r="http://schemas.openxmlformats.org/officeDocument/2006/relationships" xmlns:p="http://schemas.openxmlformats.org/presentationml/2006/main" showMasterSp="0" showMasterPhAnim="0">
+  <p:cSld>
+    <p:spTree>
+      <p:nvGrpSpPr>
         <p:cNvPr id="1" name="Shape 279"/>
         <p:cNvGrpSpPr/>
         <p:nvPr/>
@@ -3387,7 +3515,7 @@
 </p:notes>
 </file>
 
-<file path=ppt/notesSlides/notesSlide28.xml><?xml version="1.0" encoding="utf-8"?>
+<file path=ppt/notesSlides/notesSlide29.xml><?xml version="1.0" encoding="utf-8"?>
 <p:notes xmlns:a="http://schemas.openxmlformats.org/drawingml/2006/main" xmlns:r="http://schemas.openxmlformats.org/officeDocument/2006/relationships" xmlns:p="http://schemas.openxmlformats.org/presentationml/2006/main" showMasterSp="0" showMasterPhAnim="0">
   <p:cSld>
     <p:spTree>
@@ -15541,8 +15669,12 @@
               <a:t>Por fim, de maneira a executar o gerador proposto, foi necessário parametrizar numa variável o número de registos a serem escritos para o ficheiro </a:t>
             </a:r>
             <a:r>
+              <a:rPr lang="pt-PT" sz="1400" i="1" dirty="0" err="1"/>
+              <a:t>logs.bak</a:t>
+            </a:r>
+            <a:r>
               <a:rPr lang="pt-PT" sz="1400" i="1" dirty="0"/>
-              <a:t>logs.bak,</a:t>
+              <a:t>,</a:t>
             </a:r>
             <a:r>
               <a:rPr lang="pt-PT" sz="1400" dirty="0"/>
@@ -16852,76 +16984,6 @@
       </p:sp>
       <p:sp>
         <p:nvSpPr>
-          <p:cNvPr id="151" name="Google Shape;151;g5c66568b58_0_22"/>
-          <p:cNvSpPr txBox="1">
-            <a:spLocks noGrp="1"/>
-          </p:cNvSpPr>
-          <p:nvPr>
-            <p:ph type="body" idx="1"/>
-          </p:nvPr>
-        </p:nvSpPr>
-        <p:spPr>
-          <a:xfrm>
-            <a:off x="363018" y="1058479"/>
-            <a:ext cx="6380700" cy="3825300"/>
-          </a:xfrm>
-          <a:prstGeom prst="rect">
-            <a:avLst/>
-          </a:prstGeom>
-          <a:noFill/>
-          <a:ln>
-            <a:noFill/>
-          </a:ln>
-        </p:spPr>
-        <p:txBody>
-          <a:bodyPr spcFirstLastPara="1" wrap="square" lIns="91425" tIns="91425" rIns="91425" bIns="91425" anchor="t" anchorCtr="0">
-            <a:noAutofit/>
-          </a:bodyPr>
-          <a:lstStyle/>
-          <a:p>
-            <a:pPr marL="0" lvl="0" indent="0" algn="just" rtl="0">
-              <a:lnSpc>
-                <a:spcPct val="100000"/>
-              </a:lnSpc>
-              <a:spcBef>
-                <a:spcPts val="600"/>
-              </a:spcBef>
-              <a:spcAft>
-                <a:spcPts val="0"/>
-              </a:spcAft>
-              <a:buClr>
-                <a:srgbClr val="92D050"/>
-              </a:buClr>
-              <a:buSzPts val="2000"/>
-              <a:buFont typeface="Noto Sans Symbols"/>
-              <a:buNone/>
-            </a:pPr>
-            <a:endParaRPr lang="pt-PT" sz="1600" dirty="0"/>
-          </a:p>
-          <a:p>
-            <a:pPr marL="457200" lvl="0" indent="-355600" algn="just" rtl="0">
-              <a:lnSpc>
-                <a:spcPct val="100000"/>
-              </a:lnSpc>
-              <a:spcBef>
-                <a:spcPts val="600"/>
-              </a:spcBef>
-              <a:spcAft>
-                <a:spcPts val="0"/>
-              </a:spcAft>
-              <a:buClr>
-                <a:srgbClr val="FFC107"/>
-              </a:buClr>
-              <a:buSzPts val="2000"/>
-              <a:buFont typeface="Noto Sans Symbols"/>
-              <a:buChar char="▪"/>
-            </a:pPr>
-            <a:endParaRPr lang="pt-PT" sz="1200" dirty="0"/>
-          </a:p>
-        </p:txBody>
-      </p:sp>
-      <p:sp>
-        <p:nvSpPr>
           <p:cNvPr id="152" name="Google Shape;152;g5c66568b58_0_22"/>
           <p:cNvSpPr txBox="1">
             <a:spLocks noGrp="1"/>
@@ -16967,6 +17029,129 @@
               <a:t>26</a:t>
             </a:fld>
             <a:endParaRPr dirty="0"/>
+          </a:p>
+        </p:txBody>
+      </p:sp>
+      <p:sp>
+        <p:nvSpPr>
+          <p:cNvPr id="12" name="Google Shape;151;g5c66568b58_0_22">
+            <a:extLst>
+              <a:ext uri="{FF2B5EF4-FFF2-40B4-BE49-F238E27FC236}">
+                <a16:creationId xmlns:a16="http://schemas.microsoft.com/office/drawing/2014/main" id="{C1032444-E22F-214E-8438-B97C9A672E00}"/>
+              </a:ext>
+            </a:extLst>
+          </p:cNvPr>
+          <p:cNvSpPr txBox="1">
+            <a:spLocks noGrp="1"/>
+          </p:cNvSpPr>
+          <p:nvPr>
+            <p:ph type="body" idx="1"/>
+          </p:nvPr>
+        </p:nvSpPr>
+        <p:spPr>
+          <a:xfrm>
+            <a:off x="363018" y="1058479"/>
+            <a:ext cx="6380700" cy="3825300"/>
+          </a:xfrm>
+          <a:prstGeom prst="rect">
+            <a:avLst/>
+          </a:prstGeom>
+          <a:noFill/>
+          <a:ln>
+            <a:noFill/>
+          </a:ln>
+        </p:spPr>
+        <p:txBody>
+          <a:bodyPr spcFirstLastPara="1" wrap="square" lIns="91425" tIns="91425" rIns="91425" bIns="91425" anchor="t" anchorCtr="0">
+            <a:noAutofit/>
+          </a:bodyPr>
+          <a:lstStyle/>
+          <a:p>
+            <a:r>
+              <a:rPr lang="pt-PT" sz="1400" dirty="0"/>
+              <a:t>Após as diversas alterações e eliminações de </a:t>
+            </a:r>
+            <a:r>
+              <a:rPr lang="pt-PT" sz="1400" i="1" dirty="0"/>
+              <a:t>smells,</a:t>
+            </a:r>
+            <a:r>
+              <a:rPr lang="pt-PT" sz="1400" dirty="0"/>
+              <a:t> é necessário verificar que estas tiveram impacto sobre a funcionalidade do programa. </a:t>
+            </a:r>
+          </a:p>
+          <a:p>
+            <a:endParaRPr lang="pt-PT" sz="1400" dirty="0"/>
+          </a:p>
+          <a:p>
+            <a:r>
+              <a:rPr lang="pt-PT" sz="1400" dirty="0"/>
+              <a:t>Para tal foi utilizada a ferramenta </a:t>
+            </a:r>
+            <a:r>
+              <a:rPr lang="pt-PT" sz="1400" i="1" dirty="0"/>
+              <a:t>RAPL</a:t>
+            </a:r>
+            <a:r>
+              <a:rPr lang="pt-PT" sz="1400" dirty="0"/>
+              <a:t>, disponibilizada pelos docentes, para analisar o consumo energético do programa. </a:t>
+            </a:r>
+          </a:p>
+          <a:p>
+            <a:endParaRPr lang="pt-PT" sz="1400" dirty="0"/>
+          </a:p>
+          <a:p>
+            <a:r>
+              <a:rPr lang="pt-PT" sz="1400" dirty="0"/>
+              <a:t>Como primeira etapa foram registados os valores energéticos com </a:t>
+            </a:r>
+            <a:r>
+              <a:rPr lang="pt-PT" sz="1400" i="1" dirty="0"/>
+              <a:t>logs</a:t>
+            </a:r>
+            <a:r>
+              <a:rPr lang="pt-PT" sz="1400" dirty="0"/>
+              <a:t> de diversos tamanhos (5, 55, 5555). De </a:t>
+            </a:r>
+            <a:r>
+              <a:rPr lang="pt-PT" sz="1400" i="1" dirty="0"/>
+              <a:t>slide </a:t>
+            </a:r>
+            <a:r>
+              <a:rPr lang="pt-PT" sz="1400" dirty="0"/>
+              <a:t>seguinte encontram-se as tabelas com os resultados obtidos.</a:t>
+            </a:r>
+          </a:p>
+          <a:p>
+            <a:pPr>
+              <a:buClr>
+                <a:schemeClr val="accent3">
+                  <a:lumMod val="60000"/>
+                  <a:lumOff val="40000"/>
+                </a:schemeClr>
+              </a:buClr>
+            </a:pPr>
+            <a:endParaRPr lang="pt-PT" sz="1400" dirty="0"/>
+          </a:p>
+          <a:p>
+            <a:pPr marL="457200" lvl="0" indent="-355600" algn="just" rtl="0">
+              <a:lnSpc>
+                <a:spcPct val="100000"/>
+              </a:lnSpc>
+              <a:spcBef>
+                <a:spcPts val="600"/>
+              </a:spcBef>
+              <a:spcAft>
+                <a:spcPts val="0"/>
+              </a:spcAft>
+              <a:buClr>
+                <a:srgbClr val="FFC107"/>
+              </a:buClr>
+              <a:buSzPts val="2000"/>
+              <a:buFont typeface="Noto Sans Symbols"/>
+              <a:buChar char="▪"/>
+            </a:pPr>
+            <a:endParaRPr lang="pt-PT" sz="1400" dirty="0"/>
           </a:p>
         </p:txBody>
       </p:sp>
@@ -17206,6 +17391,36 @@
           </a:p>
         </p:txBody>
       </p:sp>
+      <p:pic>
+        <p:nvPicPr>
+          <p:cNvPr id="2" name="Imagem 1">
+            <a:extLst>
+              <a:ext uri="{FF2B5EF4-FFF2-40B4-BE49-F238E27FC236}">
+                <a16:creationId xmlns:a16="http://schemas.microsoft.com/office/drawing/2014/main" id="{1068DC47-04CE-4841-A0FA-618B195876BD}"/>
+              </a:ext>
+            </a:extLst>
+          </p:cNvPr>
+          <p:cNvPicPr>
+            <a:picLocks noChangeAspect="1"/>
+          </p:cNvPicPr>
+          <p:nvPr/>
+        </p:nvPicPr>
+        <p:blipFill>
+          <a:blip r:embed="rId3"/>
+          <a:stretch>
+            <a:fillRect/>
+          </a:stretch>
+        </p:blipFill>
+        <p:spPr>
+          <a:xfrm>
+            <a:off x="363018" y="1463741"/>
+            <a:ext cx="6641805" cy="3014775"/>
+          </a:xfrm>
+          <a:prstGeom prst="rect">
+            <a:avLst/>
+          </a:prstGeom>
+        </p:spPr>
+      </p:pic>
     </p:spTree>
     <p:extLst>
       <p:ext uri="{BB962C8B-B14F-4D97-AF65-F5344CB8AC3E}">
@@ -18075,7 +18290,7 @@
           </a:bodyPr>
           <a:lstStyle/>
           <a:p>
-            <a:pPr marL="285750" indent="-285750" algn="just">
+            <a:pPr>
               <a:buClr>
                 <a:schemeClr val="accent3">
                   <a:lumMod val="60000"/>
@@ -18084,17 +18299,88 @@
               </a:buClr>
             </a:pPr>
             <a:r>
-              <a:rPr lang="pt-PT" sz="1600" dirty="0" err="1"/>
-              <a:t>Ks</a:t>
-            </a:r>
-            <a:r>
-              <a:rPr lang="pt-PT" sz="1600" dirty="0"/>
+              <a:rPr lang="pt-PT" sz="1400" dirty="0"/>
+              <a:t>Nesta tarefa adicional é requerido uma análise detalhada por cada </a:t>
+            </a:r>
+            <a:r>
+              <a:rPr lang="pt-PT" sz="1400" i="1" dirty="0"/>
+              <a:t>smell</a:t>
+            </a:r>
+            <a:r>
+              <a:rPr lang="pt-PT" sz="1400" dirty="0"/>
+              <a:t> encontrado. Dito por outras palavras, é necessário fazer um estudo sobre como cada </a:t>
+            </a:r>
+            <a:r>
+              <a:rPr lang="pt-PT" sz="1400" i="1" dirty="0"/>
+              <a:t>smell</a:t>
+            </a:r>
+            <a:r>
+              <a:rPr lang="pt-PT" sz="1400" dirty="0"/>
+              <a:t> individualmente influência (melhora ou piora) o desempenho do </a:t>
+            </a:r>
+            <a:r>
+              <a:rPr lang="pt-PT" sz="1400" i="1" dirty="0"/>
+              <a:t>software</a:t>
+            </a:r>
+            <a:r>
+              <a:rPr lang="pt-PT" sz="1400" dirty="0"/>
+              <a:t>.</a:t>
+            </a:r>
+          </a:p>
+          <a:p>
+            <a:pPr marL="101600" indent="0">
+              <a:buClr>
+                <a:schemeClr val="accent3">
+                  <a:lumMod val="60000"/>
+                  <a:lumOff val="40000"/>
+                </a:schemeClr>
+              </a:buClr>
+              <a:buNone/>
+            </a:pPr>
+            <a:r>
+              <a:rPr lang="pt-PT" sz="1400" dirty="0"/>
               <a:t> </a:t>
             </a:r>
-            <a:r>
-              <a:rPr lang="pt-PT" sz="1600" dirty="0" err="1"/>
-              <a:t>ack</a:t>
-            </a:r>
+          </a:p>
+          <a:p>
+            <a:pPr>
+              <a:buClr>
+                <a:schemeClr val="accent3">
+                  <a:lumMod val="60000"/>
+                  <a:lumOff val="40000"/>
+                </a:schemeClr>
+              </a:buClr>
+            </a:pPr>
+            <a:r>
+              <a:rPr lang="pt-PT" sz="1400" dirty="0"/>
+              <a:t>Como tal, foram executadas ambas as versões do programa em questão com cada tipo de </a:t>
+            </a:r>
+            <a:r>
+              <a:rPr lang="pt-PT" sz="1400" i="1" dirty="0"/>
+              <a:t>smells</a:t>
+            </a:r>
+            <a:r>
+              <a:rPr lang="pt-PT" sz="1400" dirty="0"/>
+              <a:t> de forma isolada. Consequentemente, sobre um conjunto de funções do programa, obtiveram-se os resultados que se apresentam no </a:t>
+            </a:r>
+            <a:r>
+              <a:rPr lang="pt-PT" sz="1400" i="1" dirty="0"/>
+              <a:t>slide </a:t>
+            </a:r>
+            <a:r>
+              <a:rPr lang="pt-PT" sz="1400" dirty="0"/>
+              <a:t>seguinte.</a:t>
+            </a:r>
+          </a:p>
+          <a:p>
+            <a:pPr marL="285750" indent="-285750" algn="just">
+              <a:buClr>
+                <a:schemeClr val="accent3">
+                  <a:lumMod val="60000"/>
+                  <a:lumOff val="40000"/>
+                </a:schemeClr>
+              </a:buClr>
+            </a:pPr>
             <a:endParaRPr lang="pt-PT" sz="1600" dirty="0"/>
           </a:p>
           <a:p>
@@ -18224,6 +18510,227 @@
     <p:bg>
       <p:bgPr>
         <a:solidFill>
+          <a:schemeClr val="accent3">
+            <a:lumMod val="60000"/>
+            <a:lumOff val="40000"/>
+          </a:schemeClr>
+        </a:solidFill>
+        <a:effectLst/>
+      </p:bgPr>
+    </p:bg>
+    <p:spTree>
+      <p:nvGrpSpPr>
+        <p:cNvPr id="1" name="Shape 149"/>
+        <p:cNvGrpSpPr/>
+        <p:nvPr/>
+      </p:nvGrpSpPr>
+      <p:grpSpPr>
+        <a:xfrm>
+          <a:off x="0" y="0"/>
+          <a:ext cx="0" cy="0"/>
+          <a:chOff x="0" y="0"/>
+          <a:chExt cx="0" cy="0"/>
+        </a:xfrm>
+      </p:grpSpPr>
+      <p:sp>
+        <p:nvSpPr>
+          <p:cNvPr id="150" name="Google Shape;150;g5c66568b58_0_22"/>
+          <p:cNvSpPr txBox="1">
+            <a:spLocks noGrp="1"/>
+          </p:cNvSpPr>
+          <p:nvPr>
+            <p:ph type="title"/>
+          </p:nvPr>
+        </p:nvSpPr>
+        <p:spPr>
+          <a:xfrm>
+            <a:off x="467725" y="648975"/>
+            <a:ext cx="4963800" cy="409500"/>
+          </a:xfrm>
+          <a:prstGeom prst="rect">
+            <a:avLst/>
+          </a:prstGeom>
+          <a:noFill/>
+          <a:ln>
+            <a:noFill/>
+          </a:ln>
+        </p:spPr>
+        <p:txBody>
+          <a:bodyPr spcFirstLastPara="1" wrap="square" lIns="91425" tIns="91425" rIns="91425" bIns="91425" anchor="b" anchorCtr="0">
+            <a:noAutofit/>
+          </a:bodyPr>
+          <a:lstStyle/>
+          <a:p>
+            <a:pPr marL="0" lvl="0" indent="0" algn="l" rtl="0">
+              <a:lnSpc>
+                <a:spcPct val="100000"/>
+              </a:lnSpc>
+              <a:spcBef>
+                <a:spcPts val="0"/>
+              </a:spcBef>
+              <a:spcAft>
+                <a:spcPts val="0"/>
+              </a:spcAft>
+              <a:buSzPts val="2400"/>
+              <a:buNone/>
+            </a:pPr>
+            <a:r>
+              <a:rPr lang="en" dirty="0">
+                <a:solidFill>
+                  <a:schemeClr val="accent3">
+                    <a:lumMod val="60000"/>
+                    <a:lumOff val="40000"/>
+                  </a:schemeClr>
+                </a:solidFill>
+              </a:rPr>
+              <a:t>Tarefa extra</a:t>
+            </a:r>
+            <a:endParaRPr dirty="0">
+              <a:solidFill>
+                <a:schemeClr val="accent3">
+                  <a:lumMod val="60000"/>
+                  <a:lumOff val="40000"/>
+                </a:schemeClr>
+              </a:solidFill>
+            </a:endParaRPr>
+          </a:p>
+        </p:txBody>
+      </p:sp>
+      <p:sp>
+        <p:nvSpPr>
+          <p:cNvPr id="152" name="Google Shape;152;g5c66568b58_0_22"/>
+          <p:cNvSpPr txBox="1">
+            <a:spLocks noGrp="1"/>
+          </p:cNvSpPr>
+          <p:nvPr>
+            <p:ph type="sldNum" idx="12"/>
+          </p:nvPr>
+        </p:nvSpPr>
+        <p:spPr>
+          <a:xfrm>
+            <a:off x="8543227" y="4749851"/>
+            <a:ext cx="548700" cy="393600"/>
+          </a:xfrm>
+          <a:prstGeom prst="rect">
+            <a:avLst/>
+          </a:prstGeom>
+          <a:noFill/>
+          <a:ln>
+            <a:noFill/>
+          </a:ln>
+        </p:spPr>
+        <p:txBody>
+          <a:bodyPr spcFirstLastPara="1" wrap="square" lIns="91425" tIns="91425" rIns="91425" bIns="91425" anchor="t" anchorCtr="0">
+            <a:noAutofit/>
+          </a:bodyPr>
+          <a:lstStyle/>
+          <a:p>
+            <a:pPr marL="0" lvl="0" indent="0" algn="r" rtl="0">
+              <a:lnSpc>
+                <a:spcPct val="100000"/>
+              </a:lnSpc>
+              <a:spcBef>
+                <a:spcPts val="0"/>
+              </a:spcBef>
+              <a:spcAft>
+                <a:spcPts val="0"/>
+              </a:spcAft>
+              <a:buSzPts val="1300"/>
+              <a:buNone/>
+            </a:pPr>
+            <a:fld id="{00000000-1234-1234-1234-123412341234}" type="slidenum">
+              <a:rPr lang="en"/>
+              <a:t>31</a:t>
+            </a:fld>
+            <a:endParaRPr dirty="0"/>
+          </a:p>
+        </p:txBody>
+      </p:sp>
+      <p:pic>
+        <p:nvPicPr>
+          <p:cNvPr id="7" name="Gráfico 6">
+            <a:extLst>
+              <a:ext uri="{FF2B5EF4-FFF2-40B4-BE49-F238E27FC236}">
+                <a16:creationId xmlns:a16="http://schemas.microsoft.com/office/drawing/2014/main" id="{A37D6D61-E8AA-6445-BBF1-121EEE73A8CD}"/>
+              </a:ext>
+            </a:extLst>
+          </p:cNvPr>
+          <p:cNvPicPr>
+            <a:picLocks noChangeAspect="1"/>
+          </p:cNvPicPr>
+          <p:nvPr/>
+        </p:nvPicPr>
+        <p:blipFill>
+          <a:blip r:embed="rId3">
+            <a:extLst>
+              <a:ext uri="{96DAC541-7B7A-43D3-8B79-37D633B846F1}">
+                <asvg:svgBlip xmlns:asvg="http://schemas.microsoft.com/office/drawing/2016/SVG/main" r:embed="rId4"/>
+              </a:ext>
+            </a:extLst>
+          </a:blip>
+          <a:stretch>
+            <a:fillRect/>
+          </a:stretch>
+        </p:blipFill>
+        <p:spPr>
+          <a:xfrm>
+            <a:off x="7613248" y="274319"/>
+            <a:ext cx="1168685" cy="1168685"/>
+          </a:xfrm>
+          <a:prstGeom prst="rect">
+            <a:avLst/>
+          </a:prstGeom>
+        </p:spPr>
+      </p:pic>
+      <p:pic>
+        <p:nvPicPr>
+          <p:cNvPr id="4" name="Imagem 3">
+            <a:extLst>
+              <a:ext uri="{FF2B5EF4-FFF2-40B4-BE49-F238E27FC236}">
+                <a16:creationId xmlns:a16="http://schemas.microsoft.com/office/drawing/2014/main" id="{327A6F6C-7386-EA4D-B9E5-25C997132081}"/>
+              </a:ext>
+            </a:extLst>
+          </p:cNvPr>
+          <p:cNvPicPr>
+            <a:picLocks noChangeAspect="1"/>
+          </p:cNvPicPr>
+          <p:nvPr/>
+        </p:nvPicPr>
+        <p:blipFill>
+          <a:blip r:embed="rId5"/>
+          <a:stretch>
+            <a:fillRect/>
+          </a:stretch>
+        </p:blipFill>
+        <p:spPr>
+          <a:xfrm>
+            <a:off x="467725" y="1552701"/>
+            <a:ext cx="6571839" cy="2570535"/>
+          </a:xfrm>
+          <a:prstGeom prst="rect">
+            <a:avLst/>
+          </a:prstGeom>
+        </p:spPr>
+      </p:pic>
+    </p:spTree>
+    <p:extLst>
+      <p:ext uri="{BB962C8B-B14F-4D97-AF65-F5344CB8AC3E}">
+        <p14:creationId xmlns:p14="http://schemas.microsoft.com/office/powerpoint/2010/main" val="3987509480"/>
+      </p:ext>
+    </p:extLst>
+  </p:cSld>
+  <p:clrMapOvr>
+    <a:masterClrMapping/>
+  </p:clrMapOvr>
+</p:sld>
+</file>
+
+<file path=ppt/slides/slide32.xml><?xml version="1.0" encoding="utf-8"?>
+<p:sld xmlns:a="http://schemas.openxmlformats.org/drawingml/2006/main" xmlns:r="http://schemas.openxmlformats.org/officeDocument/2006/relationships" xmlns:p="http://schemas.openxmlformats.org/presentationml/2006/main">
+  <p:cSld>
+    <p:bg>
+      <p:bgPr>
+        <a:solidFill>
           <a:srgbClr val="0070C0"/>
         </a:solidFill>
         <a:effectLst/>
@@ -18287,7 +18794,7 @@
             </a:pPr>
             <a:fld id="{00000000-1234-1234-1234-123412341234}" type="slidenum">
               <a:rPr lang="en"/>
-              <a:t>31</a:t>
+              <a:t>32</a:t>
             </a:fld>
             <a:endParaRPr dirty="0"/>
           </a:p>
@@ -18627,7 +19134,7 @@
 </p:sld>
 </file>
 
-<file path=ppt/slides/slide32.xml><?xml version="1.0" encoding="utf-8"?>
+<file path=ppt/slides/slide33.xml><?xml version="1.0" encoding="utf-8"?>
 <p:sld xmlns:a="http://schemas.openxmlformats.org/drawingml/2006/main" xmlns:r="http://schemas.openxmlformats.org/officeDocument/2006/relationships" xmlns:p="http://schemas.openxmlformats.org/presentationml/2006/main">
   <p:cSld>
     <p:bg>
@@ -18754,7 +19261,7 @@
             </a:pPr>
             <a:fld id="{00000000-1234-1234-1234-123412341234}" type="slidenum">
               <a:rPr lang="en"/>
-              <a:t>32</a:t>
+              <a:t>33</a:t>
             </a:fld>
             <a:endParaRPr dirty="0"/>
           </a:p>

</xml_diff>

<commit_message>
#106 Commit: PPT - Relatório
</commit_message>
<xml_diff>
--- a/Apresentação.pptx
+++ b/Apresentação.pptx
@@ -5,7 +5,7 @@
     <p:sldMasterId id="2147483648" r:id="rId1"/>
   </p:sldMasterIdLst>
   <p:notesMasterIdLst>
-    <p:notesMasterId r:id="rId35"/>
+    <p:notesMasterId r:id="rId36"/>
   </p:notesMasterIdLst>
   <p:sldIdLst>
     <p:sldId id="256" r:id="rId2"/>
@@ -34,13 +34,14 @@
     <p:sldId id="295" r:id="rId25"/>
     <p:sldId id="285" r:id="rId26"/>
     <p:sldId id="288" r:id="rId27"/>
-    <p:sldId id="296" r:id="rId28"/>
+    <p:sldId id="312" r:id="rId28"/>
     <p:sldId id="297" r:id="rId29"/>
     <p:sldId id="299" r:id="rId30"/>
     <p:sldId id="306" r:id="rId31"/>
     <p:sldId id="310" r:id="rId32"/>
-    <p:sldId id="281" r:id="rId33"/>
-    <p:sldId id="282" r:id="rId34"/>
+    <p:sldId id="311" r:id="rId33"/>
+    <p:sldId id="281" r:id="rId34"/>
+    <p:sldId id="282" r:id="rId35"/>
   </p:sldIdLst>
   <p:sldSz cx="9144000" cy="5143500" type="screen16x9"/>
   <p:notesSz cx="6858000" cy="9144000"/>
@@ -278,7 +279,7 @@
       <p15:sldGuideLst xmlns:p15="http://schemas.microsoft.com/office/powerpoint/2012/main"/>
     </p:ext>
     <p:ext uri="http://customooxmlschemas.google.com/">
-      <go:slidesCustomData xmlns="" xmlns:mc="http://schemas.openxmlformats.org/markup-compatibility/2006" xmlns:mv="urn:schemas-microsoft-com:mac:vml" xmlns:c="http://schemas.openxmlformats.org/drawingml/2006/chart" xmlns:dgm="http://schemas.openxmlformats.org/drawingml/2006/diagram" xmlns:o="urn:schemas-microsoft-com:office:office" xmlns:v="urn:schemas-microsoft-com:vml" xmlns:pvml="urn:schemas-microsoft-com:office:powerpoint" xmlns:com="http://schemas.openxmlformats.org/drawingml/2006/compatibility" xmlns:p14="http://schemas.microsoft.com/office/powerpoint/2010/main" xmlns:p15="http://schemas.microsoft.com/office/powerpoint/2012/main" xmlns:go="http://customooxmlschemas.google.com/" r:id="rId36" roundtripDataSignature="AMtx7mi2giJIhmxq+e/rTQEB/kbV3AzsFA=="/>
+      <go:slidesCustomData xmlns:go="http://customooxmlschemas.google.com/" xmlns:p15="http://schemas.microsoft.com/office/powerpoint/2012/main" xmlns:p14="http://schemas.microsoft.com/office/powerpoint/2010/main" xmlns:com="http://schemas.openxmlformats.org/drawingml/2006/compatibility" xmlns:pvml="urn:schemas-microsoft-com:office:powerpoint" xmlns:v="urn:schemas-microsoft-com:vml" xmlns:o="urn:schemas-microsoft-com:office:office" xmlns:dgm="http://schemas.openxmlformats.org/drawingml/2006/diagram" xmlns:c="http://schemas.openxmlformats.org/drawingml/2006/chart" xmlns:mv="urn:schemas-microsoft-com:mac:vml" xmlns:mc="http://schemas.openxmlformats.org/markup-compatibility/2006" xmlns="" r:id="rId37" roundtripDataSignature="AMtx7mi2giJIhmxq+e/rTQEB/kbV3AzsFA=="/>
     </p:ext>
   </p:extLst>
 </p:presentation>
@@ -3002,7 +3003,7 @@
     </p:spTree>
     <p:extLst>
       <p:ext uri="{BB962C8B-B14F-4D97-AF65-F5344CB8AC3E}">
-        <p14:creationId xmlns:p14="http://schemas.microsoft.com/office/powerpoint/2010/main" val="11968502"/>
+        <p14:creationId xmlns:p14="http://schemas.microsoft.com/office/powerpoint/2010/main" val="387779307"/>
       </p:ext>
     </p:extLst>
   </p:cSld>
@@ -3398,6 +3399,133 @@
   <p:cSld>
     <p:spTree>
       <p:nvGrpSpPr>
+        <p:cNvPr id="1" name="Shape 146"/>
+        <p:cNvGrpSpPr/>
+        <p:nvPr/>
+      </p:nvGrpSpPr>
+      <p:grpSpPr>
+        <a:xfrm>
+          <a:off x="0" y="0"/>
+          <a:ext cx="0" cy="0"/>
+          <a:chOff x="0" y="0"/>
+          <a:chExt cx="0" cy="0"/>
+        </a:xfrm>
+      </p:grpSpPr>
+      <p:sp>
+        <p:nvSpPr>
+          <p:cNvPr id="147" name="Google Shape;147;g5c66568b58_0_22:notes"/>
+          <p:cNvSpPr txBox="1">
+            <a:spLocks noGrp="1"/>
+          </p:cNvSpPr>
+          <p:nvPr>
+            <p:ph type="body" idx="1"/>
+          </p:nvPr>
+        </p:nvSpPr>
+        <p:spPr>
+          <a:xfrm>
+            <a:off x="685800" y="4343400"/>
+            <a:ext cx="5486400" cy="4114800"/>
+          </a:xfrm>
+          <a:prstGeom prst="rect">
+            <a:avLst/>
+          </a:prstGeom>
+          <a:noFill/>
+          <a:ln>
+            <a:noFill/>
+          </a:ln>
+        </p:spPr>
+        <p:txBody>
+          <a:bodyPr spcFirstLastPara="1" wrap="square" lIns="91425" tIns="91425" rIns="91425" bIns="91425" anchor="t" anchorCtr="0">
+            <a:noAutofit/>
+          </a:bodyPr>
+          <a:lstStyle/>
+          <a:p>
+            <a:pPr marL="0" lvl="0" indent="0" algn="l" rtl="0">
+              <a:lnSpc>
+                <a:spcPct val="100000"/>
+              </a:lnSpc>
+              <a:spcBef>
+                <a:spcPts val="0"/>
+              </a:spcBef>
+              <a:spcAft>
+                <a:spcPts val="0"/>
+              </a:spcAft>
+              <a:buSzPts val="1400"/>
+              <a:buNone/>
+            </a:pPr>
+            <a:endParaRPr dirty="0"/>
+          </a:p>
+        </p:txBody>
+      </p:sp>
+      <p:sp>
+        <p:nvSpPr>
+          <p:cNvPr id="148" name="Google Shape;148;g5c66568b58_0_22:notes"/>
+          <p:cNvSpPr>
+            <a:spLocks noGrp="1" noRot="1" noChangeAspect="1"/>
+          </p:cNvSpPr>
+          <p:nvPr>
+            <p:ph type="sldImg" idx="2"/>
+          </p:nvPr>
+        </p:nvSpPr>
+        <p:spPr>
+          <a:xfrm>
+            <a:off x="381000" y="685800"/>
+            <a:ext cx="6096000" cy="3429000"/>
+          </a:xfrm>
+          <a:custGeom>
+            <a:avLst/>
+            <a:gdLst/>
+            <a:ahLst/>
+            <a:cxnLst/>
+            <a:rect l="l" t="t" r="r" b="b"/>
+            <a:pathLst>
+              <a:path w="120000" h="120000" extrusionOk="0">
+                <a:moveTo>
+                  <a:pt x="0" y="0"/>
+                </a:moveTo>
+                <a:lnTo>
+                  <a:pt x="120000" y="0"/>
+                </a:lnTo>
+                <a:lnTo>
+                  <a:pt x="120000" y="120000"/>
+                </a:lnTo>
+                <a:lnTo>
+                  <a:pt x="0" y="120000"/>
+                </a:lnTo>
+                <a:close/>
+              </a:path>
+            </a:pathLst>
+          </a:custGeom>
+          <a:noFill/>
+          <a:ln w="9525" cap="flat" cmpd="sng">
+            <a:solidFill>
+              <a:srgbClr val="000000"/>
+            </a:solidFill>
+            <a:prstDash val="solid"/>
+            <a:round/>
+            <a:headEnd type="none" w="sm" len="sm"/>
+            <a:tailEnd type="none" w="sm" len="sm"/>
+          </a:ln>
+        </p:spPr>
+      </p:sp>
+    </p:spTree>
+    <p:extLst>
+      <p:ext uri="{BB962C8B-B14F-4D97-AF65-F5344CB8AC3E}">
+        <p14:creationId xmlns:p14="http://schemas.microsoft.com/office/powerpoint/2010/main" val="4066205338"/>
+      </p:ext>
+    </p:extLst>
+  </p:cSld>
+  <p:clrMapOvr>
+    <a:masterClrMapping/>
+  </p:clrMapOvr>
+</p:notes>
+</file>
+
+<file path=ppt/notesSlides/notesSlide29.xml><?xml version="1.0" encoding="utf-8"?>
+<p:notes xmlns:a="http://schemas.openxmlformats.org/drawingml/2006/main" xmlns:r="http://schemas.openxmlformats.org/officeDocument/2006/relationships" xmlns:p="http://schemas.openxmlformats.org/presentationml/2006/main" showMasterSp="0" showMasterPhAnim="0">
+  <p:cSld>
+    <p:spTree>
+      <p:nvGrpSpPr>
         <p:cNvPr id="1" name="Shape 279"/>
         <p:cNvGrpSpPr/>
         <p:nvPr/>
@@ -3515,12 +3643,12 @@
 </p:notes>
 </file>
 
-<file path=ppt/notesSlides/notesSlide29.xml><?xml version="1.0" encoding="utf-8"?>
+<file path=ppt/notesSlides/notesSlide3.xml><?xml version="1.0" encoding="utf-8"?>
 <p:notes xmlns:a="http://schemas.openxmlformats.org/drawingml/2006/main" xmlns:r="http://schemas.openxmlformats.org/officeDocument/2006/relationships" xmlns:p="http://schemas.openxmlformats.org/presentationml/2006/main" showMasterSp="0" showMasterPhAnim="0">
   <p:cSld>
     <p:spTree>
       <p:nvGrpSpPr>
-        <p:cNvPr id="1" name="Shape 285"/>
+        <p:cNvPr id="1" name="Shape 86"/>
         <p:cNvGrpSpPr/>
         <p:nvPr/>
       </p:nvGrpSpPr>
@@ -3534,7 +3662,7 @@
       </p:grpSpPr>
       <p:sp>
         <p:nvSpPr>
-          <p:cNvPr id="286" name="Google Shape;286;g5c71c07026_7_2:notes"/>
+          <p:cNvPr id="87" name="Google Shape;87;p3:notes"/>
           <p:cNvSpPr txBox="1">
             <a:spLocks noGrp="1"/>
           </p:cNvSpPr>
@@ -3580,7 +3708,7 @@
       </p:sp>
       <p:sp>
         <p:nvSpPr>
-          <p:cNvPr id="287" name="Google Shape;287;g5c71c07026_7_2:notes"/>
+          <p:cNvPr id="88" name="Google Shape;88;p3:notes"/>
           <p:cNvSpPr>
             <a:spLocks noGrp="1" noRot="1" noChangeAspect="1"/>
           </p:cNvSpPr>
@@ -3637,12 +3765,12 @@
 </p:notes>
 </file>
 
-<file path=ppt/notesSlides/notesSlide3.xml><?xml version="1.0" encoding="utf-8"?>
+<file path=ppt/notesSlides/notesSlide30.xml><?xml version="1.0" encoding="utf-8"?>
 <p:notes xmlns:a="http://schemas.openxmlformats.org/drawingml/2006/main" xmlns:r="http://schemas.openxmlformats.org/officeDocument/2006/relationships" xmlns:p="http://schemas.openxmlformats.org/presentationml/2006/main" showMasterSp="0" showMasterPhAnim="0">
   <p:cSld>
     <p:spTree>
       <p:nvGrpSpPr>
-        <p:cNvPr id="1" name="Shape 86"/>
+        <p:cNvPr id="1" name="Shape 285"/>
         <p:cNvGrpSpPr/>
         <p:nvPr/>
       </p:nvGrpSpPr>
@@ -3656,7 +3784,7 @@
       </p:grpSpPr>
       <p:sp>
         <p:nvSpPr>
-          <p:cNvPr id="87" name="Google Shape;87;p3:notes"/>
+          <p:cNvPr id="286" name="Google Shape;286;g5c71c07026_7_2:notes"/>
           <p:cNvSpPr txBox="1">
             <a:spLocks noGrp="1"/>
           </p:cNvSpPr>
@@ -3702,7 +3830,7 @@
       </p:sp>
       <p:sp>
         <p:nvSpPr>
-          <p:cNvPr id="88" name="Google Shape;88;p3:notes"/>
+          <p:cNvPr id="287" name="Google Shape;287;g5c71c07026_7_2:notes"/>
           <p:cNvSpPr>
             <a:spLocks noGrp="1" noRot="1" noChangeAspect="1"/>
           </p:cNvSpPr>
@@ -18634,10 +18762,10 @@
       </p:sp>
       <p:pic>
         <p:nvPicPr>
-          <p:cNvPr id="2" name="Imagem 1">
+          <p:cNvPr id="3" name="Imagem 2">
             <a:extLst>
               <a:ext uri="{FF2B5EF4-FFF2-40B4-BE49-F238E27FC236}">
-                <a16:creationId xmlns:a16="http://schemas.microsoft.com/office/drawing/2014/main" id="{1068DC47-04CE-4841-A0FA-618B195876BD}"/>
+                <a16:creationId xmlns:a16="http://schemas.microsoft.com/office/drawing/2014/main" id="{D919BBD5-D55A-F648-BB47-03B273DC1C56}"/>
               </a:ext>
             </a:extLst>
           </p:cNvPr>
@@ -18654,8 +18782,8 @@
         </p:blipFill>
         <p:spPr>
           <a:xfrm>
-            <a:off x="363018" y="1463741"/>
-            <a:ext cx="6641805" cy="3014775"/>
+            <a:off x="685205" y="1190650"/>
+            <a:ext cx="6058513" cy="3459665"/>
           </a:xfrm>
           <a:prstGeom prst="rect">
             <a:avLst/>
@@ -18665,7 +18793,7 @@
     </p:spTree>
     <p:extLst>
       <p:ext uri="{BB962C8B-B14F-4D97-AF65-F5344CB8AC3E}">
-        <p14:creationId xmlns:p14="http://schemas.microsoft.com/office/powerpoint/2010/main" val="2398864426"/>
+        <p14:creationId xmlns:p14="http://schemas.microsoft.com/office/powerpoint/2010/main" val="2384480340"/>
       </p:ext>
     </p:extLst>
   </p:cSld>
@@ -19972,6 +20100,227 @@
     <p:bg>
       <p:bgPr>
         <a:solidFill>
+          <a:schemeClr val="accent3">
+            <a:lumMod val="60000"/>
+            <a:lumOff val="40000"/>
+          </a:schemeClr>
+        </a:solidFill>
+        <a:effectLst/>
+      </p:bgPr>
+    </p:bg>
+    <p:spTree>
+      <p:nvGrpSpPr>
+        <p:cNvPr id="1" name="Shape 149"/>
+        <p:cNvGrpSpPr/>
+        <p:nvPr/>
+      </p:nvGrpSpPr>
+      <p:grpSpPr>
+        <a:xfrm>
+          <a:off x="0" y="0"/>
+          <a:ext cx="0" cy="0"/>
+          <a:chOff x="0" y="0"/>
+          <a:chExt cx="0" cy="0"/>
+        </a:xfrm>
+      </p:grpSpPr>
+      <p:sp>
+        <p:nvSpPr>
+          <p:cNvPr id="150" name="Google Shape;150;g5c66568b58_0_22"/>
+          <p:cNvSpPr txBox="1">
+            <a:spLocks noGrp="1"/>
+          </p:cNvSpPr>
+          <p:nvPr>
+            <p:ph type="title"/>
+          </p:nvPr>
+        </p:nvSpPr>
+        <p:spPr>
+          <a:xfrm>
+            <a:off x="467725" y="648975"/>
+            <a:ext cx="4963800" cy="409500"/>
+          </a:xfrm>
+          <a:prstGeom prst="rect">
+            <a:avLst/>
+          </a:prstGeom>
+          <a:noFill/>
+          <a:ln>
+            <a:noFill/>
+          </a:ln>
+        </p:spPr>
+        <p:txBody>
+          <a:bodyPr spcFirstLastPara="1" wrap="square" lIns="91425" tIns="91425" rIns="91425" bIns="91425" anchor="b" anchorCtr="0">
+            <a:noAutofit/>
+          </a:bodyPr>
+          <a:lstStyle/>
+          <a:p>
+            <a:pPr marL="0" lvl="0" indent="0" algn="l" rtl="0">
+              <a:lnSpc>
+                <a:spcPct val="100000"/>
+              </a:lnSpc>
+              <a:spcBef>
+                <a:spcPts val="0"/>
+              </a:spcBef>
+              <a:spcAft>
+                <a:spcPts val="0"/>
+              </a:spcAft>
+              <a:buSzPts val="2400"/>
+              <a:buNone/>
+            </a:pPr>
+            <a:r>
+              <a:rPr lang="en" dirty="0">
+                <a:solidFill>
+                  <a:schemeClr val="accent3">
+                    <a:lumMod val="60000"/>
+                    <a:lumOff val="40000"/>
+                  </a:schemeClr>
+                </a:solidFill>
+              </a:rPr>
+              <a:t>Tarefa extra</a:t>
+            </a:r>
+            <a:endParaRPr dirty="0">
+              <a:solidFill>
+                <a:schemeClr val="accent3">
+                  <a:lumMod val="60000"/>
+                  <a:lumOff val="40000"/>
+                </a:schemeClr>
+              </a:solidFill>
+            </a:endParaRPr>
+          </a:p>
+        </p:txBody>
+      </p:sp>
+      <p:sp>
+        <p:nvSpPr>
+          <p:cNvPr id="152" name="Google Shape;152;g5c66568b58_0_22"/>
+          <p:cNvSpPr txBox="1">
+            <a:spLocks noGrp="1"/>
+          </p:cNvSpPr>
+          <p:nvPr>
+            <p:ph type="sldNum" idx="12"/>
+          </p:nvPr>
+        </p:nvSpPr>
+        <p:spPr>
+          <a:xfrm>
+            <a:off x="8543227" y="4749851"/>
+            <a:ext cx="548700" cy="393600"/>
+          </a:xfrm>
+          <a:prstGeom prst="rect">
+            <a:avLst/>
+          </a:prstGeom>
+          <a:noFill/>
+          <a:ln>
+            <a:noFill/>
+          </a:ln>
+        </p:spPr>
+        <p:txBody>
+          <a:bodyPr spcFirstLastPara="1" wrap="square" lIns="91425" tIns="91425" rIns="91425" bIns="91425" anchor="t" anchorCtr="0">
+            <a:noAutofit/>
+          </a:bodyPr>
+          <a:lstStyle/>
+          <a:p>
+            <a:pPr marL="0" lvl="0" indent="0" algn="r" rtl="0">
+              <a:lnSpc>
+                <a:spcPct val="100000"/>
+              </a:lnSpc>
+              <a:spcBef>
+                <a:spcPts val="0"/>
+              </a:spcBef>
+              <a:spcAft>
+                <a:spcPts val="0"/>
+              </a:spcAft>
+              <a:buSzPts val="1300"/>
+              <a:buNone/>
+            </a:pPr>
+            <a:fld id="{00000000-1234-1234-1234-123412341234}" type="slidenum">
+              <a:rPr lang="en"/>
+              <a:t>32</a:t>
+            </a:fld>
+            <a:endParaRPr dirty="0"/>
+          </a:p>
+        </p:txBody>
+      </p:sp>
+      <p:pic>
+        <p:nvPicPr>
+          <p:cNvPr id="7" name="Gráfico 6">
+            <a:extLst>
+              <a:ext uri="{FF2B5EF4-FFF2-40B4-BE49-F238E27FC236}">
+                <a16:creationId xmlns:a16="http://schemas.microsoft.com/office/drawing/2014/main" id="{A37D6D61-E8AA-6445-BBF1-121EEE73A8CD}"/>
+              </a:ext>
+            </a:extLst>
+          </p:cNvPr>
+          <p:cNvPicPr>
+            <a:picLocks noChangeAspect="1"/>
+          </p:cNvPicPr>
+          <p:nvPr/>
+        </p:nvPicPr>
+        <p:blipFill>
+          <a:blip r:embed="rId3">
+            <a:extLst>
+              <a:ext uri="{96DAC541-7B7A-43D3-8B79-37D633B846F1}">
+                <asvg:svgBlip xmlns:asvg="http://schemas.microsoft.com/office/drawing/2016/SVG/main" r:embed="rId4"/>
+              </a:ext>
+            </a:extLst>
+          </a:blip>
+          <a:stretch>
+            <a:fillRect/>
+          </a:stretch>
+        </p:blipFill>
+        <p:spPr>
+          <a:xfrm>
+            <a:off x="7613248" y="274319"/>
+            <a:ext cx="1168685" cy="1168685"/>
+          </a:xfrm>
+          <a:prstGeom prst="rect">
+            <a:avLst/>
+          </a:prstGeom>
+        </p:spPr>
+      </p:pic>
+      <p:pic>
+        <p:nvPicPr>
+          <p:cNvPr id="2" name="Imagem 1">
+            <a:extLst>
+              <a:ext uri="{FF2B5EF4-FFF2-40B4-BE49-F238E27FC236}">
+                <a16:creationId xmlns:a16="http://schemas.microsoft.com/office/drawing/2014/main" id="{B93A53DC-B9F1-F54E-B605-16AEC71B9438}"/>
+              </a:ext>
+            </a:extLst>
+          </p:cNvPr>
+          <p:cNvPicPr>
+            <a:picLocks noChangeAspect="1"/>
+          </p:cNvPicPr>
+          <p:nvPr/>
+        </p:nvPicPr>
+        <p:blipFill>
+          <a:blip r:embed="rId5"/>
+          <a:stretch>
+            <a:fillRect/>
+          </a:stretch>
+        </p:blipFill>
+        <p:spPr>
+          <a:xfrm>
+            <a:off x="318568" y="1577251"/>
+            <a:ext cx="6722418" cy="2573217"/>
+          </a:xfrm>
+          <a:prstGeom prst="rect">
+            <a:avLst/>
+          </a:prstGeom>
+        </p:spPr>
+      </p:pic>
+    </p:spTree>
+    <p:extLst>
+      <p:ext uri="{BB962C8B-B14F-4D97-AF65-F5344CB8AC3E}">
+        <p14:creationId xmlns:p14="http://schemas.microsoft.com/office/powerpoint/2010/main" val="2681622444"/>
+      </p:ext>
+    </p:extLst>
+  </p:cSld>
+  <p:clrMapOvr>
+    <a:masterClrMapping/>
+  </p:clrMapOvr>
+</p:sld>
+</file>
+
+<file path=ppt/slides/slide33.xml><?xml version="1.0" encoding="utf-8"?>
+<p:sld xmlns:a="http://schemas.openxmlformats.org/drawingml/2006/main" xmlns:r="http://schemas.openxmlformats.org/officeDocument/2006/relationships" xmlns:p="http://schemas.openxmlformats.org/presentationml/2006/main">
+  <p:cSld>
+    <p:bg>
+      <p:bgPr>
+        <a:solidFill>
           <a:srgbClr val="0070C0"/>
         </a:solidFill>
         <a:effectLst/>
@@ -20035,7 +20384,7 @@
             </a:pPr>
             <a:fld id="{00000000-1234-1234-1234-123412341234}" type="slidenum">
               <a:rPr lang="en"/>
-              <a:t>32</a:t>
+              <a:t>33</a:t>
             </a:fld>
             <a:endParaRPr dirty="0"/>
           </a:p>
@@ -20375,7 +20724,7 @@
 </p:sld>
 </file>
 
-<file path=ppt/slides/slide33.xml><?xml version="1.0" encoding="utf-8"?>
+<file path=ppt/slides/slide34.xml><?xml version="1.0" encoding="utf-8"?>
 <p:sld xmlns:a="http://schemas.openxmlformats.org/drawingml/2006/main" xmlns:r="http://schemas.openxmlformats.org/officeDocument/2006/relationships" xmlns:p="http://schemas.openxmlformats.org/presentationml/2006/main">
   <p:cSld>
     <p:bg>
@@ -20502,7 +20851,7 @@
             </a:pPr>
             <a:fld id="{00000000-1234-1234-1234-123412341234}" type="slidenum">
               <a:rPr lang="en"/>
-              <a:t>33</a:t>
+              <a:t>34</a:t>
             </a:fld>
             <a:endParaRPr dirty="0"/>
           </a:p>

</xml_diff>

<commit_message>
#108 Commit: PPT (animações + correção do slide 22)
</commit_message>
<xml_diff>
--- a/Apresentação.pptx
+++ b/Apresentação.pptx
@@ -277,7 +277,7 @@
       <p15:sldGuideLst xmlns:p15="http://schemas.microsoft.com/office/powerpoint/2012/main"/>
     </p:ext>
     <p:ext uri="http://customooxmlschemas.google.com/">
-      <go:slidesCustomData xmlns="" xmlns:mc="http://schemas.openxmlformats.org/markup-compatibility/2006" xmlns:mv="urn:schemas-microsoft-com:mac:vml" xmlns:c="http://schemas.openxmlformats.org/drawingml/2006/chart" xmlns:dgm="http://schemas.openxmlformats.org/drawingml/2006/diagram" xmlns:o="urn:schemas-microsoft-com:office:office" xmlns:v="urn:schemas-microsoft-com:vml" xmlns:pvml="urn:schemas-microsoft-com:office:powerpoint" xmlns:com="http://schemas.openxmlformats.org/drawingml/2006/compatibility" xmlns:p14="http://schemas.microsoft.com/office/powerpoint/2010/main" xmlns:p15="http://schemas.microsoft.com/office/powerpoint/2012/main" xmlns:go="http://customooxmlschemas.google.com/" r:id="rId37" roundtripDataSignature="AMtx7mi2giJIhmxq+e/rTQEB/kbV3AzsFA=="/>
+      <go:slidesCustomData xmlns:go="http://customooxmlschemas.google.com/" xmlns:p15="http://schemas.microsoft.com/office/powerpoint/2012/main" xmlns:p14="http://schemas.microsoft.com/office/powerpoint/2010/main" xmlns:com="http://schemas.openxmlformats.org/drawingml/2006/compatibility" xmlns:pvml="urn:schemas-microsoft-com:office:powerpoint" xmlns:v="urn:schemas-microsoft-com:vml" xmlns:o="urn:schemas-microsoft-com:office:office" xmlns:dgm="http://schemas.openxmlformats.org/drawingml/2006/diagram" xmlns:c="http://schemas.openxmlformats.org/drawingml/2006/chart" xmlns:mv="urn:schemas-microsoft-com:mac:vml" xmlns:mc="http://schemas.openxmlformats.org/markup-compatibility/2006" xmlns="" r:id="rId37" roundtripDataSignature="AMtx7mi2giJIhmxq+e/rTQEB/kbV3AzsFA=="/>
     </p:ext>
   </p:extLst>
 </p:presentation>
@@ -12467,9 +12467,18 @@
   <p:clrMapOvr>
     <a:masterClrMapping/>
   </p:clrMapOvr>
-  <p:transition>
-    <p:fade thruBlk="1"/>
-  </p:transition>
+  <mc:AlternateContent xmlns:mc="http://schemas.openxmlformats.org/markup-compatibility/2006">
+    <mc:Choice xmlns:p14="http://schemas.microsoft.com/office/powerpoint/2010/main" Requires="p14">
+      <p:transition spd="med" p14:dur="700">
+        <p:fade/>
+      </p:transition>
+    </mc:Choice>
+    <mc:Fallback>
+      <p:transition spd="med">
+        <p:fade/>
+      </p:transition>
+    </mc:Fallback>
+  </mc:AlternateContent>
 </p:sld>
 </file>
 
@@ -12930,6 +12939,18 @@
   <p:clrMapOvr>
     <a:masterClrMapping/>
   </p:clrMapOvr>
+  <mc:AlternateContent xmlns:mc="http://schemas.openxmlformats.org/markup-compatibility/2006">
+    <mc:Choice xmlns:p14="http://schemas.microsoft.com/office/powerpoint/2010/main" Requires="p14">
+      <p:transition spd="slow" p14:dur="1600">
+        <p14:conveyor dir="l"/>
+      </p:transition>
+    </mc:Choice>
+    <mc:Fallback>
+      <p:transition spd="slow">
+        <p:fade/>
+      </p:transition>
+    </mc:Fallback>
+  </mc:AlternateContent>
 </p:sld>
 </file>
 
@@ -13068,6 +13089,18 @@
   <p:clrMapOvr>
     <a:masterClrMapping/>
   </p:clrMapOvr>
+  <mc:AlternateContent xmlns:mc="http://schemas.openxmlformats.org/markup-compatibility/2006">
+    <mc:Choice xmlns:p15="http://schemas.microsoft.com/office/powerpoint/2012/main" Requires="p15">
+      <p:transition xmlns:p14="http://schemas.microsoft.com/office/powerpoint/2010/main" spd="slow" p14:dur="2000">
+        <p15:prstTrans prst="wind"/>
+      </p:transition>
+    </mc:Choice>
+    <mc:Fallback>
+      <p:transition spd="slow">
+        <p:fade/>
+      </p:transition>
+    </mc:Fallback>
+  </mc:AlternateContent>
 </p:sld>
 </file>
 
@@ -13405,6 +13438,18 @@
   <p:clrMapOvr>
     <a:masterClrMapping/>
   </p:clrMapOvr>
+  <mc:AlternateContent xmlns:mc="http://schemas.openxmlformats.org/markup-compatibility/2006">
+    <mc:Choice xmlns:p15="http://schemas.microsoft.com/office/powerpoint/2012/main" Requires="p15">
+      <p:transition xmlns:p14="http://schemas.microsoft.com/office/powerpoint/2010/main" spd="slow" p14:dur="2000">
+        <p15:prstTrans prst="crush"/>
+      </p:transition>
+    </mc:Choice>
+    <mc:Fallback>
+      <p:transition spd="slow">
+        <p:fade/>
+      </p:transition>
+    </mc:Fallback>
+  </mc:AlternateContent>
 </p:sld>
 </file>
 
@@ -13532,6 +13577,18 @@
   <p:clrMapOvr>
     <a:masterClrMapping/>
   </p:clrMapOvr>
+  <mc:AlternateContent xmlns:mc="http://schemas.openxmlformats.org/markup-compatibility/2006">
+    <mc:Choice xmlns:p15="http://schemas.microsoft.com/office/powerpoint/2012/main" Requires="p15">
+      <p:transition xmlns:p14="http://schemas.microsoft.com/office/powerpoint/2010/main" spd="slow" p14:dur="1250">
+        <p15:prstTrans prst="peelOff"/>
+      </p:transition>
+    </mc:Choice>
+    <mc:Fallback>
+      <p:transition spd="slow">
+        <p:fade/>
+      </p:transition>
+    </mc:Fallback>
+  </mc:AlternateContent>
 </p:sld>
 </file>
 
@@ -13914,6 +13971,18 @@
   <p:clrMapOvr>
     <a:masterClrMapping/>
   </p:clrMapOvr>
+  <mc:AlternateContent xmlns:mc="http://schemas.openxmlformats.org/markup-compatibility/2006">
+    <mc:Choice xmlns:p14="http://schemas.microsoft.com/office/powerpoint/2010/main" Requires="p14">
+      <p:transition spd="slow" p14:dur="1300">
+        <p14:pan dir="u"/>
+      </p:transition>
+    </mc:Choice>
+    <mc:Fallback>
+      <p:transition spd="slow">
+        <p:fade/>
+      </p:transition>
+    </mc:Fallback>
+  </mc:AlternateContent>
 </p:sld>
 </file>
 
@@ -14609,6 +14678,9 @@
   <p:clrMapOvr>
     <a:masterClrMapping/>
   </p:clrMapOvr>
+  <p:transition spd="slow">
+    <p:push dir="u"/>
+  </p:transition>
 </p:sld>
 </file>
 
@@ -15603,6 +15675,18 @@
   <p:clrMapOvr>
     <a:masterClrMapping/>
   </p:clrMapOvr>
+  <mc:AlternateContent xmlns:mc="http://schemas.openxmlformats.org/markup-compatibility/2006">
+    <mc:Choice xmlns:p14="http://schemas.microsoft.com/office/powerpoint/2010/main" Requires="p14">
+      <p:transition spd="slow" p14:dur="1250">
+        <p14:switch dir="r"/>
+      </p:transition>
+    </mc:Choice>
+    <mc:Fallback>
+      <p:transition spd="slow">
+        <p:fade/>
+      </p:transition>
+    </mc:Fallback>
+  </mc:AlternateContent>
 </p:sld>
 </file>
 
@@ -15741,6 +15825,18 @@
   <p:clrMapOvr>
     <a:masterClrMapping/>
   </p:clrMapOvr>
+  <mc:AlternateContent xmlns:mc="http://schemas.openxmlformats.org/markup-compatibility/2006">
+    <mc:Choice xmlns:p14="http://schemas.microsoft.com/office/powerpoint/2010/main" Requires="p14">
+      <p:transition spd="slow" p14:dur="1400">
+        <p14:ripple/>
+      </p:transition>
+    </mc:Choice>
+    <mc:Fallback>
+      <p:transition spd="slow">
+        <p:fade/>
+      </p:transition>
+    </mc:Fallback>
+  </mc:AlternateContent>
 </p:sld>
 </file>
 
@@ -16053,6 +16149,18 @@
   <p:clrMapOvr>
     <a:masterClrMapping/>
   </p:clrMapOvr>
+  <mc:AlternateContent xmlns:mc="http://schemas.openxmlformats.org/markup-compatibility/2006">
+    <mc:Choice xmlns:p15="http://schemas.microsoft.com/office/powerpoint/2012/main" Requires="p15">
+      <p:transition xmlns:p14="http://schemas.microsoft.com/office/powerpoint/2010/main" spd="slow" p14:dur="1250">
+        <p15:prstTrans prst="pageCurlDouble"/>
+      </p:transition>
+    </mc:Choice>
+    <mc:Fallback>
+      <p:transition spd="slow">
+        <p:fade/>
+      </p:transition>
+    </mc:Fallback>
+  </mc:AlternateContent>
 </p:sld>
 </file>
 
@@ -16424,6 +16532,18 @@
   <p:clrMapOvr>
     <a:masterClrMapping/>
   </p:clrMapOvr>
+  <mc:AlternateContent xmlns:mc="http://schemas.openxmlformats.org/markup-compatibility/2006">
+    <mc:Choice xmlns:p14="http://schemas.microsoft.com/office/powerpoint/2010/main" Requires="p14">
+      <p:transition spd="slow" p14:dur="1600">
+        <p14:prism isContent="1" isInverted="1"/>
+      </p:transition>
+    </mc:Choice>
+    <mc:Fallback>
+      <p:transition spd="slow">
+        <p:fade/>
+      </p:transition>
+    </mc:Fallback>
+  </mc:AlternateContent>
 </p:sld>
 </file>
 
@@ -16548,6 +16668,18 @@
   <p:clrMapOvr>
     <a:masterClrMapping/>
   </p:clrMapOvr>
+  <mc:AlternateContent xmlns:mc="http://schemas.openxmlformats.org/markup-compatibility/2006">
+    <mc:Choice xmlns:p15="http://schemas.microsoft.com/office/powerpoint/2012/main" Requires="p15">
+      <p:transition xmlns:p14="http://schemas.microsoft.com/office/powerpoint/2010/main" spd="slow" p14:dur="4000">
+        <p15:prstTrans prst="curtains"/>
+      </p:transition>
+    </mc:Choice>
+    <mc:Fallback>
+      <p:transition spd="slow">
+        <p:fade/>
+      </p:transition>
+    </mc:Fallback>
+  </mc:AlternateContent>
 </p:sld>
 </file>
 
@@ -16906,6 +17038,18 @@
   <p:clrMapOvr>
     <a:masterClrMapping/>
   </p:clrMapOvr>
+  <mc:AlternateContent xmlns:mc="http://schemas.openxmlformats.org/markup-compatibility/2006">
+    <mc:Choice xmlns:p14="http://schemas.microsoft.com/office/powerpoint/2010/main" Requires="p14">
+      <p:transition spd="slow" p14:dur="2000">
+        <p14:prism isContent="1"/>
+      </p:transition>
+    </mc:Choice>
+    <mc:Fallback>
+      <p:transition spd="slow">
+        <p:fade/>
+      </p:transition>
+    </mc:Fallback>
+  </mc:AlternateContent>
 </p:sld>
 </file>
 
@@ -17055,6 +17199,18 @@
   <p:clrMapOvr>
     <a:masterClrMapping/>
   </p:clrMapOvr>
+  <mc:AlternateContent xmlns:mc="http://schemas.openxmlformats.org/markup-compatibility/2006">
+    <mc:Choice xmlns:p14="http://schemas.microsoft.com/office/powerpoint/2010/main" Requires="p14">
+      <p:transition spd="slow" p14:dur="1500">
+        <p14:window dir="vert"/>
+      </p:transition>
+    </mc:Choice>
+    <mc:Fallback>
+      <p:transition spd="slow">
+        <p:fade/>
+      </p:transition>
+    </mc:Fallback>
+  </mc:AlternateContent>
 </p:sld>
 </file>
 
@@ -17333,12 +17489,29 @@
             </a:r>
           </a:p>
           <a:p>
-            <a:pPr marL="285750" lvl="0" indent="-285750"/>
             <a:endParaRPr lang="pt-PT" sz="1400" dirty="0"/>
           </a:p>
           <a:p>
-            <a:pPr marL="285750" lvl="0" indent="-285750" algn="just"/>
-            <a:endParaRPr lang="pt-PT" sz="1400" dirty="0"/>
+            <a:r>
+              <a:rPr lang="pt-PT" sz="1400" dirty="0"/>
+              <a:t>Quanto à cobertura, a análise efetuada pelo </a:t>
+            </a:r>
+            <a:r>
+              <a:rPr lang="pt-PT" sz="1400" i="1" dirty="0"/>
+              <a:t>IntelliJ</a:t>
+            </a:r>
+            <a:r>
+              <a:rPr lang="pt-PT" sz="1400" dirty="0"/>
+              <a:t> (com destaque apenas no </a:t>
+            </a:r>
+            <a:r>
+              <a:rPr lang="pt-PT" sz="1400" i="1" dirty="0"/>
+              <a:t>package </a:t>
+            </a:r>
+            <a:r>
+              <a:rPr lang="pt-PT" sz="1400" dirty="0"/>
+              <a:t>Model) mostra que obtivemos um total de cobertura de: 96% em classes, 46% em métodos e 36% em linhas de código.</a:t>
+            </a:r>
           </a:p>
           <a:p>
             <a:pPr marL="0" lvl="0" indent="0" algn="just" rtl="0">
@@ -17388,6 +17561,9 @@
   <p:clrMapOvr>
     <a:masterClrMapping/>
   </p:clrMapOvr>
+  <p:transition spd="slow">
+    <p:push dir="u"/>
+  </p:transition>
 </p:sld>
 </file>
 
@@ -17429,7 +17605,7 @@
         <p:spPr>
           <a:xfrm>
             <a:off x="467722" y="536895"/>
-            <a:ext cx="6016967" cy="521579"/>
+            <a:ext cx="6075750" cy="521579"/>
           </a:xfrm>
           <a:prstGeom prst="rect">
             <a:avLst/>
@@ -17665,6 +17841,18 @@
   <p:clrMapOvr>
     <a:masterClrMapping/>
   </p:clrMapOvr>
+  <mc:AlternateContent xmlns:mc="http://schemas.openxmlformats.org/markup-compatibility/2006">
+    <mc:Choice xmlns:p14="http://schemas.microsoft.com/office/powerpoint/2010/main" Requires="p14">
+      <p:transition spd="slow" p14:dur="1500">
+        <p:split orient="vert"/>
+      </p:transition>
+    </mc:Choice>
+    <mc:Fallback>
+      <p:transition spd="slow">
+        <p:split orient="vert"/>
+      </p:transition>
+    </mc:Fallback>
+  </mc:AlternateContent>
 </p:sld>
 </file>
 
@@ -17776,6 +17964,18 @@
   <p:clrMapOvr>
     <a:masterClrMapping/>
   </p:clrMapOvr>
+  <mc:AlternateContent xmlns:mc="http://schemas.openxmlformats.org/markup-compatibility/2006">
+    <mc:Choice xmlns:p159="http://schemas.microsoft.com/office/powerpoint/2015/09/main" Requires="p159">
+      <p:transition xmlns:p14="http://schemas.microsoft.com/office/powerpoint/2010/main" spd="slow" p14:dur="2000">
+        <p159:morph option="byObject"/>
+      </p:transition>
+    </mc:Choice>
+    <mc:Fallback>
+      <p:transition spd="slow">
+        <p:fade/>
+      </p:transition>
+    </mc:Fallback>
+  </mc:AlternateContent>
 </p:sld>
 </file>
 
@@ -18054,6 +18254,18 @@
   <p:clrMapOvr>
     <a:masterClrMapping/>
   </p:clrMapOvr>
+  <mc:AlternateContent xmlns:mc="http://schemas.openxmlformats.org/markup-compatibility/2006">
+    <mc:Choice xmlns:p14="http://schemas.microsoft.com/office/powerpoint/2010/main" Requires="p14">
+      <p:transition spd="slow" p14:dur="2500">
+        <p:checker/>
+      </p:transition>
+    </mc:Choice>
+    <mc:Fallback>
+      <p:transition spd="slow">
+        <p:checker/>
+      </p:transition>
+    </mc:Fallback>
+  </mc:AlternateContent>
 </p:sld>
 </file>
 
@@ -18320,6 +18532,9 @@
   <p:clrMapOvr>
     <a:masterClrMapping/>
   </p:clrMapOvr>
+  <p:transition spd="slow">
+    <p:comb/>
+  </p:transition>
 </p:sld>
 </file>
 
@@ -18467,6 +18682,18 @@
   <p:clrMapOvr>
     <a:masterClrMapping/>
   </p:clrMapOvr>
+  <mc:AlternateContent xmlns:mc="http://schemas.openxmlformats.org/markup-compatibility/2006">
+    <mc:Choice xmlns:p15="http://schemas.microsoft.com/office/powerpoint/2012/main" Requires="p15">
+      <p:transition xmlns:p14="http://schemas.microsoft.com/office/powerpoint/2010/main" spd="slow" p14:dur="2000">
+        <p15:prstTrans prst="wind"/>
+      </p:transition>
+    </mc:Choice>
+    <mc:Fallback>
+      <p:transition spd="slow">
+        <p:fade/>
+      </p:transition>
+    </mc:Fallback>
+  </mc:AlternateContent>
 </p:sld>
 </file>
 
@@ -18802,6 +19029,18 @@
   <p:clrMapOvr>
     <a:masterClrMapping/>
   </p:clrMapOvr>
+  <mc:AlternateContent xmlns:mc="http://schemas.openxmlformats.org/markup-compatibility/2006">
+    <mc:Choice xmlns:p15="http://schemas.microsoft.com/office/powerpoint/2012/main" Requires="p15">
+      <p:transition xmlns:p14="http://schemas.microsoft.com/office/powerpoint/2010/main" spd="slow" p14:dur="2000">
+        <p15:prstTrans prst="fracture"/>
+      </p:transition>
+    </mc:Choice>
+    <mc:Fallback>
+      <p:transition spd="slow">
+        <p:fade/>
+      </p:transition>
+    </mc:Fallback>
+  </mc:AlternateContent>
 </p:sld>
 </file>
 
@@ -19023,6 +19262,18 @@
   <p:clrMapOvr>
     <a:masterClrMapping/>
   </p:clrMapOvr>
+  <mc:AlternateContent xmlns:mc="http://schemas.openxmlformats.org/markup-compatibility/2006">
+    <mc:Choice xmlns:p14="http://schemas.microsoft.com/office/powerpoint/2010/main" Requires="p14">
+      <p:transition spd="slow" p14:dur="1600">
+        <p14:conveyor dir="l"/>
+      </p:transition>
+    </mc:Choice>
+    <mc:Fallback>
+      <p:transition spd="slow">
+        <p:fade/>
+      </p:transition>
+    </mc:Fallback>
+  </mc:AlternateContent>
 </p:sld>
 </file>
 
@@ -19375,6 +19626,18 @@
   <p:clrMapOvr>
     <a:masterClrMapping/>
   </p:clrMapOvr>
+  <mc:AlternateContent xmlns:mc="http://schemas.openxmlformats.org/markup-compatibility/2006">
+    <mc:Choice xmlns:p15="http://schemas.microsoft.com/office/powerpoint/2012/main" Requires="p15">
+      <p:transition xmlns:p14="http://schemas.microsoft.com/office/powerpoint/2010/main" spd="slow" p14:dur="2000">
+        <p15:prstTrans prst="fallOver"/>
+      </p:transition>
+    </mc:Choice>
+    <mc:Fallback>
+      <p:transition spd="slow">
+        <p:fade/>
+      </p:transition>
+    </mc:Fallback>
+  </mc:AlternateContent>
 </p:sld>
 </file>
 
@@ -19596,6 +19859,9 @@
   <p:clrMapOvr>
     <a:masterClrMapping/>
   </p:clrMapOvr>
+  <p:transition spd="slow">
+    <p:cover/>
+  </p:transition>
 </p:sld>
 </file>
 
@@ -20005,6 +20271,18 @@
   <p:clrMapOvr>
     <a:masterClrMapping/>
   </p:clrMapOvr>
+  <mc:AlternateContent xmlns:mc="http://schemas.openxmlformats.org/markup-compatibility/2006">
+    <mc:Choice xmlns:p14="http://schemas.microsoft.com/office/powerpoint/2010/main" Requires="p14">
+      <p:transition spd="slow" p14:dur="1600">
+        <p:blinds dir="vert"/>
+      </p:transition>
+    </mc:Choice>
+    <mc:Fallback>
+      <p:transition spd="slow">
+        <p:blinds dir="vert"/>
+      </p:transition>
+    </mc:Fallback>
+  </mc:AlternateContent>
 </p:sld>
 </file>
 
@@ -20272,6 +20550,18 @@
   <p:clrMapOvr>
     <a:masterClrMapping/>
   </p:clrMapOvr>
+  <mc:AlternateContent xmlns:mc="http://schemas.openxmlformats.org/markup-compatibility/2006">
+    <mc:Choice xmlns:p14="http://schemas.microsoft.com/office/powerpoint/2010/main" Requires="p14">
+      <p:transition spd="slow" p14:dur="1300">
+        <p14:pan dir="u"/>
+      </p:transition>
+    </mc:Choice>
+    <mc:Fallback>
+      <p:transition spd="slow">
+        <p:fade/>
+      </p:transition>
+    </mc:Fallback>
+  </mc:AlternateContent>
 </p:sld>
 </file>
 
@@ -20548,6 +20838,18 @@
   <p:clrMapOvr>
     <a:masterClrMapping/>
   </p:clrMapOvr>
+  <mc:AlternateContent xmlns:mc="http://schemas.openxmlformats.org/markup-compatibility/2006">
+    <mc:Choice xmlns:p14="http://schemas.microsoft.com/office/powerpoint/2010/main" Requires="p14">
+      <p:transition spd="slow" p14:dur="1300">
+        <p14:pan dir="u"/>
+      </p:transition>
+    </mc:Choice>
+    <mc:Fallback>
+      <p:transition spd="slow">
+        <p:fade/>
+      </p:transition>
+    </mc:Fallback>
+  </mc:AlternateContent>
 </p:sld>
 </file>
 
@@ -20681,6 +20983,18 @@
   <p:clrMapOvr>
     <a:masterClrMapping/>
   </p:clrMapOvr>
+  <mc:AlternateContent xmlns:mc="http://schemas.openxmlformats.org/markup-compatibility/2006">
+    <mc:Choice xmlns:p14="http://schemas.microsoft.com/office/powerpoint/2010/main" Requires="p14">
+      <p:transition spd="slow" p14:dur="1400">
+        <p14:doors dir="vert"/>
+      </p:transition>
+    </mc:Choice>
+    <mc:Fallback>
+      <p:transition spd="slow">
+        <p:fade/>
+      </p:transition>
+    </mc:Fallback>
+  </mc:AlternateContent>
 </p:sld>
 </file>
 
@@ -21093,6 +21407,18 @@
   <p:clrMapOvr>
     <a:masterClrMapping/>
   </p:clrMapOvr>
+  <mc:AlternateContent xmlns:mc="http://schemas.openxmlformats.org/markup-compatibility/2006">
+    <mc:Choice xmlns:p14="http://schemas.microsoft.com/office/powerpoint/2010/main" Requires="p14">
+      <p:transition spd="slow" p14:dur="1500">
+        <p:split orient="vert"/>
+      </p:transition>
+    </mc:Choice>
+    <mc:Fallback>
+      <p:transition spd="slow">
+        <p:split orient="vert"/>
+      </p:transition>
+    </mc:Fallback>
+  </mc:AlternateContent>
 </p:sld>
 </file>
 
@@ -21551,6 +21877,18 @@
   <p:clrMapOvr>
     <a:masterClrMapping/>
   </p:clrMapOvr>
+  <mc:AlternateContent xmlns:mc="http://schemas.openxmlformats.org/markup-compatibility/2006">
+    <mc:Choice xmlns:p15="http://schemas.microsoft.com/office/powerpoint/2012/main" Requires="p15">
+      <p:transition xmlns:p14="http://schemas.microsoft.com/office/powerpoint/2010/main" spd="slow" p14:dur="1250">
+        <p15:prstTrans prst="pageCurlDouble"/>
+      </p:transition>
+    </mc:Choice>
+    <mc:Fallback>
+      <p:transition spd="slow">
+        <p:fade/>
+      </p:transition>
+    </mc:Fallback>
+  </mc:AlternateContent>
 </p:sld>
 </file>
 
@@ -22019,6 +22357,9 @@
   <p:clrMapOvr>
     <a:masterClrMapping/>
   </p:clrMapOvr>
+  <p:transition spd="slow">
+    <p:cover/>
+  </p:transition>
 </p:sld>
 </file>
 
@@ -22465,6 +22806,18 @@
   <p:clrMapOvr>
     <a:masterClrMapping/>
   </p:clrMapOvr>
+  <mc:AlternateContent xmlns:mc="http://schemas.openxmlformats.org/markup-compatibility/2006">
+    <mc:Choice xmlns:p14="http://schemas.microsoft.com/office/powerpoint/2010/main" Requires="p14">
+      <p:transition spd="slow" p14:dur="1250">
+        <p14:switch dir="r"/>
+      </p:transition>
+    </mc:Choice>
+    <mc:Fallback>
+      <p:transition spd="slow">
+        <p:fade/>
+      </p:transition>
+    </mc:Fallback>
+  </mc:AlternateContent>
 </p:sld>
 </file>
 

</xml_diff>

<commit_message>
#118 Commit: Fim     --> PPT: novas tabelas + correção de erros ortográficos + adição de informação;     --> Relatório: correção de erros ortográficos.
</commit_message>
<xml_diff>
--- a/Apresentação.pptx
+++ b/Apresentação.pptx
@@ -277,7 +277,7 @@
       <p15:sldGuideLst xmlns:p15="http://schemas.microsoft.com/office/powerpoint/2012/main"/>
     </p:ext>
     <p:ext uri="http://customooxmlschemas.google.com/">
-      <go:slidesCustomData xmlns="" xmlns:mc="http://schemas.openxmlformats.org/markup-compatibility/2006" xmlns:mv="urn:schemas-microsoft-com:mac:vml" xmlns:c="http://schemas.openxmlformats.org/drawingml/2006/chart" xmlns:dgm="http://schemas.openxmlformats.org/drawingml/2006/diagram" xmlns:o="urn:schemas-microsoft-com:office:office" xmlns:v="urn:schemas-microsoft-com:vml" xmlns:pvml="urn:schemas-microsoft-com:office:powerpoint" xmlns:com="http://schemas.openxmlformats.org/drawingml/2006/compatibility" xmlns:p14="http://schemas.microsoft.com/office/powerpoint/2010/main" xmlns:p15="http://schemas.microsoft.com/office/powerpoint/2012/main" xmlns:go="http://customooxmlschemas.google.com/" r:id="rId37" roundtripDataSignature="AMtx7mi2giJIhmxq+e/rTQEB/kbV3AzsFA=="/>
+      <go:slidesCustomData xmlns:go="http://customooxmlschemas.google.com/" xmlns:p15="http://schemas.microsoft.com/office/powerpoint/2012/main" xmlns:p14="http://schemas.microsoft.com/office/powerpoint/2010/main" xmlns:com="http://schemas.openxmlformats.org/drawingml/2006/compatibility" xmlns:pvml="urn:schemas-microsoft-com:office:powerpoint" xmlns:v="urn:schemas-microsoft-com:vml" xmlns:o="urn:schemas-microsoft-com:office:office" xmlns:dgm="http://schemas.openxmlformats.org/drawingml/2006/diagram" xmlns:c="http://schemas.openxmlformats.org/drawingml/2006/chart" xmlns:mv="urn:schemas-microsoft-com:mac:vml" xmlns:mc="http://schemas.openxmlformats.org/markup-compatibility/2006" xmlns="" r:id="rId37" roundtripDataSignature="AMtx7mi2giJIhmxq+e/rTQEB/kbV3AzsFA=="/>
     </p:ext>
   </p:extLst>
 </p:presentation>
@@ -1060,163 +1060,7 @@
                 <a:cs typeface="Arial"/>
                 <a:sym typeface="Arial"/>
               </a:rPr>
-              <a:t>Comparativamente à </a:t>
-            </a:r>
-            <a:r>
-              <a:rPr lang="pt-PT" sz="1100" b="0" i="0" u="none" strike="noStrike" cap="none" dirty="0" err="1">
-                <a:solidFill>
-                  <a:srgbClr val="000000"/>
-                </a:solidFill>
-                <a:effectLst/>
-                <a:latin typeface="Arial"/>
-                <a:ea typeface="Arial"/>
-                <a:cs typeface="Arial"/>
-                <a:sym typeface="Arial"/>
-              </a:rPr>
-              <a:t>versão</a:t>
-            </a:r>
-            <a:r>
-              <a:rPr lang="pt-PT" sz="1100" b="0" i="0" u="none" strike="noStrike" cap="none" dirty="0">
-                <a:solidFill>
-                  <a:srgbClr val="000000"/>
-                </a:solidFill>
-                <a:effectLst/>
-                <a:latin typeface="Arial"/>
-                <a:ea typeface="Arial"/>
-                <a:cs typeface="Arial"/>
-                <a:sym typeface="Arial"/>
-              </a:rPr>
-              <a:t> </a:t>
-            </a:r>
-            <a:r>
-              <a:rPr lang="pt-PT" sz="1100" b="0" i="0" u="none" strike="noStrike" cap="none" dirty="0" err="1">
-                <a:solidFill>
-                  <a:srgbClr val="000000"/>
-                </a:solidFill>
-                <a:effectLst/>
-                <a:latin typeface="Arial"/>
-                <a:ea typeface="Arial"/>
-                <a:cs typeface="Arial"/>
-                <a:sym typeface="Arial"/>
-              </a:rPr>
-              <a:t>número</a:t>
-            </a:r>
-            <a:r>
-              <a:rPr lang="pt-PT" sz="1100" b="0" i="0" u="none" strike="noStrike" cap="none" dirty="0">
-                <a:solidFill>
-                  <a:srgbClr val="000000"/>
-                </a:solidFill>
-                <a:effectLst/>
-                <a:latin typeface="Arial"/>
-                <a:ea typeface="Arial"/>
-                <a:cs typeface="Arial"/>
-                <a:sym typeface="Arial"/>
-              </a:rPr>
-              <a:t> um, esta </a:t>
-            </a:r>
-            <a:r>
-              <a:rPr lang="pt-PT" sz="1100" b="0" i="0" u="none" strike="noStrike" cap="none" dirty="0" err="1">
-                <a:solidFill>
-                  <a:srgbClr val="000000"/>
-                </a:solidFill>
-                <a:effectLst/>
-                <a:latin typeface="Arial"/>
-                <a:ea typeface="Arial"/>
-                <a:cs typeface="Arial"/>
-                <a:sym typeface="Arial"/>
-              </a:rPr>
-              <a:t>implementação</a:t>
-            </a:r>
-            <a:r>
-              <a:rPr lang="pt-PT" sz="1100" b="0" i="0" u="none" strike="noStrike" cap="none" dirty="0">
-                <a:solidFill>
-                  <a:srgbClr val="000000"/>
-                </a:solidFill>
-                <a:effectLst/>
-                <a:latin typeface="Arial"/>
-                <a:ea typeface="Arial"/>
-                <a:cs typeface="Arial"/>
-                <a:sym typeface="Arial"/>
-              </a:rPr>
-              <a:t> possui, aproximada- mente, 2,5 vezes mais </a:t>
-            </a:r>
-            <a:r>
-              <a:rPr lang="pt-PT" sz="1100" b="0" i="0" u="none" strike="noStrike" cap="none" dirty="0" err="1">
-                <a:solidFill>
-                  <a:srgbClr val="000000"/>
-                </a:solidFill>
-                <a:effectLst/>
-                <a:latin typeface="Arial"/>
-                <a:ea typeface="Arial"/>
-                <a:cs typeface="Arial"/>
-                <a:sym typeface="Arial"/>
-              </a:rPr>
-              <a:t>code</a:t>
-            </a:r>
-            <a:r>
-              <a:rPr lang="pt-PT" sz="1100" b="0" i="0" u="none" strike="noStrike" cap="none" dirty="0">
-                <a:solidFill>
-                  <a:srgbClr val="000000"/>
-                </a:solidFill>
-                <a:effectLst/>
-                <a:latin typeface="Arial"/>
-                <a:ea typeface="Arial"/>
-                <a:cs typeface="Arial"/>
-                <a:sym typeface="Arial"/>
-              </a:rPr>
-              <a:t> </a:t>
-            </a:r>
-            <a:r>
-              <a:rPr lang="pt-PT" sz="1100" b="0" i="0" u="none" strike="noStrike" cap="none" dirty="0" err="1">
-                <a:solidFill>
-                  <a:srgbClr val="000000"/>
-                </a:solidFill>
-                <a:effectLst/>
-                <a:latin typeface="Arial"/>
-                <a:ea typeface="Arial"/>
-                <a:cs typeface="Arial"/>
-                <a:sym typeface="Arial"/>
-              </a:rPr>
-              <a:t>smells</a:t>
-            </a:r>
-            <a:r>
-              <a:rPr lang="pt-PT" sz="1100" b="0" i="0" u="none" strike="noStrike" cap="none" dirty="0">
-                <a:solidFill>
-                  <a:srgbClr val="000000"/>
-                </a:solidFill>
-                <a:effectLst/>
-                <a:latin typeface="Arial"/>
-                <a:ea typeface="Arial"/>
-                <a:cs typeface="Arial"/>
-                <a:sym typeface="Arial"/>
-              </a:rPr>
-              <a:t>, o que leva a concluir que esta, potencialmente, levará a uma </a:t>
-            </a:r>
-            <a:r>
-              <a:rPr lang="pt-PT" sz="1100" b="0" i="0" u="none" strike="noStrike" cap="none" dirty="0" err="1">
-                <a:solidFill>
-                  <a:srgbClr val="000000"/>
-                </a:solidFill>
-                <a:effectLst/>
-                <a:latin typeface="Arial"/>
-                <a:ea typeface="Arial"/>
-                <a:cs typeface="Arial"/>
-                <a:sym typeface="Arial"/>
-              </a:rPr>
-              <a:t>interpretabilidade</a:t>
-            </a:r>
-            <a:r>
-              <a:rPr lang="pt-PT" sz="1100" b="0" i="0" u="none" strike="noStrike" cap="none" dirty="0">
-                <a:solidFill>
-                  <a:srgbClr val="000000"/>
-                </a:solidFill>
-                <a:effectLst/>
-                <a:latin typeface="Arial"/>
-                <a:ea typeface="Arial"/>
-                <a:cs typeface="Arial"/>
-                <a:sym typeface="Arial"/>
-              </a:rPr>
-              <a:t> bastante pior. </a:t>
+              <a:t>Comparativamente à versão número um, esta implementação possui, aproximada- mente, 2,5 vezes mais code smells, o que leva a concluir que esta, potencialmente, levará a uma interpretabilidade bastante pior. </a:t>
             </a:r>
             <a:endParaRPr lang="pt-PT" dirty="0"/>
           </a:p>
@@ -4381,23 +4225,7 @@
             </a:pPr>
             <a:r>
               <a:rPr lang="pt-PT" dirty="0"/>
-              <a:t>Mais de metade dos </a:t>
-            </a:r>
-            <a:r>
-              <a:rPr lang="pt-PT" dirty="0" err="1"/>
-              <a:t>code</a:t>
-            </a:r>
-            <a:r>
-              <a:rPr lang="pt-PT" dirty="0"/>
-              <a:t> </a:t>
-            </a:r>
-            <a:r>
-              <a:rPr lang="pt-PT" dirty="0" err="1"/>
-              <a:t>smells</a:t>
-            </a:r>
-            <a:r>
-              <a:rPr lang="pt-PT" dirty="0"/>
-              <a:t> (54%) possuem uma gravidade considerável.</a:t>
+              <a:t>Mais de metade dos code smells (54%) possuem uma gravidade considerável.</a:t>
             </a:r>
           </a:p>
           <a:p>
@@ -4431,85 +4259,7 @@
                 <a:cs typeface="Arial"/>
                 <a:sym typeface="Arial"/>
               </a:rPr>
-              <a:t>Esta </a:t>
-            </a:r>
-            <a:r>
-              <a:rPr lang="pt-PT" sz="1100" b="0" i="0" u="none" strike="noStrike" cap="none" dirty="0" err="1">
-                <a:solidFill>
-                  <a:srgbClr val="000000"/>
-                </a:solidFill>
-                <a:effectLst/>
-                <a:latin typeface="Arial"/>
-                <a:ea typeface="Arial"/>
-                <a:cs typeface="Arial"/>
-                <a:sym typeface="Arial"/>
-              </a:rPr>
-              <a:t>implementação</a:t>
-            </a:r>
-            <a:r>
-              <a:rPr lang="pt-PT" sz="1100" b="0" i="0" u="none" strike="noStrike" cap="none" dirty="0">
-                <a:solidFill>
-                  <a:srgbClr val="000000"/>
-                </a:solidFill>
-                <a:effectLst/>
-                <a:latin typeface="Arial"/>
-                <a:ea typeface="Arial"/>
-                <a:cs typeface="Arial"/>
-                <a:sym typeface="Arial"/>
-              </a:rPr>
-              <a:t> levará, potencialmente, a uma </a:t>
-            </a:r>
-            <a:r>
-              <a:rPr lang="pt-PT" sz="1100" b="0" i="0" u="none" strike="noStrike" cap="none" dirty="0" err="1">
-                <a:solidFill>
-                  <a:srgbClr val="000000"/>
-                </a:solidFill>
-                <a:effectLst/>
-                <a:latin typeface="Arial"/>
-                <a:ea typeface="Arial"/>
-                <a:cs typeface="Arial"/>
-                <a:sym typeface="Arial"/>
-              </a:rPr>
-              <a:t>interpretabilidade</a:t>
-            </a:r>
-            <a:r>
-              <a:rPr lang="pt-PT" sz="1100" b="0" i="0" u="none" strike="noStrike" cap="none" dirty="0">
-                <a:solidFill>
-                  <a:srgbClr val="000000"/>
-                </a:solidFill>
-                <a:effectLst/>
-                <a:latin typeface="Arial"/>
-                <a:ea typeface="Arial"/>
-                <a:cs typeface="Arial"/>
-                <a:sym typeface="Arial"/>
-              </a:rPr>
-              <a:t> </a:t>
-            </a:r>
-            <a:r>
-              <a:rPr lang="pt-PT" sz="1100" b="0" i="0" u="none" strike="noStrike" cap="none" dirty="0" err="1">
-                <a:solidFill>
-                  <a:srgbClr val="000000"/>
-                </a:solidFill>
-                <a:effectLst/>
-                <a:latin typeface="Arial"/>
-                <a:ea typeface="Arial"/>
-                <a:cs typeface="Arial"/>
-                <a:sym typeface="Arial"/>
-              </a:rPr>
-              <a:t>razoável</a:t>
-            </a:r>
-            <a:r>
-              <a:rPr lang="pt-PT" sz="1100" b="0" i="0" u="none" strike="noStrike" cap="none" dirty="0">
-                <a:solidFill>
-                  <a:srgbClr val="000000"/>
-                </a:solidFill>
-                <a:effectLst/>
-                <a:latin typeface="Arial"/>
-                <a:ea typeface="Arial"/>
-                <a:cs typeface="Arial"/>
-                <a:sym typeface="Arial"/>
-              </a:rPr>
-              <a:t> por parte do programador. </a:t>
+              <a:t>Esta implementação levará, potencialmente, a uma interpretabilidade razoável por parte do programador. </a:t>
             </a:r>
             <a:endParaRPr lang="pt-PT" dirty="0"/>
           </a:p>
@@ -13041,36 +12791,12 @@
               </a:buClr>
             </a:pPr>
             <a:r>
-              <a:rPr lang="pt-PT" sz="1400" i="1" dirty="0" err="1"/>
+              <a:rPr lang="pt-PT" sz="1400" i="1" dirty="0"/>
               <a:t>Info</a:t>
             </a:r>
             <a:r>
               <a:rPr lang="pt-PT" sz="1400" dirty="0"/>
-              <a:t>: 1 (</a:t>
-            </a:r>
-            <a:r>
-              <a:rPr lang="pt-PT" sz="1400" dirty="0" err="1"/>
-              <a:t>referência</a:t>
-            </a:r>
-            <a:r>
-              <a:rPr lang="pt-PT" sz="1400" dirty="0"/>
-              <a:t> à </a:t>
-            </a:r>
-            <a:r>
-              <a:rPr lang="pt-PT" sz="1400" dirty="0" err="1"/>
-              <a:t>presença</a:t>
-            </a:r>
-            <a:r>
-              <a:rPr lang="pt-PT" sz="1400" dirty="0"/>
-              <a:t> de um </a:t>
-            </a:r>
-            <a:r>
-              <a:rPr lang="pt-PT" sz="1400" dirty="0" err="1"/>
-              <a:t>comentário</a:t>
-            </a:r>
-            <a:r>
-              <a:rPr lang="pt-PT" sz="1400" dirty="0"/>
-              <a:t> TODO) </a:t>
+              <a:t>: 1 (referência à presença de um comentário TODO) </a:t>
             </a:r>
           </a:p>
           <a:p>
@@ -14550,7 +14276,7 @@
               <a:t>Após aplicados os </a:t>
             </a:r>
             <a:r>
-              <a:rPr lang="pt-PT" sz="1400" i="1" dirty="0" err="1"/>
+              <a:rPr lang="pt-PT" sz="1400" i="1" dirty="0"/>
               <a:t>refactorings</a:t>
             </a:r>
             <a:r>
@@ -14558,16 +14284,8 @@
               <a:t>, verificamos as seguintes melhorias a nível da </a:t>
             </a:r>
             <a:r>
-              <a:rPr lang="pt-PT" sz="1400" i="1" dirty="0" err="1"/>
-              <a:t>technical</a:t>
-            </a:r>
-            <a:r>
               <a:rPr lang="pt-PT" sz="1400" i="1" dirty="0"/>
-              <a:t> </a:t>
-            </a:r>
-            <a:r>
-              <a:rPr lang="pt-PT" sz="1400" i="1" dirty="0" err="1"/>
-              <a:t>debt</a:t>
+              <a:t>technical debt</a:t>
             </a:r>
             <a:r>
               <a:rPr lang="pt-PT" sz="1400" dirty="0"/>
@@ -14688,18 +14406,9 @@
                     <a:p>
                       <a:pPr algn="ctr"/>
                       <a:r>
-                        <a:rPr lang="pt-PT" sz="1600" i="1" dirty="0" err="1"/>
-                        <a:t>Technical</a:t>
+                        <a:rPr lang="pt-PT" sz="1600" i="1" dirty="0"/>
+                        <a:t>Technical Debt</a:t>
                       </a:r>
-                      <a:r>
-                        <a:rPr lang="pt-PT" sz="1600" i="1" dirty="0"/>
-                        <a:t> </a:t>
-                      </a:r>
-                      <a:r>
-                        <a:rPr lang="pt-PT" sz="1600" i="1" dirty="0" err="1"/>
-                        <a:t>Debt</a:t>
-                      </a:r>
-                      <a:endParaRPr lang="pt-PT" sz="1600" i="1" dirty="0"/>
                     </a:p>
                   </a:txBody>
                   <a:tcPr/>
@@ -14732,10 +14441,9 @@
                     <a:p>
                       <a:pPr algn="ctr"/>
                       <a:r>
-                        <a:rPr lang="pt-PT" i="1" dirty="0" err="1"/>
+                        <a:rPr lang="pt-PT" i="1" dirty="0"/>
                         <a:t>Blocker</a:t>
                       </a:r>
-                      <a:endParaRPr lang="pt-PT" i="1" dirty="0"/>
                     </a:p>
                   </a:txBody>
                   <a:tcPr/>
@@ -14796,10 +14504,9 @@
                     <a:p>
                       <a:pPr algn="ctr"/>
                       <a:r>
-                        <a:rPr lang="pt-PT" i="1" dirty="0" err="1"/>
+                        <a:rPr lang="pt-PT" i="1" dirty="0"/>
                         <a:t>Critical</a:t>
                       </a:r>
-                      <a:endParaRPr lang="pt-PT" i="1" dirty="0"/>
                     </a:p>
                   </a:txBody>
                   <a:tcPr/>
@@ -14923,10 +14630,9 @@
                     <a:p>
                       <a:pPr algn="ctr"/>
                       <a:r>
-                        <a:rPr lang="pt-PT" i="1" dirty="0" err="1"/>
+                        <a:rPr lang="pt-PT" i="1" dirty="0"/>
                         <a:t>Minor</a:t>
                       </a:r>
-                      <a:endParaRPr lang="pt-PT" i="1" dirty="0"/>
                     </a:p>
                   </a:txBody>
                   <a:tcPr/>
@@ -15570,28 +15276,16 @@
               <a:t>, apenas foram removidos os </a:t>
             </a:r>
             <a:r>
-              <a:rPr lang="pt-PT" sz="1400" i="1" dirty="0" err="1"/>
-              <a:t>smells</a:t>
-            </a:r>
-            <a:r>
               <a:rPr lang="pt-PT" sz="1400" i="1" dirty="0"/>
-              <a:t>. </a:t>
+              <a:t>smells. </a:t>
             </a:r>
             <a:r>
               <a:rPr lang="pt-PT" sz="1400" dirty="0"/>
               <a:t>Mesmo assim, as diferenças na </a:t>
             </a:r>
             <a:r>
-              <a:rPr lang="pt-PT" sz="1400" i="1" dirty="0" err="1"/>
-              <a:t>technical</a:t>
-            </a:r>
-            <a:r>
               <a:rPr lang="pt-PT" sz="1400" i="1" dirty="0"/>
-              <a:t> </a:t>
-            </a:r>
-            <a:r>
-              <a:rPr lang="pt-PT" sz="1400" i="1" dirty="0" err="1"/>
-              <a:t>debt</a:t>
+              <a:t>technical debt</a:t>
             </a:r>
             <a:r>
               <a:rPr lang="pt-PT" sz="1400" dirty="0"/>
@@ -15685,18 +15379,9 @@
                     <a:p>
                       <a:pPr algn="ctr"/>
                       <a:r>
-                        <a:rPr lang="pt-PT" sz="1600" i="1" dirty="0" err="1"/>
-                        <a:t>Technical</a:t>
+                        <a:rPr lang="pt-PT" sz="1600" i="1" dirty="0"/>
+                        <a:t>Technical Debt</a:t>
                       </a:r>
-                      <a:r>
-                        <a:rPr lang="pt-PT" sz="1600" i="1" dirty="0"/>
-                        <a:t> </a:t>
-                      </a:r>
-                      <a:r>
-                        <a:rPr lang="pt-PT" sz="1600" i="1" dirty="0" err="1"/>
-                        <a:t>Debt</a:t>
-                      </a:r>
-                      <a:endParaRPr lang="pt-PT" sz="1600" i="1" dirty="0"/>
                     </a:p>
                   </a:txBody>
                   <a:tcPr/>
@@ -15729,10 +15414,9 @@
                     <a:p>
                       <a:pPr algn="ctr"/>
                       <a:r>
-                        <a:rPr lang="pt-PT" i="1" dirty="0" err="1"/>
+                        <a:rPr lang="pt-PT" i="1" dirty="0"/>
                         <a:t>Blocker</a:t>
                       </a:r>
-                      <a:endParaRPr lang="pt-PT" i="1" dirty="0"/>
                     </a:p>
                   </a:txBody>
                   <a:tcPr/>
@@ -15793,10 +15477,9 @@
                     <a:p>
                       <a:pPr algn="ctr"/>
                       <a:r>
-                        <a:rPr lang="pt-PT" i="1" dirty="0" err="1"/>
+                        <a:rPr lang="pt-PT" i="1" dirty="0"/>
                         <a:t>Critical</a:t>
                       </a:r>
-                      <a:endParaRPr lang="pt-PT" i="1" dirty="0"/>
                     </a:p>
                   </a:txBody>
                   <a:tcPr/>
@@ -15920,10 +15603,9 @@
                     <a:p>
                       <a:pPr algn="ctr"/>
                       <a:r>
-                        <a:rPr lang="pt-PT" i="1" dirty="0" err="1"/>
+                        <a:rPr lang="pt-PT" i="1" dirty="0"/>
                         <a:t>Minor</a:t>
                       </a:r>
-                      <a:endParaRPr lang="pt-PT" i="1" dirty="0"/>
                     </a:p>
                   </a:txBody>
                   <a:tcPr/>
@@ -17292,12 +16974,8 @@
               <a:t>Por fim, de maneira a executar o gerador proposto, foi necessário parametrizar numa variável o número de registos a serem escritos para o ficheiro </a:t>
             </a:r>
             <a:r>
-              <a:rPr lang="pt-PT" sz="1400" i="1" dirty="0" err="1"/>
-              <a:t>logs.bak</a:t>
-            </a:r>
-            <a:r>
               <a:rPr lang="pt-PT" sz="1400" i="1" dirty="0"/>
-              <a:t>,</a:t>
+              <a:t>logs.bak,</a:t>
             </a:r>
             <a:r>
               <a:rPr lang="pt-PT" sz="1400" dirty="0"/>
@@ -18534,6 +18212,7 @@
           </a:bodyPr>
           <a:lstStyle/>
           <a:p>
+            <a:pPr algn="just"/>
             <a:r>
               <a:rPr lang="pt-PT" sz="1400" dirty="0"/>
               <a:t>Após as diversas alterações e eliminações de </a:t>
@@ -18548,9 +18227,11 @@
             </a:r>
           </a:p>
           <a:p>
+            <a:pPr algn="just"/>
             <a:endParaRPr lang="pt-PT" sz="1400" dirty="0"/>
           </a:p>
           <a:p>
+            <a:pPr algn="just"/>
             <a:r>
               <a:rPr lang="pt-PT" sz="1400" dirty="0"/>
               <a:t>Para tal foi utilizada a ferramenta </a:t>
@@ -18565,9 +18246,11 @@
             </a:r>
           </a:p>
           <a:p>
+            <a:pPr algn="just"/>
             <a:endParaRPr lang="pt-PT" sz="1400" dirty="0"/>
           </a:p>
           <a:p>
+            <a:pPr algn="just"/>
             <a:r>
               <a:rPr lang="pt-PT" sz="1400" dirty="0"/>
               <a:t>Como primeira etapa foram registados os valores energéticos com </a:t>
@@ -18578,7 +18261,34 @@
             </a:r>
             <a:r>
               <a:rPr lang="pt-PT" sz="1400" dirty="0"/>
-              <a:t> de diversos tamanhos (5, 55, 5555). De </a:t>
+              <a:t> de diversos tamanhos (5, 55, 5555, 55555). Dado que o log de tamanho 55555 foi o único onde se obteve resultados significativos, foram executadas 25 medições na ferramenta computacional </a:t>
+            </a:r>
+            <a:r>
+              <a:rPr lang="pt-PT" sz="1400" i="1" dirty="0"/>
+              <a:t>RAPL</a:t>
+            </a:r>
+            <a:r>
+              <a:rPr lang="pt-PT" sz="1400" dirty="0"/>
+              <a:t>. Após estas medições, foram calculadas as respetivas médias com a utilização do utensílio </a:t>
+            </a:r>
+            <a:r>
+              <a:rPr lang="pt-PT" sz="1400" i="1" dirty="0"/>
+              <a:t>LibreOffice Calc</a:t>
+            </a:r>
+            <a:r>
+              <a:rPr lang="pt-PT" sz="1400" dirty="0"/>
+              <a:t>. Assim foi possível obter resultados mais reais e, por sua vez, mais credíveis.</a:t>
+            </a:r>
+          </a:p>
+          <a:p>
+            <a:pPr algn="just"/>
+            <a:endParaRPr lang="pt-PT" sz="1400" dirty="0"/>
+          </a:p>
+          <a:p>
+            <a:pPr algn="just"/>
+            <a:r>
+              <a:rPr lang="pt-PT" sz="1400" dirty="0"/>
+              <a:t>No </a:t>
             </a:r>
             <a:r>
               <a:rPr lang="pt-PT" sz="1400" i="1" dirty="0"/>
@@ -18586,8 +18296,11 @@
             </a:r>
             <a:r>
               <a:rPr lang="pt-PT" sz="1400" dirty="0"/>
-              <a:t>seguinte encontram-se as tabelas com os resultados obtidos.</a:t>
-            </a:r>
+              <a:t>seguinte encontram-se as tabelas que exprimem os resultados obtidos.</a:t>
+            </a:r>
+          </a:p>
+          <a:p>
+            <a:endParaRPr lang="pt-PT" sz="1400" dirty="0"/>
           </a:p>
           <a:p>
             <a:pPr>
@@ -18872,10 +18585,10 @@
       </p:sp>
       <p:pic>
         <p:nvPicPr>
-          <p:cNvPr id="3" name="Imagem 2">
+          <p:cNvPr id="4" name="Imagem 3">
             <a:extLst>
               <a:ext uri="{FF2B5EF4-FFF2-40B4-BE49-F238E27FC236}">
-                <a16:creationId xmlns:a16="http://schemas.microsoft.com/office/drawing/2014/main" id="{D919BBD5-D55A-F648-BB47-03B273DC1C56}"/>
+                <a16:creationId xmlns:a16="http://schemas.microsoft.com/office/drawing/2014/main" id="{D18719B3-377C-9C4C-948D-9BFF406B6E6A}"/>
               </a:ext>
             </a:extLst>
           </p:cNvPr>
@@ -18892,8 +18605,8 @@
         </p:blipFill>
         <p:spPr>
           <a:xfrm>
-            <a:off x="685205" y="1190650"/>
-            <a:ext cx="6058513" cy="3459665"/>
+            <a:off x="467725" y="1260346"/>
+            <a:ext cx="6435995" cy="3550893"/>
           </a:xfrm>
           <a:prstGeom prst="rect">
             <a:avLst/>
@@ -19622,8 +19335,8 @@
         </p:blipFill>
         <p:spPr>
           <a:xfrm>
-            <a:off x="467725" y="1552701"/>
-            <a:ext cx="6571839" cy="2570535"/>
+            <a:off x="467725" y="1541417"/>
+            <a:ext cx="6600687" cy="2581819"/>
           </a:xfrm>
           <a:prstGeom prst="rect">
             <a:avLst/>
@@ -20199,10 +19912,10 @@
       </p:pic>
       <p:pic>
         <p:nvPicPr>
-          <p:cNvPr id="2" name="Imagem 1">
+          <p:cNvPr id="3" name="Imagem 2">
             <a:extLst>
               <a:ext uri="{FF2B5EF4-FFF2-40B4-BE49-F238E27FC236}">
-                <a16:creationId xmlns:a16="http://schemas.microsoft.com/office/drawing/2014/main" id="{B93A53DC-B9F1-F54E-B605-16AEC71B9438}"/>
+                <a16:creationId xmlns:a16="http://schemas.microsoft.com/office/drawing/2014/main" id="{75613F76-2870-AD48-914D-467133B607D9}"/>
               </a:ext>
             </a:extLst>
           </p:cNvPr>
@@ -20219,8 +19932,8 @@
         </p:blipFill>
         <p:spPr>
           <a:xfrm>
-            <a:off x="318568" y="1577251"/>
-            <a:ext cx="6722418" cy="2573217"/>
+            <a:off x="467725" y="1756553"/>
+            <a:ext cx="6507841" cy="2346087"/>
           </a:xfrm>
           <a:prstGeom prst="rect">
             <a:avLst/>

</xml_diff>